<commit_message>
ucd und präsi fertig
</commit_message>
<xml_diff>
--- a/Dokumentation/Präsentation_abschluss.pptx
+++ b/Dokumentation/Präsentation_abschluss.pptx
@@ -4,14 +4,17 @@
   <p:sldMasterIdLst>
     <p:sldMasterId id="2147483684" r:id="rId1"/>
   </p:sldMasterIdLst>
+  <p:notesMasterIdLst>
+    <p:notesMasterId r:id="rId10"/>
+  </p:notesMasterIdLst>
   <p:sldIdLst>
     <p:sldId id="256" r:id="rId2"/>
     <p:sldId id="257" r:id="rId3"/>
     <p:sldId id="258" r:id="rId4"/>
     <p:sldId id="259" r:id="rId5"/>
-    <p:sldId id="261" r:id="rId6"/>
+    <p:sldId id="262" r:id="rId6"/>
     <p:sldId id="260" r:id="rId7"/>
-    <p:sldId id="262" r:id="rId8"/>
+    <p:sldId id="261" r:id="rId8"/>
     <p:sldId id="263" r:id="rId9"/>
   </p:sldIdLst>
   <p:sldSz cx="12192000" cy="6858000"/>
@@ -122,7 +125,7 @@
 <file path=ppt/revisionInfo.xml><?xml version="1.0" encoding="utf-8"?>
 <p1510:revInfo xmlns:a="http://schemas.openxmlformats.org/drawingml/2006/main" xmlns:r="http://schemas.openxmlformats.org/officeDocument/2006/relationships" xmlns:p1510="http://schemas.microsoft.com/office/powerpoint/2015/10/main">
   <p1510:revLst>
-    <p1510:client id="{056C6563-87CA-9F41-86EA-9A3B7E1F5939}" v="15" dt="2024-06-17T07:45:10.262"/>
+    <p1510:client id="{056C6563-87CA-9F41-86EA-9A3B7E1F5939}" v="56" dt="2024-06-18T07:22:18.915"/>
   </p1510:revLst>
 </p1510:revInfo>
 </file>
@@ -131,19 +134,19 @@
 <pc:chgInfo xmlns:a="http://schemas.openxmlformats.org/drawingml/2006/main" xmlns:r="http://schemas.openxmlformats.org/officeDocument/2006/relationships" xmlns:ac="http://schemas.microsoft.com/office/drawing/2013/main/command" xmlns:pc="http://schemas.microsoft.com/office/powerpoint/2013/main/command">
   <pc:docChgLst>
     <pc:chgData name="Alexander Hahn" userId="56d4792ddc6be58c" providerId="LiveId" clId="{056C6563-87CA-9F41-86EA-9A3B7E1F5939}"/>
-    <pc:docChg chg="undo custSel addSld modSld">
-      <pc:chgData name="Alexander Hahn" userId="56d4792ddc6be58c" providerId="LiveId" clId="{056C6563-87CA-9F41-86EA-9A3B7E1F5939}" dt="2024-06-17T07:45:59.347" v="68" actId="478"/>
+    <pc:docChg chg="undo custSel addSld modSld sldOrd">
+      <pc:chgData name="Alexander Hahn" userId="56d4792ddc6be58c" providerId="LiveId" clId="{056C6563-87CA-9F41-86EA-9A3B7E1F5939}" dt="2024-06-18T07:27:45.486" v="441" actId="20577"/>
       <pc:docMkLst>
         <pc:docMk/>
       </pc:docMkLst>
       <pc:sldChg chg="modSp mod">
-        <pc:chgData name="Alexander Hahn" userId="56d4792ddc6be58c" providerId="LiveId" clId="{056C6563-87CA-9F41-86EA-9A3B7E1F5939}" dt="2024-06-17T07:41:15.119" v="8" actId="20577"/>
+        <pc:chgData name="Alexander Hahn" userId="56d4792ddc6be58c" providerId="LiveId" clId="{056C6563-87CA-9F41-86EA-9A3B7E1F5939}" dt="2024-06-18T07:25:06.862" v="387" actId="20577"/>
         <pc:sldMkLst>
           <pc:docMk/>
           <pc:sldMk cId="2280991357" sldId="257"/>
         </pc:sldMkLst>
         <pc:spChg chg="mod">
-          <ac:chgData name="Alexander Hahn" userId="56d4792ddc6be58c" providerId="LiveId" clId="{056C6563-87CA-9F41-86EA-9A3B7E1F5939}" dt="2024-06-17T07:41:15.119" v="8" actId="20577"/>
+          <ac:chgData name="Alexander Hahn" userId="56d4792ddc6be58c" providerId="LiveId" clId="{056C6563-87CA-9F41-86EA-9A3B7E1F5939}" dt="2024-06-18T07:25:06.862" v="387" actId="20577"/>
           <ac:spMkLst>
             <pc:docMk/>
             <pc:sldMk cId="2280991357" sldId="257"/>
@@ -151,8 +154,158 @@
           </ac:spMkLst>
         </pc:spChg>
       </pc:sldChg>
+      <pc:sldChg chg="modSp">
+        <pc:chgData name="Alexander Hahn" userId="56d4792ddc6be58c" providerId="LiveId" clId="{056C6563-87CA-9F41-86EA-9A3B7E1F5939}" dt="2024-06-18T07:19:15.348" v="214"/>
+        <pc:sldMkLst>
+          <pc:docMk/>
+          <pc:sldMk cId="1134258423" sldId="258"/>
+        </pc:sldMkLst>
+        <pc:graphicFrameChg chg="mod">
+          <ac:chgData name="Alexander Hahn" userId="56d4792ddc6be58c" providerId="LiveId" clId="{056C6563-87CA-9F41-86EA-9A3B7E1F5939}" dt="2024-06-18T07:19:15.348" v="214"/>
+          <ac:graphicFrameMkLst>
+            <pc:docMk/>
+            <pc:sldMk cId="1134258423" sldId="258"/>
+            <ac:graphicFrameMk id="4" creationId="{7B2070E2-8C00-1436-6BBB-842E1006C831}"/>
+          </ac:graphicFrameMkLst>
+        </pc:graphicFrameChg>
+      </pc:sldChg>
       <pc:sldChg chg="addSp delSp modSp mod setBg">
-        <pc:chgData name="Alexander Hahn" userId="56d4792ddc6be58c" providerId="LiveId" clId="{056C6563-87CA-9F41-86EA-9A3B7E1F5939}" dt="2024-06-17T07:42:18.231" v="25" actId="478"/>
+        <pc:chgData name="Alexander Hahn" userId="56d4792ddc6be58c" providerId="LiveId" clId="{056C6563-87CA-9F41-86EA-9A3B7E1F5939}" dt="2024-06-18T07:24:46.596" v="380" actId="14100"/>
+        <pc:sldMkLst>
+          <pc:docMk/>
+          <pc:sldMk cId="4181717768" sldId="259"/>
+        </pc:sldMkLst>
+        <pc:spChg chg="del">
+          <ac:chgData name="Alexander Hahn" userId="56d4792ddc6be58c" providerId="LiveId" clId="{056C6563-87CA-9F41-86EA-9A3B7E1F5939}" dt="2024-06-18T07:20:13.493" v="231" actId="26606"/>
+          <ac:spMkLst>
+            <pc:docMk/>
+            <pc:sldMk cId="4181717768" sldId="259"/>
+            <ac:spMk id="2" creationId="{6519A4E8-8A8A-78E4-8F4B-C0C739CE82DC}"/>
+          </ac:spMkLst>
+        </pc:spChg>
+        <pc:spChg chg="mod">
+          <ac:chgData name="Alexander Hahn" userId="56d4792ddc6be58c" providerId="LiveId" clId="{056C6563-87CA-9F41-86EA-9A3B7E1F5939}" dt="2024-06-18T07:20:13.493" v="231" actId="26606"/>
+          <ac:spMkLst>
+            <pc:docMk/>
+            <pc:sldMk cId="4181717768" sldId="259"/>
+            <ac:spMk id="3" creationId="{3D6C8044-614B-652D-5396-89C7FE7A0CDD}"/>
+          </ac:spMkLst>
+        </pc:spChg>
+        <pc:spChg chg="mod">
+          <ac:chgData name="Alexander Hahn" userId="56d4792ddc6be58c" providerId="LiveId" clId="{056C6563-87CA-9F41-86EA-9A3B7E1F5939}" dt="2024-06-18T07:24:46.596" v="380" actId="14100"/>
+          <ac:spMkLst>
+            <pc:docMk/>
+            <pc:sldMk cId="4181717768" sldId="259"/>
+            <ac:spMk id="4" creationId="{BB292303-B8C8-8513-DA96-210168295CD6}"/>
+          </ac:spMkLst>
+        </pc:spChg>
+        <pc:spChg chg="del">
+          <ac:chgData name="Alexander Hahn" userId="56d4792ddc6be58c" providerId="LiveId" clId="{056C6563-87CA-9F41-86EA-9A3B7E1F5939}" dt="2024-06-18T07:20:13.493" v="231" actId="26606"/>
+          <ac:spMkLst>
+            <pc:docMk/>
+            <pc:sldMk cId="4181717768" sldId="259"/>
+            <ac:spMk id="5" creationId="{CDC14DFF-7DF8-D25C-2881-94EC65E3085A}"/>
+          </ac:spMkLst>
+        </pc:spChg>
+        <pc:spChg chg="del">
+          <ac:chgData name="Alexander Hahn" userId="56d4792ddc6be58c" providerId="LiveId" clId="{056C6563-87CA-9F41-86EA-9A3B7E1F5939}" dt="2024-06-18T07:20:13.493" v="231" actId="26606"/>
+          <ac:spMkLst>
+            <pc:docMk/>
+            <pc:sldMk cId="4181717768" sldId="259"/>
+            <ac:spMk id="6" creationId="{9462AFEF-68BA-BDFD-3454-E5E6CCB6C5F2}"/>
+          </ac:spMkLst>
+        </pc:spChg>
+        <pc:spChg chg="del">
+          <ac:chgData name="Alexander Hahn" userId="56d4792ddc6be58c" providerId="LiveId" clId="{056C6563-87CA-9F41-86EA-9A3B7E1F5939}" dt="2024-06-18T07:20:13.493" v="231" actId="26606"/>
+          <ac:spMkLst>
+            <pc:docMk/>
+            <pc:sldMk cId="4181717768" sldId="259"/>
+            <ac:spMk id="7" creationId="{8A402376-CC3B-0BAA-C8B4-54824EBB7819}"/>
+          </ac:spMkLst>
+        </pc:spChg>
+        <pc:spChg chg="del">
+          <ac:chgData name="Alexander Hahn" userId="56d4792ddc6be58c" providerId="LiveId" clId="{056C6563-87CA-9F41-86EA-9A3B7E1F5939}" dt="2024-06-18T07:20:13.493" v="231" actId="26606"/>
+          <ac:spMkLst>
+            <pc:docMk/>
+            <pc:sldMk cId="4181717768" sldId="259"/>
+            <ac:spMk id="8" creationId="{9E5ABCD2-0D68-91DE-1869-94CBFB96E455}"/>
+          </ac:spMkLst>
+        </pc:spChg>
+        <pc:spChg chg="del mod">
+          <ac:chgData name="Alexander Hahn" userId="56d4792ddc6be58c" providerId="LiveId" clId="{056C6563-87CA-9F41-86EA-9A3B7E1F5939}" dt="2024-06-18T07:19:57.503" v="230" actId="478"/>
+          <ac:spMkLst>
+            <pc:docMk/>
+            <pc:sldMk cId="4181717768" sldId="259"/>
+            <ac:spMk id="10" creationId="{04BC82BF-6600-5D0A-C5EF-8861743E8622}"/>
+          </ac:spMkLst>
+        </pc:spChg>
+        <pc:spChg chg="add">
+          <ac:chgData name="Alexander Hahn" userId="56d4792ddc6be58c" providerId="LiveId" clId="{056C6563-87CA-9F41-86EA-9A3B7E1F5939}" dt="2024-06-18T07:20:13.493" v="231" actId="26606"/>
+          <ac:spMkLst>
+            <pc:docMk/>
+            <pc:sldMk cId="4181717768" sldId="259"/>
+            <ac:spMk id="2055" creationId="{C4285719-470E-454C-AF62-8323075F1F5B}"/>
+          </ac:spMkLst>
+        </pc:spChg>
+        <pc:spChg chg="add">
+          <ac:chgData name="Alexander Hahn" userId="56d4792ddc6be58c" providerId="LiveId" clId="{056C6563-87CA-9F41-86EA-9A3B7E1F5939}" dt="2024-06-18T07:20:13.493" v="231" actId="26606"/>
+          <ac:spMkLst>
+            <pc:docMk/>
+            <pc:sldMk cId="4181717768" sldId="259"/>
+            <ac:spMk id="2057" creationId="{CD9FE4EF-C4D8-49A0-B2FF-81D8DB7D8A24}"/>
+          </ac:spMkLst>
+        </pc:spChg>
+        <pc:spChg chg="add">
+          <ac:chgData name="Alexander Hahn" userId="56d4792ddc6be58c" providerId="LiveId" clId="{056C6563-87CA-9F41-86EA-9A3B7E1F5939}" dt="2024-06-18T07:20:13.493" v="231" actId="26606"/>
+          <ac:spMkLst>
+            <pc:docMk/>
+            <pc:sldMk cId="4181717768" sldId="259"/>
+            <ac:spMk id="2059" creationId="{4300840D-0A0B-4512-BACA-B439D5B9C57C}"/>
+          </ac:spMkLst>
+        </pc:spChg>
+        <pc:spChg chg="add">
+          <ac:chgData name="Alexander Hahn" userId="56d4792ddc6be58c" providerId="LiveId" clId="{056C6563-87CA-9F41-86EA-9A3B7E1F5939}" dt="2024-06-18T07:20:13.493" v="231" actId="26606"/>
+          <ac:spMkLst>
+            <pc:docMk/>
+            <pc:sldMk cId="4181717768" sldId="259"/>
+            <ac:spMk id="2061" creationId="{D2B78728-A580-49A7-84F9-6EF6F583ADE0}"/>
+          </ac:spMkLst>
+        </pc:spChg>
+        <pc:spChg chg="add">
+          <ac:chgData name="Alexander Hahn" userId="56d4792ddc6be58c" providerId="LiveId" clId="{056C6563-87CA-9F41-86EA-9A3B7E1F5939}" dt="2024-06-18T07:20:13.493" v="231" actId="26606"/>
+          <ac:spMkLst>
+            <pc:docMk/>
+            <pc:sldMk cId="4181717768" sldId="259"/>
+            <ac:spMk id="2063" creationId="{38FAA1A1-D861-433F-88FA-1E9D6FD31D11}"/>
+          </ac:spMkLst>
+        </pc:spChg>
+        <pc:spChg chg="add">
+          <ac:chgData name="Alexander Hahn" userId="56d4792ddc6be58c" providerId="LiveId" clId="{056C6563-87CA-9F41-86EA-9A3B7E1F5939}" dt="2024-06-18T07:20:13.493" v="231" actId="26606"/>
+          <ac:spMkLst>
+            <pc:docMk/>
+            <pc:sldMk cId="4181717768" sldId="259"/>
+            <ac:spMk id="2065" creationId="{8D71EDA1-87BF-4D5D-AB79-F346FD19278A}"/>
+          </ac:spMkLst>
+        </pc:spChg>
+        <pc:picChg chg="del">
+          <ac:chgData name="Alexander Hahn" userId="56d4792ddc6be58c" providerId="LiveId" clId="{056C6563-87CA-9F41-86EA-9A3B7E1F5939}" dt="2024-06-18T07:19:47.294" v="226" actId="478"/>
+          <ac:picMkLst>
+            <pc:docMk/>
+            <pc:sldMk cId="4181717768" sldId="259"/>
+            <ac:picMk id="9" creationId="{444A99C5-CF23-804A-F83E-67BBD63F00E6}"/>
+          </ac:picMkLst>
+        </pc:picChg>
+        <pc:picChg chg="add mod">
+          <ac:chgData name="Alexander Hahn" userId="56d4792ddc6be58c" providerId="LiveId" clId="{056C6563-87CA-9F41-86EA-9A3B7E1F5939}" dt="2024-06-18T07:22:18.915" v="257"/>
+          <ac:picMkLst>
+            <pc:docMk/>
+            <pc:sldMk cId="4181717768" sldId="259"/>
+            <ac:picMk id="2050" creationId="{F69765AE-B27C-C716-1CBC-65BBE43111B7}"/>
+          </ac:picMkLst>
+        </pc:picChg>
+      </pc:sldChg>
+      <pc:sldChg chg="addSp delSp modSp mod setBg">
+        <pc:chgData name="Alexander Hahn" userId="56d4792ddc6be58c" providerId="LiveId" clId="{056C6563-87CA-9F41-86EA-9A3B7E1F5939}" dt="2024-06-18T07:10:09.409" v="149" actId="1076"/>
         <pc:sldMkLst>
           <pc:docMk/>
           <pc:sldMk cId="3575696004" sldId="260"/>
@@ -222,7 +375,15 @@
           </ac:spMkLst>
         </pc:spChg>
         <pc:picChg chg="add mod">
-          <ac:chgData name="Alexander Hahn" userId="56d4792ddc6be58c" providerId="LiveId" clId="{056C6563-87CA-9F41-86EA-9A3B7E1F5939}" dt="2024-06-17T07:42:16.086" v="24" actId="26606"/>
+          <ac:chgData name="Alexander Hahn" userId="56d4792ddc6be58c" providerId="LiveId" clId="{056C6563-87CA-9F41-86EA-9A3B7E1F5939}" dt="2024-06-18T07:10:09.409" v="149" actId="1076"/>
+          <ac:picMkLst>
+            <pc:docMk/>
+            <pc:sldMk cId="3575696004" sldId="260"/>
+            <ac:picMk id="4" creationId="{B0D6BA97-3EF3-B59C-33C6-BDF1AD85E8EA}"/>
+          </ac:picMkLst>
+        </pc:picChg>
+        <pc:picChg chg="add del mod">
+          <ac:chgData name="Alexander Hahn" userId="56d4792ddc6be58c" providerId="LiveId" clId="{056C6563-87CA-9F41-86EA-9A3B7E1F5939}" dt="2024-06-18T07:08:33.464" v="69" actId="478"/>
           <ac:picMkLst>
             <pc:docMk/>
             <pc:sldMk cId="3575696004" sldId="260"/>
@@ -230,14 +391,14 @@
           </ac:picMkLst>
         </pc:picChg>
       </pc:sldChg>
-      <pc:sldChg chg="addSp delSp modSp new mod setBg setClrOvrMap chgLayout">
-        <pc:chgData name="Alexander Hahn" userId="56d4792ddc6be58c" providerId="LiveId" clId="{056C6563-87CA-9F41-86EA-9A3B7E1F5939}" dt="2024-06-17T07:45:25.861" v="54" actId="26606"/>
+      <pc:sldChg chg="addSp delSp modSp new mod ord setBg modClrScheme setClrOvrMap delDesignElem chgLayout">
+        <pc:chgData name="Alexander Hahn" userId="56d4792ddc6be58c" providerId="LiveId" clId="{056C6563-87CA-9F41-86EA-9A3B7E1F5939}" dt="2024-06-18T07:27:45.486" v="441" actId="20577"/>
         <pc:sldMkLst>
           <pc:docMk/>
           <pc:sldMk cId="2778858687" sldId="261"/>
         </pc:sldMkLst>
         <pc:spChg chg="mod ord">
-          <ac:chgData name="Alexander Hahn" userId="56d4792ddc6be58c" providerId="LiveId" clId="{056C6563-87CA-9F41-86EA-9A3B7E1F5939}" dt="2024-06-17T07:45:25.861" v="54" actId="26606"/>
+          <ac:chgData name="Alexander Hahn" userId="56d4792ddc6be58c" providerId="LiveId" clId="{056C6563-87CA-9F41-86EA-9A3B7E1F5939}" dt="2024-06-18T07:27:45.486" v="441" actId="20577"/>
           <ac:spMkLst>
             <pc:docMk/>
             <pc:sldMk cId="2778858687" sldId="261"/>
@@ -252,6 +413,30 @@
             <ac:spMk id="3" creationId="{7A3B3A14-0962-06E0-DD19-BDC4F89B6B5F}"/>
           </ac:spMkLst>
         </pc:spChg>
+        <pc:spChg chg="add del mod">
+          <ac:chgData name="Alexander Hahn" userId="56d4792ddc6be58c" providerId="LiveId" clId="{056C6563-87CA-9F41-86EA-9A3B7E1F5939}" dt="2024-06-18T07:12:56.082" v="191" actId="478"/>
+          <ac:spMkLst>
+            <pc:docMk/>
+            <pc:sldMk cId="2778858687" sldId="261"/>
+            <ac:spMk id="4" creationId="{A36E0ADC-14DA-B858-70DE-78047132197E}"/>
+          </ac:spMkLst>
+        </pc:spChg>
+        <pc:spChg chg="add del mod ord">
+          <ac:chgData name="Alexander Hahn" userId="56d4792ddc6be58c" providerId="LiveId" clId="{056C6563-87CA-9F41-86EA-9A3B7E1F5939}" dt="2024-06-18T07:13:08.137" v="194" actId="478"/>
+          <ac:spMkLst>
+            <pc:docMk/>
+            <pc:sldMk cId="2778858687" sldId="261"/>
+            <ac:spMk id="5" creationId="{BC1BE9D0-70F9-16E7-D8F6-7D6DB6194C2D}"/>
+          </ac:spMkLst>
+        </pc:spChg>
+        <pc:spChg chg="add del mod ord">
+          <ac:chgData name="Alexander Hahn" userId="56d4792ddc6be58c" providerId="LiveId" clId="{056C6563-87CA-9F41-86EA-9A3B7E1F5939}" dt="2024-06-18T07:27:22.951" v="391" actId="700"/>
+          <ac:spMkLst>
+            <pc:docMk/>
+            <pc:sldMk cId="2778858687" sldId="261"/>
+            <ac:spMk id="6" creationId="{4FF1ED09-02E9-DD75-AF69-11B01BB2E7B9}"/>
+          </ac:spMkLst>
+        </pc:spChg>
         <pc:spChg chg="add del mod ord">
           <ac:chgData name="Alexander Hahn" userId="56d4792ddc6be58c" providerId="LiveId" clId="{056C6563-87CA-9F41-86EA-9A3B7E1F5939}" dt="2024-06-17T07:45:10.262" v="50" actId="931"/>
           <ac:spMkLst>
@@ -260,8 +445,8 @@
             <ac:spMk id="7" creationId="{D0444CA0-12E9-3EB3-613B-F25919A6D030}"/>
           </ac:spMkLst>
         </pc:spChg>
-        <pc:spChg chg="add mod">
-          <ac:chgData name="Alexander Hahn" userId="56d4792ddc6be58c" providerId="LiveId" clId="{056C6563-87CA-9F41-86EA-9A3B7E1F5939}" dt="2024-06-17T07:45:17.066" v="52" actId="26606"/>
+        <pc:spChg chg="add del mod ord">
+          <ac:chgData name="Alexander Hahn" userId="56d4792ddc6be58c" providerId="LiveId" clId="{056C6563-87CA-9F41-86EA-9A3B7E1F5939}" dt="2024-06-18T07:25:27.921" v="389" actId="478"/>
           <ac:spMkLst>
             <pc:docMk/>
             <pc:sldMk cId="2778858687" sldId="261"/>
@@ -301,11 +486,27 @@
           </ac:spMkLst>
         </pc:spChg>
         <pc:spChg chg="add del">
+          <ac:chgData name="Alexander Hahn" userId="56d4792ddc6be58c" providerId="LiveId" clId="{056C6563-87CA-9F41-86EA-9A3B7E1F5939}" dt="2024-06-18T07:27:28.400" v="392" actId="26606"/>
+          <ac:spMkLst>
+            <pc:docMk/>
+            <pc:sldMk cId="2778858687" sldId="261"/>
+            <ac:spMk id="16" creationId="{6F5A5072-7B47-4D32-B52A-4EBBF590B8A5}"/>
+          </ac:spMkLst>
+        </pc:spChg>
+        <pc:spChg chg="add del">
           <ac:chgData name="Alexander Hahn" userId="56d4792ddc6be58c" providerId="LiveId" clId="{056C6563-87CA-9F41-86EA-9A3B7E1F5939}" dt="2024-06-17T07:45:25.861" v="54" actId="26606"/>
           <ac:spMkLst>
             <pc:docMk/>
             <pc:sldMk cId="2778858687" sldId="261"/>
             <ac:spMk id="17" creationId="{1B15ED52-F352-441B-82BF-E0EA34836D08}"/>
+          </ac:spMkLst>
+        </pc:spChg>
+        <pc:spChg chg="add del">
+          <ac:chgData name="Alexander Hahn" userId="56d4792ddc6be58c" providerId="LiveId" clId="{056C6563-87CA-9F41-86EA-9A3B7E1F5939}" dt="2024-06-18T07:27:28.400" v="392" actId="26606"/>
+          <ac:spMkLst>
+            <pc:docMk/>
+            <pc:sldMk cId="2778858687" sldId="261"/>
+            <ac:spMk id="18" creationId="{9715DAF0-AE1B-46C9-8A6B-DB2AA05AB91D}"/>
           </ac:spMkLst>
         </pc:spChg>
         <pc:spChg chg="add del">
@@ -317,11 +518,35 @@
           </ac:spMkLst>
         </pc:spChg>
         <pc:spChg chg="add del">
+          <ac:chgData name="Alexander Hahn" userId="56d4792ddc6be58c" providerId="LiveId" clId="{056C6563-87CA-9F41-86EA-9A3B7E1F5939}" dt="2024-06-18T07:27:28.400" v="392" actId="26606"/>
+          <ac:spMkLst>
+            <pc:docMk/>
+            <pc:sldMk cId="2778858687" sldId="261"/>
+            <ac:spMk id="20" creationId="{6016219D-510E-4184-9090-6D5578A87BD1}"/>
+          </ac:spMkLst>
+        </pc:spChg>
+        <pc:spChg chg="add del">
+          <ac:chgData name="Alexander Hahn" userId="56d4792ddc6be58c" providerId="LiveId" clId="{056C6563-87CA-9F41-86EA-9A3B7E1F5939}" dt="2024-06-18T07:27:28.400" v="392" actId="26606"/>
+          <ac:spMkLst>
+            <pc:docMk/>
+            <pc:sldMk cId="2778858687" sldId="261"/>
+            <ac:spMk id="22" creationId="{AFF4A713-7B75-4B21-90D7-5AB19547C728}"/>
+          </ac:spMkLst>
+        </pc:spChg>
+        <pc:spChg chg="add del">
           <ac:chgData name="Alexander Hahn" userId="56d4792ddc6be58c" providerId="LiveId" clId="{056C6563-87CA-9F41-86EA-9A3B7E1F5939}" dt="2024-06-17T07:45:25.861" v="54" actId="26606"/>
           <ac:spMkLst>
             <pc:docMk/>
             <pc:sldMk cId="2778858687" sldId="261"/>
             <ac:spMk id="23" creationId="{375E0459-6403-40CD-989D-56A4407CA12E}"/>
+          </ac:spMkLst>
+        </pc:spChg>
+        <pc:spChg chg="add del">
+          <ac:chgData name="Alexander Hahn" userId="56d4792ddc6be58c" providerId="LiveId" clId="{056C6563-87CA-9F41-86EA-9A3B7E1F5939}" dt="2024-06-18T07:27:28.400" v="392" actId="26606"/>
+          <ac:spMkLst>
+            <pc:docMk/>
+            <pc:sldMk cId="2778858687" sldId="261"/>
+            <ac:spMk id="24" creationId="{DC631C0B-6DA6-4E57-8231-CE32B3434A7E}"/>
           </ac:spMkLst>
         </pc:spChg>
         <pc:spChg chg="add del">
@@ -332,8 +557,16 @@
             <ac:spMk id="25" creationId="{53E5B1A8-3AC9-4BD1-9BBC-78CA94F2D1BA}"/>
           </ac:spMkLst>
         </pc:spChg>
-        <pc:spChg chg="add">
-          <ac:chgData name="Alexander Hahn" userId="56d4792ddc6be58c" providerId="LiveId" clId="{056C6563-87CA-9F41-86EA-9A3B7E1F5939}" dt="2024-06-17T07:45:25.861" v="54" actId="26606"/>
+        <pc:spChg chg="add del">
+          <ac:chgData name="Alexander Hahn" userId="56d4792ddc6be58c" providerId="LiveId" clId="{056C6563-87CA-9F41-86EA-9A3B7E1F5939}" dt="2024-06-18T07:27:28.400" v="392" actId="26606"/>
+          <ac:spMkLst>
+            <pc:docMk/>
+            <pc:sldMk cId="2778858687" sldId="261"/>
+            <ac:spMk id="26" creationId="{C29501E6-A978-4A61-9689-9085AF97A53A}"/>
+          </ac:spMkLst>
+        </pc:spChg>
+        <pc:spChg chg="add del">
+          <ac:chgData name="Alexander Hahn" userId="56d4792ddc6be58c" providerId="LiveId" clId="{056C6563-87CA-9F41-86EA-9A3B7E1F5939}" dt="2024-06-18T07:13:01.330" v="192" actId="700"/>
           <ac:spMkLst>
             <pc:docMk/>
             <pc:sldMk cId="2778858687" sldId="261"/>
@@ -341,7 +574,15 @@
           </ac:spMkLst>
         </pc:spChg>
         <pc:spChg chg="add">
-          <ac:chgData name="Alexander Hahn" userId="56d4792ddc6be58c" providerId="LiveId" clId="{056C6563-87CA-9F41-86EA-9A3B7E1F5939}" dt="2024-06-17T07:45:25.861" v="54" actId="26606"/>
+          <ac:chgData name="Alexander Hahn" userId="56d4792ddc6be58c" providerId="LiveId" clId="{056C6563-87CA-9F41-86EA-9A3B7E1F5939}" dt="2024-06-18T07:27:28.400" v="392" actId="26606"/>
+          <ac:spMkLst>
+            <pc:docMk/>
+            <pc:sldMk cId="2778858687" sldId="261"/>
+            <ac:spMk id="31" creationId="{0E30439A-8A5B-46EC-8283-9B6B031D40D0}"/>
+          </ac:spMkLst>
+        </pc:spChg>
+        <pc:spChg chg="add del">
+          <ac:chgData name="Alexander Hahn" userId="56d4792ddc6be58c" providerId="LiveId" clId="{056C6563-87CA-9F41-86EA-9A3B7E1F5939}" dt="2024-06-18T07:13:01.330" v="192" actId="700"/>
           <ac:spMkLst>
             <pc:docMk/>
             <pc:sldMk cId="2778858687" sldId="261"/>
@@ -349,7 +590,15 @@
           </ac:spMkLst>
         </pc:spChg>
         <pc:spChg chg="add">
-          <ac:chgData name="Alexander Hahn" userId="56d4792ddc6be58c" providerId="LiveId" clId="{056C6563-87CA-9F41-86EA-9A3B7E1F5939}" dt="2024-06-17T07:45:25.861" v="54" actId="26606"/>
+          <ac:chgData name="Alexander Hahn" userId="56d4792ddc6be58c" providerId="LiveId" clId="{056C6563-87CA-9F41-86EA-9A3B7E1F5939}" dt="2024-06-18T07:27:28.400" v="392" actId="26606"/>
+          <ac:spMkLst>
+            <pc:docMk/>
+            <pc:sldMk cId="2778858687" sldId="261"/>
+            <ac:spMk id="33" creationId="{5CEAD642-85CF-4750-8432-7C80C901F001}"/>
+          </ac:spMkLst>
+        </pc:spChg>
+        <pc:spChg chg="add del">
+          <ac:chgData name="Alexander Hahn" userId="56d4792ddc6be58c" providerId="LiveId" clId="{056C6563-87CA-9F41-86EA-9A3B7E1F5939}" dt="2024-06-18T07:13:01.330" v="192" actId="700"/>
           <ac:spMkLst>
             <pc:docMk/>
             <pc:sldMk cId="2778858687" sldId="261"/>
@@ -357,11 +606,75 @@
           </ac:spMkLst>
         </pc:spChg>
         <pc:spChg chg="add">
-          <ac:chgData name="Alexander Hahn" userId="56d4792ddc6be58c" providerId="LiveId" clId="{056C6563-87CA-9F41-86EA-9A3B7E1F5939}" dt="2024-06-17T07:45:25.861" v="54" actId="26606"/>
+          <ac:chgData name="Alexander Hahn" userId="56d4792ddc6be58c" providerId="LiveId" clId="{056C6563-87CA-9F41-86EA-9A3B7E1F5939}" dt="2024-06-18T07:27:28.400" v="392" actId="26606"/>
+          <ac:spMkLst>
+            <pc:docMk/>
+            <pc:sldMk cId="2778858687" sldId="261"/>
+            <ac:spMk id="35" creationId="{FA33EEAE-15D5-4119-8C1E-89D943F911EF}"/>
+          </ac:spMkLst>
+        </pc:spChg>
+        <pc:spChg chg="add del">
+          <ac:chgData name="Alexander Hahn" userId="56d4792ddc6be58c" providerId="LiveId" clId="{056C6563-87CA-9F41-86EA-9A3B7E1F5939}" dt="2024-06-18T07:13:01.330" v="192" actId="700"/>
           <ac:spMkLst>
             <pc:docMk/>
             <pc:sldMk cId="2778858687" sldId="261"/>
             <ac:spMk id="36" creationId="{A7009A0A-BEF5-4EAC-AF15-E4F9F002E239}"/>
+          </ac:spMkLst>
+        </pc:spChg>
+        <pc:spChg chg="add">
+          <ac:chgData name="Alexander Hahn" userId="56d4792ddc6be58c" providerId="LiveId" clId="{056C6563-87CA-9F41-86EA-9A3B7E1F5939}" dt="2024-06-18T07:27:28.400" v="392" actId="26606"/>
+          <ac:spMkLst>
+            <pc:docMk/>
+            <pc:sldMk cId="2778858687" sldId="261"/>
+            <ac:spMk id="37" creationId="{730D8B3B-9B80-4025-B934-26DC7D7CD231}"/>
+          </ac:spMkLst>
+        </pc:spChg>
+        <pc:spChg chg="add">
+          <ac:chgData name="Alexander Hahn" userId="56d4792ddc6be58c" providerId="LiveId" clId="{056C6563-87CA-9F41-86EA-9A3B7E1F5939}" dt="2024-06-18T07:27:28.400" v="392" actId="26606"/>
+          <ac:spMkLst>
+            <pc:docMk/>
+            <pc:sldMk cId="2778858687" sldId="261"/>
+            <ac:spMk id="39" creationId="{B5A1B09C-1565-46F8-B70F-621C5EB48A09}"/>
+          </ac:spMkLst>
+        </pc:spChg>
+        <pc:spChg chg="add">
+          <ac:chgData name="Alexander Hahn" userId="56d4792ddc6be58c" providerId="LiveId" clId="{056C6563-87CA-9F41-86EA-9A3B7E1F5939}" dt="2024-06-18T07:27:28.400" v="392" actId="26606"/>
+          <ac:spMkLst>
+            <pc:docMk/>
+            <pc:sldMk cId="2778858687" sldId="261"/>
+            <ac:spMk id="41" creationId="{8C516CC8-80AC-446C-A56E-9F54B7210402}"/>
+          </ac:spMkLst>
+        </pc:spChg>
+        <pc:spChg chg="add">
+          <ac:chgData name="Alexander Hahn" userId="56d4792ddc6be58c" providerId="LiveId" clId="{056C6563-87CA-9F41-86EA-9A3B7E1F5939}" dt="2024-06-18T07:27:28.400" v="392" actId="26606"/>
+          <ac:spMkLst>
+            <pc:docMk/>
+            <pc:sldMk cId="2778858687" sldId="261"/>
+            <ac:spMk id="43" creationId="{53947E58-F088-49F1-A3D1-DEA690192E84}"/>
+          </ac:spMkLst>
+        </pc:spChg>
+        <pc:spChg chg="add del">
+          <ac:chgData name="Alexander Hahn" userId="56d4792ddc6be58c" providerId="LiveId" clId="{056C6563-87CA-9F41-86EA-9A3B7E1F5939}" dt="2024-06-18T07:12:40.278" v="153" actId="26606"/>
+          <ac:spMkLst>
+            <pc:docMk/>
+            <pc:sldMk cId="2778858687" sldId="261"/>
+            <ac:spMk id="1031" creationId="{32AEEBC8-9D30-42EF-95F2-386C2653FBF0}"/>
+          </ac:spMkLst>
+        </pc:spChg>
+        <pc:spChg chg="add del">
+          <ac:chgData name="Alexander Hahn" userId="56d4792ddc6be58c" providerId="LiveId" clId="{056C6563-87CA-9F41-86EA-9A3B7E1F5939}" dt="2024-06-18T07:12:40.278" v="153" actId="26606"/>
+          <ac:spMkLst>
+            <pc:docMk/>
+            <pc:sldMk cId="2778858687" sldId="261"/>
+            <ac:spMk id="1033" creationId="{3529E97A-97C3-40EA-8A04-5C02398D568F}"/>
+          </ac:spMkLst>
+        </pc:spChg>
+        <pc:spChg chg="add del">
+          <ac:chgData name="Alexander Hahn" userId="56d4792ddc6be58c" providerId="LiveId" clId="{056C6563-87CA-9F41-86EA-9A3B7E1F5939}" dt="2024-06-18T07:12:40.278" v="153" actId="26606"/>
+          <ac:spMkLst>
+            <pc:docMk/>
+            <pc:sldMk cId="2778858687" sldId="261"/>
+            <ac:spMk id="1035" creationId="{59FA8C2E-A5A7-4490-927A-7CD58343EDBB}"/>
           </ac:spMkLst>
         </pc:spChg>
         <pc:grpChg chg="add del">
@@ -396,23 +709,31 @@
             <ac:picMk id="6" creationId="{19930EA2-8AFD-650A-2AAD-9FC0CE8E5F35}"/>
           </ac:picMkLst>
         </pc:picChg>
-        <pc:picChg chg="add mod">
-          <ac:chgData name="Alexander Hahn" userId="56d4792ddc6be58c" providerId="LiveId" clId="{056C6563-87CA-9F41-86EA-9A3B7E1F5939}" dt="2024-06-17T07:45:25.861" v="54" actId="26606"/>
+        <pc:picChg chg="add del mod">
+          <ac:chgData name="Alexander Hahn" userId="56d4792ddc6be58c" providerId="LiveId" clId="{056C6563-87CA-9F41-86EA-9A3B7E1F5939}" dt="2024-06-18T07:10:26.030" v="150" actId="478"/>
           <ac:picMkLst>
             <pc:docMk/>
             <pc:sldMk cId="2778858687" sldId="261"/>
             <ac:picMk id="9" creationId="{7852D209-7032-5E85-7580-74635263AA36}"/>
           </ac:picMkLst>
         </pc:picChg>
+        <pc:picChg chg="add del mod">
+          <ac:chgData name="Alexander Hahn" userId="56d4792ddc6be58c" providerId="LiveId" clId="{056C6563-87CA-9F41-86EA-9A3B7E1F5939}" dt="2024-06-18T07:12:42.294" v="154" actId="478"/>
+          <ac:picMkLst>
+            <pc:docMk/>
+            <pc:sldMk cId="2778858687" sldId="261"/>
+            <ac:picMk id="1026" creationId="{91C018E8-427F-1710-9DA0-4425682579A0}"/>
+          </ac:picMkLst>
+        </pc:picChg>
       </pc:sldChg>
-      <pc:sldChg chg="addSp delSp modSp new mod setBg">
-        <pc:chgData name="Alexander Hahn" userId="56d4792ddc6be58c" providerId="LiveId" clId="{056C6563-87CA-9F41-86EA-9A3B7E1F5939}" dt="2024-06-17T07:45:21.409" v="53" actId="26606"/>
+      <pc:sldChg chg="addSp delSp modSp new mod ord setBg">
+        <pc:chgData name="Alexander Hahn" userId="56d4792ddc6be58c" providerId="LiveId" clId="{056C6563-87CA-9F41-86EA-9A3B7E1F5939}" dt="2024-06-18T07:25:08.895" v="388" actId="20578"/>
         <pc:sldMkLst>
           <pc:docMk/>
           <pc:sldMk cId="1842017856" sldId="262"/>
         </pc:sldMkLst>
         <pc:spChg chg="mod">
-          <ac:chgData name="Alexander Hahn" userId="56d4792ddc6be58c" providerId="LiveId" clId="{056C6563-87CA-9F41-86EA-9A3B7E1F5939}" dt="2024-06-17T07:45:21.409" v="53" actId="26606"/>
+          <ac:chgData name="Alexander Hahn" userId="56d4792ddc6be58c" providerId="LiveId" clId="{056C6563-87CA-9F41-86EA-9A3B7E1F5939}" dt="2024-06-18T07:15:52.134" v="212" actId="26606"/>
           <ac:spMkLst>
             <pc:docMk/>
             <pc:sldMk cId="1842017856" sldId="262"/>
@@ -427,54 +748,214 @@
             <ac:spMk id="3" creationId="{6FC87C11-9911-49D8-365C-1428455D4221}"/>
           </ac:spMkLst>
         </pc:spChg>
-        <pc:spChg chg="add">
-          <ac:chgData name="Alexander Hahn" userId="56d4792ddc6be58c" providerId="LiveId" clId="{056C6563-87CA-9F41-86EA-9A3B7E1F5939}" dt="2024-06-17T07:45:21.409" v="53" actId="26606"/>
+        <pc:spChg chg="add del mod">
+          <ac:chgData name="Alexander Hahn" userId="56d4792ddc6be58c" providerId="LiveId" clId="{056C6563-87CA-9F41-86EA-9A3B7E1F5939}" dt="2024-06-18T07:15:29.371" v="202"/>
+          <ac:spMkLst>
+            <pc:docMk/>
+            <pc:sldMk cId="1842017856" sldId="262"/>
+            <ac:spMk id="4" creationId="{E3B477B6-72E8-C2BC-7558-090DC82974BC}"/>
+          </ac:spMkLst>
+        </pc:spChg>
+        <pc:spChg chg="add del">
+          <ac:chgData name="Alexander Hahn" userId="56d4792ddc6be58c" providerId="LiveId" clId="{056C6563-87CA-9F41-86EA-9A3B7E1F5939}" dt="2024-06-18T07:15:52.134" v="212" actId="26606"/>
           <ac:spMkLst>
             <pc:docMk/>
             <pc:sldMk cId="1842017856" sldId="262"/>
             <ac:spMk id="10" creationId="{A8384FB5-9ADC-4DDC-881B-597D56F5B15D}"/>
           </ac:spMkLst>
         </pc:spChg>
-        <pc:spChg chg="add">
-          <ac:chgData name="Alexander Hahn" userId="56d4792ddc6be58c" providerId="LiveId" clId="{056C6563-87CA-9F41-86EA-9A3B7E1F5939}" dt="2024-06-17T07:45:21.409" v="53" actId="26606"/>
+        <pc:spChg chg="add del">
+          <ac:chgData name="Alexander Hahn" userId="56d4792ddc6be58c" providerId="LiveId" clId="{056C6563-87CA-9F41-86EA-9A3B7E1F5939}" dt="2024-06-18T07:15:52.134" v="212" actId="26606"/>
           <ac:spMkLst>
             <pc:docMk/>
             <pc:sldMk cId="1842017856" sldId="262"/>
             <ac:spMk id="12" creationId="{91E5A9A7-95C6-4F4F-B00E-C82E07FE62EF}"/>
           </ac:spMkLst>
         </pc:spChg>
-        <pc:spChg chg="add">
-          <ac:chgData name="Alexander Hahn" userId="56d4792ddc6be58c" providerId="LiveId" clId="{056C6563-87CA-9F41-86EA-9A3B7E1F5939}" dt="2024-06-17T07:45:21.409" v="53" actId="26606"/>
+        <pc:spChg chg="add del">
+          <ac:chgData name="Alexander Hahn" userId="56d4792ddc6be58c" providerId="LiveId" clId="{056C6563-87CA-9F41-86EA-9A3B7E1F5939}" dt="2024-06-18T07:15:52.134" v="212" actId="26606"/>
           <ac:spMkLst>
             <pc:docMk/>
             <pc:sldMk cId="1842017856" sldId="262"/>
             <ac:spMk id="14" creationId="{D07DD2DE-F619-49DD-B5E7-03A290FF4ED1}"/>
           </ac:spMkLst>
         </pc:spChg>
-        <pc:spChg chg="add">
-          <ac:chgData name="Alexander Hahn" userId="56d4792ddc6be58c" providerId="LiveId" clId="{056C6563-87CA-9F41-86EA-9A3B7E1F5939}" dt="2024-06-17T07:45:21.409" v="53" actId="26606"/>
+        <pc:spChg chg="add del">
+          <ac:chgData name="Alexander Hahn" userId="56d4792ddc6be58c" providerId="LiveId" clId="{056C6563-87CA-9F41-86EA-9A3B7E1F5939}" dt="2024-06-18T07:15:52.134" v="212" actId="26606"/>
           <ac:spMkLst>
             <pc:docMk/>
             <pc:sldMk cId="1842017856" sldId="262"/>
             <ac:spMk id="16" creationId="{85149191-5F60-4A28-AAFF-039F96B0F3EC}"/>
           </ac:spMkLst>
         </pc:spChg>
-        <pc:spChg chg="add">
-          <ac:chgData name="Alexander Hahn" userId="56d4792ddc6be58c" providerId="LiveId" clId="{056C6563-87CA-9F41-86EA-9A3B7E1F5939}" dt="2024-06-17T07:45:21.409" v="53" actId="26606"/>
+        <pc:spChg chg="add del">
+          <ac:chgData name="Alexander Hahn" userId="56d4792ddc6be58c" providerId="LiveId" clId="{056C6563-87CA-9F41-86EA-9A3B7E1F5939}" dt="2024-06-18T07:15:52.134" v="212" actId="26606"/>
           <ac:spMkLst>
             <pc:docMk/>
             <pc:sldMk cId="1842017856" sldId="262"/>
             <ac:spMk id="18" creationId="{F8260ED5-17F7-4158-B241-D51DD4CF1B7E}"/>
           </ac:spMkLst>
         </pc:spChg>
-        <pc:picChg chg="add mod">
-          <ac:chgData name="Alexander Hahn" userId="56d4792ddc6be58c" providerId="LiveId" clId="{056C6563-87CA-9F41-86EA-9A3B7E1F5939}" dt="2024-06-17T07:45:21.409" v="53" actId="26606"/>
+        <pc:spChg chg="add">
+          <ac:chgData name="Alexander Hahn" userId="56d4792ddc6be58c" providerId="LiveId" clId="{056C6563-87CA-9F41-86EA-9A3B7E1F5939}" dt="2024-06-18T07:15:52.134" v="212" actId="26606"/>
+          <ac:spMkLst>
+            <pc:docMk/>
+            <pc:sldMk cId="1842017856" sldId="262"/>
+            <ac:spMk id="20" creationId="{A8384FB5-9ADC-4DDC-881B-597D56F5B15D}"/>
+          </ac:spMkLst>
+        </pc:spChg>
+        <pc:spChg chg="add">
+          <ac:chgData name="Alexander Hahn" userId="56d4792ddc6be58c" providerId="LiveId" clId="{056C6563-87CA-9F41-86EA-9A3B7E1F5939}" dt="2024-06-18T07:15:52.134" v="212" actId="26606"/>
+          <ac:spMkLst>
+            <pc:docMk/>
+            <pc:sldMk cId="1842017856" sldId="262"/>
+            <ac:spMk id="21" creationId="{1199E1B1-A8C0-4FE8-A5A8-1CB41D69F857}"/>
+          </ac:spMkLst>
+        </pc:spChg>
+        <pc:spChg chg="add del">
+          <ac:chgData name="Alexander Hahn" userId="56d4792ddc6be58c" providerId="LiveId" clId="{056C6563-87CA-9F41-86EA-9A3B7E1F5939}" dt="2024-06-18T07:15:38.681" v="207" actId="26606"/>
+          <ac:spMkLst>
+            <pc:docMk/>
+            <pc:sldMk cId="1842017856" sldId="262"/>
+            <ac:spMk id="22" creationId="{AE197F30-F71D-8B02-8826-021EFDE2125F}"/>
+          </ac:spMkLst>
+        </pc:spChg>
+        <pc:spChg chg="add del">
+          <ac:chgData name="Alexander Hahn" userId="56d4792ddc6be58c" providerId="LiveId" clId="{056C6563-87CA-9F41-86EA-9A3B7E1F5939}" dt="2024-06-18T07:15:36.444" v="205" actId="26606"/>
+          <ac:spMkLst>
+            <pc:docMk/>
+            <pc:sldMk cId="1842017856" sldId="262"/>
+            <ac:spMk id="23" creationId="{F0DCC097-1DB8-4B6D-85D0-6FBA0E1CA4BA}"/>
+          </ac:spMkLst>
+        </pc:spChg>
+        <pc:spChg chg="add">
+          <ac:chgData name="Alexander Hahn" userId="56d4792ddc6be58c" providerId="LiveId" clId="{056C6563-87CA-9F41-86EA-9A3B7E1F5939}" dt="2024-06-18T07:15:52.134" v="212" actId="26606"/>
+          <ac:spMkLst>
+            <pc:docMk/>
+            <pc:sldMk cId="1842017856" sldId="262"/>
+            <ac:spMk id="24" creationId="{84A8DE83-DE75-4B41-9DB4-A7EC0B0DEC0B}"/>
+          </ac:spMkLst>
+        </pc:spChg>
+        <pc:spChg chg="add del">
+          <ac:chgData name="Alexander Hahn" userId="56d4792ddc6be58c" providerId="LiveId" clId="{056C6563-87CA-9F41-86EA-9A3B7E1F5939}" dt="2024-06-18T07:15:36.444" v="205" actId="26606"/>
+          <ac:spMkLst>
+            <pc:docMk/>
+            <pc:sldMk cId="1842017856" sldId="262"/>
+            <ac:spMk id="25" creationId="{E0B58608-23C8-4441-994D-C6823EEE1DB7}"/>
+          </ac:spMkLst>
+        </pc:spChg>
+        <pc:spChg chg="add">
+          <ac:chgData name="Alexander Hahn" userId="56d4792ddc6be58c" providerId="LiveId" clId="{056C6563-87CA-9F41-86EA-9A3B7E1F5939}" dt="2024-06-18T07:15:52.134" v="212" actId="26606"/>
+          <ac:spMkLst>
+            <pc:docMk/>
+            <pc:sldMk cId="1842017856" sldId="262"/>
+            <ac:spMk id="26" creationId="{A7009A0A-BEF5-4EAC-AF15-E4F9F002E239}"/>
+          </ac:spMkLst>
+        </pc:spChg>
+        <pc:spChg chg="add del">
+          <ac:chgData name="Alexander Hahn" userId="56d4792ddc6be58c" providerId="LiveId" clId="{056C6563-87CA-9F41-86EA-9A3B7E1F5939}" dt="2024-06-18T07:15:38.681" v="207" actId="26606"/>
+          <ac:spMkLst>
+            <pc:docMk/>
+            <pc:sldMk cId="1842017856" sldId="262"/>
+            <ac:spMk id="27" creationId="{3B2E3793-BFE6-45A2-9B7B-E18844431C99}"/>
+          </ac:spMkLst>
+        </pc:spChg>
+        <pc:spChg chg="add del">
+          <ac:chgData name="Alexander Hahn" userId="56d4792ddc6be58c" providerId="LiveId" clId="{056C6563-87CA-9F41-86EA-9A3B7E1F5939}" dt="2024-06-18T07:15:38.681" v="207" actId="26606"/>
+          <ac:spMkLst>
+            <pc:docMk/>
+            <pc:sldMk cId="1842017856" sldId="262"/>
+            <ac:spMk id="28" creationId="{1B15ED52-F352-441B-82BF-E0EA34836D08}"/>
+          </ac:spMkLst>
+        </pc:spChg>
+        <pc:spChg chg="add del">
+          <ac:chgData name="Alexander Hahn" userId="56d4792ddc6be58c" providerId="LiveId" clId="{056C6563-87CA-9F41-86EA-9A3B7E1F5939}" dt="2024-06-18T07:15:38.681" v="207" actId="26606"/>
+          <ac:spMkLst>
+            <pc:docMk/>
+            <pc:sldMk cId="1842017856" sldId="262"/>
+            <ac:spMk id="29" creationId="{BC4C4868-CB8F-4AF9-9CDB-8108F2C19B67}"/>
+          </ac:spMkLst>
+        </pc:spChg>
+        <pc:spChg chg="add del">
+          <ac:chgData name="Alexander Hahn" userId="56d4792ddc6be58c" providerId="LiveId" clId="{056C6563-87CA-9F41-86EA-9A3B7E1F5939}" dt="2024-06-18T07:15:38.681" v="207" actId="26606"/>
+          <ac:spMkLst>
+            <pc:docMk/>
+            <pc:sldMk cId="1842017856" sldId="262"/>
+            <ac:spMk id="31" creationId="{375E0459-6403-40CD-989D-56A4407CA12E}"/>
+          </ac:spMkLst>
+        </pc:spChg>
+        <pc:spChg chg="add del">
+          <ac:chgData name="Alexander Hahn" userId="56d4792ddc6be58c" providerId="LiveId" clId="{056C6563-87CA-9F41-86EA-9A3B7E1F5939}" dt="2024-06-18T07:15:38.681" v="207" actId="26606"/>
+          <ac:spMkLst>
+            <pc:docMk/>
+            <pc:sldMk cId="1842017856" sldId="262"/>
+            <ac:spMk id="33" creationId="{53E5B1A8-3AC9-4BD1-9BBC-78CA94F2D1BA}"/>
+          </ac:spMkLst>
+        </pc:spChg>
+        <pc:spChg chg="add del">
+          <ac:chgData name="Alexander Hahn" userId="56d4792ddc6be58c" providerId="LiveId" clId="{056C6563-87CA-9F41-86EA-9A3B7E1F5939}" dt="2024-06-18T07:15:39.084" v="209" actId="26606"/>
+          <ac:spMkLst>
+            <pc:docMk/>
+            <pc:sldMk cId="1842017856" sldId="262"/>
+            <ac:spMk id="38" creationId="{23D09407-53BC-485E-B4CE-BC5E4FC4B25B}"/>
+          </ac:spMkLst>
+        </pc:spChg>
+        <pc:spChg chg="add del">
+          <ac:chgData name="Alexander Hahn" userId="56d4792ddc6be58c" providerId="LiveId" clId="{056C6563-87CA-9F41-86EA-9A3B7E1F5939}" dt="2024-06-18T07:15:39.084" v="209" actId="26606"/>
+          <ac:spMkLst>
+            <pc:docMk/>
+            <pc:sldMk cId="1842017856" sldId="262"/>
+            <ac:spMk id="39" creationId="{921DB988-49FC-4608-B0A2-E2F3A4019041}"/>
+          </ac:spMkLst>
+        </pc:spChg>
+        <pc:spChg chg="add del">
+          <ac:chgData name="Alexander Hahn" userId="56d4792ddc6be58c" providerId="LiveId" clId="{056C6563-87CA-9F41-86EA-9A3B7E1F5939}" dt="2024-06-18T07:15:40.236" v="211" actId="26606"/>
+          <ac:spMkLst>
+            <pc:docMk/>
+            <pc:sldMk cId="1842017856" sldId="262"/>
+            <ac:spMk id="46" creationId="{5E395AE0-8789-FAD6-A987-32E65C185100}"/>
+          </ac:spMkLst>
+        </pc:spChg>
+        <pc:grpChg chg="add del">
+          <ac:chgData name="Alexander Hahn" userId="56d4792ddc6be58c" providerId="LiveId" clId="{056C6563-87CA-9F41-86EA-9A3B7E1F5939}" dt="2024-06-18T07:15:39.084" v="209" actId="26606"/>
+          <ac:grpSpMkLst>
+            <pc:docMk/>
+            <pc:sldMk cId="1842017856" sldId="262"/>
+            <ac:grpSpMk id="40" creationId="{E9B930FD-8671-4C4C-ADCF-73AC1D0CD417}"/>
+          </ac:grpSpMkLst>
+        </pc:grpChg>
+        <pc:grpChg chg="add del">
+          <ac:chgData name="Alexander Hahn" userId="56d4792ddc6be58c" providerId="LiveId" clId="{056C6563-87CA-9F41-86EA-9A3B7E1F5939}" dt="2024-06-18T07:15:39.084" v="209" actId="26606"/>
+          <ac:grpSpMkLst>
+            <pc:docMk/>
+            <pc:sldMk cId="1842017856" sldId="262"/>
+            <ac:grpSpMk id="44" creationId="{383C2651-AE0C-4AE4-8725-E2F9414FE219}"/>
+          </ac:grpSpMkLst>
+        </pc:grpChg>
+        <pc:picChg chg="add del mod">
+          <ac:chgData name="Alexander Hahn" userId="56d4792ddc6be58c" providerId="LiveId" clId="{056C6563-87CA-9F41-86EA-9A3B7E1F5939}" dt="2024-06-18T07:15:27.045" v="201" actId="478"/>
           <ac:picMkLst>
             <pc:docMk/>
             <pc:sldMk cId="1842017856" sldId="262"/>
             <ac:picMk id="5" creationId="{DD2A62F2-1783-3A56-90F7-BB257B483076}"/>
           </ac:picMkLst>
         </pc:picChg>
+        <pc:picChg chg="add mod">
+          <ac:chgData name="Alexander Hahn" userId="56d4792ddc6be58c" providerId="LiveId" clId="{056C6563-87CA-9F41-86EA-9A3B7E1F5939}" dt="2024-06-18T07:15:52.134" v="212" actId="26606"/>
+          <ac:picMkLst>
+            <pc:docMk/>
+            <pc:sldMk cId="1842017856" sldId="262"/>
+            <ac:picMk id="7" creationId="{F1480E2A-AF53-0356-C859-20E30727ADCE}"/>
+          </ac:picMkLst>
+        </pc:picChg>
+        <pc:cxnChg chg="add del">
+          <ac:chgData name="Alexander Hahn" userId="56d4792ddc6be58c" providerId="LiveId" clId="{056C6563-87CA-9F41-86EA-9A3B7E1F5939}" dt="2024-06-18T07:15:40.236" v="211" actId="26606"/>
+          <ac:cxnSpMkLst>
+            <pc:docMk/>
+            <pc:sldMk cId="1842017856" sldId="262"/>
+            <ac:cxnSpMk id="47" creationId="{7667AA61-5C27-F30F-D229-06CBE5709F33}"/>
+          </ac:cxnSpMkLst>
+        </pc:cxnChg>
       </pc:sldChg>
       <pc:sldChg chg="addSp delSp modSp new mod setBg modClrScheme delDesignElem chgLayout">
         <pc:chgData name="Alexander Hahn" userId="56d4792ddc6be58c" providerId="LiveId" clId="{056C6563-87CA-9F41-86EA-9A3B7E1F5939}" dt="2024-06-17T07:45:59.347" v="68" actId="478"/>
@@ -1770,14 +2251,12 @@
         <a:blipFill>
           <a:blip xmlns:r="http://schemas.openxmlformats.org/officeDocument/2006/relationships" r:embed="rId5">
             <a:extLst>
-              <a:ext uri="{28A0092B-C50C-407E-A947-70E740481C1C}">
-                <a14:useLocalDpi xmlns:a14="http://schemas.microsoft.com/office/drawing/2010/main" val="0"/>
-              </a:ext>
               <a:ext uri="{96DAC541-7B7A-43D3-8B79-37D633B846F1}">
                 <asvg:svgBlip xmlns:asvg="http://schemas.microsoft.com/office/drawing/2016/SVG/main" r:embed="rId6"/>
               </a:ext>
             </a:extLst>
           </a:blip>
+          <a:srcRect/>
           <a:stretch>
             <a:fillRect/>
           </a:stretch>
@@ -1788,7 +2267,7 @@
       </dgm:spPr>
       <dgm:extLst>
         <a:ext uri="{E40237B7-FDA0-4F09-8148-C483321AD2D9}">
-          <dgm14:cNvPr xmlns:dgm14="http://schemas.microsoft.com/office/drawing/2010/diagram" id="0" name="" descr="Tanabata Tree"/>
+          <dgm14:cNvPr xmlns:dgm14="http://schemas.microsoft.com/office/drawing/2010/diagram" id="0" name="" descr="Server Silhouette"/>
         </a:ext>
       </dgm:extLst>
     </dgm:pt>
@@ -1819,14 +2298,12 @@
         <a:blipFill>
           <a:blip xmlns:r="http://schemas.openxmlformats.org/officeDocument/2006/relationships" r:embed="rId7">
             <a:extLst>
-              <a:ext uri="{28A0092B-C50C-407E-A947-70E740481C1C}">
-                <a14:useLocalDpi xmlns:a14="http://schemas.microsoft.com/office/drawing/2010/main" val="0"/>
-              </a:ext>
               <a:ext uri="{96DAC541-7B7A-43D3-8B79-37D633B846F1}">
                 <asvg:svgBlip xmlns:asvg="http://schemas.microsoft.com/office/drawing/2016/SVG/main" r:embed="rId8"/>
               </a:ext>
             </a:extLst>
           </a:blip>
+          <a:srcRect/>
           <a:stretch>
             <a:fillRect/>
           </a:stretch>
@@ -1837,7 +2314,7 @@
       </dgm:spPr>
       <dgm:extLst>
         <a:ext uri="{E40237B7-FDA0-4F09-8148-C483321AD2D9}">
-          <dgm14:cNvPr xmlns:dgm14="http://schemas.microsoft.com/office/drawing/2010/diagram" id="0" name="" descr="Untertitel"/>
+          <dgm14:cNvPr xmlns:dgm14="http://schemas.microsoft.com/office/drawing/2010/diagram" id="0" name="" descr="Kamera Silhouette"/>
         </a:ext>
       </dgm:extLst>
     </dgm:pt>
@@ -2196,14 +2673,12 @@
         <a:blipFill>
           <a:blip xmlns:r="http://schemas.openxmlformats.org/officeDocument/2006/relationships" r:embed="rId5">
             <a:extLst>
-              <a:ext uri="{28A0092B-C50C-407E-A947-70E740481C1C}">
-                <a14:useLocalDpi xmlns:a14="http://schemas.microsoft.com/office/drawing/2010/main" val="0"/>
-              </a:ext>
               <a:ext uri="{96DAC541-7B7A-43D3-8B79-37D633B846F1}">
                 <asvg:svgBlip xmlns:asvg="http://schemas.microsoft.com/office/drawing/2016/SVG/main" r:embed="rId6"/>
               </a:ext>
             </a:extLst>
           </a:blip>
+          <a:srcRect/>
           <a:stretch>
             <a:fillRect/>
           </a:stretch>
@@ -2337,14 +2812,12 @@
         <a:blipFill>
           <a:blip xmlns:r="http://schemas.openxmlformats.org/officeDocument/2006/relationships" r:embed="rId7">
             <a:extLst>
-              <a:ext uri="{28A0092B-C50C-407E-A947-70E740481C1C}">
-                <a14:useLocalDpi xmlns:a14="http://schemas.microsoft.com/office/drawing/2010/main" val="0"/>
-              </a:ext>
               <a:ext uri="{96DAC541-7B7A-43D3-8B79-37D633B846F1}">
                 <asvg:svgBlip xmlns:asvg="http://schemas.microsoft.com/office/drawing/2016/SVG/main" r:embed="rId8"/>
               </a:ext>
             </a:extLst>
           </a:blip>
+          <a:srcRect/>
           <a:stretch>
             <a:fillRect/>
           </a:stretch>
@@ -3690,6 +4163,440 @@
 </dgm:styleDef>
 </file>
 
+<file path=ppt/notesMasters/notesMaster1.xml><?xml version="1.0" encoding="utf-8"?>
+<p:notesMaster xmlns:a="http://schemas.openxmlformats.org/drawingml/2006/main" xmlns:r="http://schemas.openxmlformats.org/officeDocument/2006/relationships" xmlns:p="http://schemas.openxmlformats.org/presentationml/2006/main">
+  <p:cSld>
+    <p:bg>
+      <p:bgRef idx="1001">
+        <a:schemeClr val="bg1"/>
+      </p:bgRef>
+    </p:bg>
+    <p:spTree>
+      <p:nvGrpSpPr>
+        <p:cNvPr id="1" name=""/>
+        <p:cNvGrpSpPr/>
+        <p:nvPr/>
+      </p:nvGrpSpPr>
+      <p:grpSpPr>
+        <a:xfrm>
+          <a:off x="0" y="0"/>
+          <a:ext cx="0" cy="0"/>
+          <a:chOff x="0" y="0"/>
+          <a:chExt cx="0" cy="0"/>
+        </a:xfrm>
+      </p:grpSpPr>
+      <p:sp>
+        <p:nvSpPr>
+          <p:cNvPr id="2" name="Kopfzeilenplatzhalter 1"/>
+          <p:cNvSpPr>
+            <a:spLocks noGrp="1"/>
+          </p:cNvSpPr>
+          <p:nvPr>
+            <p:ph type="hdr" sz="quarter"/>
+          </p:nvPr>
+        </p:nvSpPr>
+        <p:spPr>
+          <a:xfrm>
+            <a:off x="0" y="0"/>
+            <a:ext cx="2971800" cy="458788"/>
+          </a:xfrm>
+          <a:prstGeom prst="rect">
+            <a:avLst/>
+          </a:prstGeom>
+        </p:spPr>
+        <p:txBody>
+          <a:bodyPr vert="horz" lIns="91440" tIns="45720" rIns="91440" bIns="45720" rtlCol="0"/>
+          <a:lstStyle>
+            <a:lvl1pPr algn="l">
+              <a:defRPr sz="1200"/>
+            </a:lvl1pPr>
+          </a:lstStyle>
+          <a:p>
+            <a:endParaRPr lang="de-AT"/>
+          </a:p>
+        </p:txBody>
+      </p:sp>
+      <p:sp>
+        <p:nvSpPr>
+          <p:cNvPr id="3" name="Datumsplatzhalter 2"/>
+          <p:cNvSpPr>
+            <a:spLocks noGrp="1"/>
+          </p:cNvSpPr>
+          <p:nvPr>
+            <p:ph type="dt" idx="1"/>
+          </p:nvPr>
+        </p:nvSpPr>
+        <p:spPr>
+          <a:xfrm>
+            <a:off x="3884613" y="0"/>
+            <a:ext cx="2971800" cy="458788"/>
+          </a:xfrm>
+          <a:prstGeom prst="rect">
+            <a:avLst/>
+          </a:prstGeom>
+        </p:spPr>
+        <p:txBody>
+          <a:bodyPr vert="horz" lIns="91440" tIns="45720" rIns="91440" bIns="45720" rtlCol="0"/>
+          <a:lstStyle>
+            <a:lvl1pPr algn="r">
+              <a:defRPr sz="1200"/>
+            </a:lvl1pPr>
+          </a:lstStyle>
+          <a:p>
+            <a:fld id="{711D630A-C034-2842-AB1F-A1B843BC91A7}" type="datetimeFigureOut">
+              <a:rPr lang="de-AT" smtClean="0"/>
+              <a:t>18.06.24</a:t>
+            </a:fld>
+            <a:endParaRPr lang="de-AT"/>
+          </a:p>
+        </p:txBody>
+      </p:sp>
+      <p:sp>
+        <p:nvSpPr>
+          <p:cNvPr id="4" name="Folienbildplatzhalter 3"/>
+          <p:cNvSpPr>
+            <a:spLocks noGrp="1" noRot="1" noChangeAspect="1"/>
+          </p:cNvSpPr>
+          <p:nvPr>
+            <p:ph type="sldImg" idx="2"/>
+          </p:nvPr>
+        </p:nvSpPr>
+        <p:spPr>
+          <a:xfrm>
+            <a:off x="685800" y="1143000"/>
+            <a:ext cx="5486400" cy="3086100"/>
+          </a:xfrm>
+          <a:prstGeom prst="rect">
+            <a:avLst/>
+          </a:prstGeom>
+          <a:noFill/>
+          <a:ln w="12700">
+            <a:solidFill>
+              <a:prstClr val="black"/>
+            </a:solidFill>
+          </a:ln>
+        </p:spPr>
+        <p:txBody>
+          <a:bodyPr vert="horz" lIns="91440" tIns="45720" rIns="91440" bIns="45720" rtlCol="0" anchor="ctr"/>
+          <a:lstStyle/>
+          <a:p>
+            <a:endParaRPr lang="de-AT"/>
+          </a:p>
+        </p:txBody>
+      </p:sp>
+      <p:sp>
+        <p:nvSpPr>
+          <p:cNvPr id="5" name="Notizenplatzhalter 4"/>
+          <p:cNvSpPr>
+            <a:spLocks noGrp="1"/>
+          </p:cNvSpPr>
+          <p:nvPr>
+            <p:ph type="body" sz="quarter" idx="3"/>
+          </p:nvPr>
+        </p:nvSpPr>
+        <p:spPr>
+          <a:xfrm>
+            <a:off x="685800" y="4400550"/>
+            <a:ext cx="5486400" cy="3600450"/>
+          </a:xfrm>
+          <a:prstGeom prst="rect">
+            <a:avLst/>
+          </a:prstGeom>
+        </p:spPr>
+        <p:txBody>
+          <a:bodyPr vert="horz" lIns="91440" tIns="45720" rIns="91440" bIns="45720" rtlCol="0"/>
+          <a:lstStyle/>
+          <a:p>
+            <a:pPr lvl="0"/>
+            <a:r>
+              <a:rPr lang="de-DE"/>
+              <a:t>Mastertextformat bearbeiten</a:t>
+            </a:r>
+          </a:p>
+          <a:p>
+            <a:pPr lvl="1"/>
+            <a:r>
+              <a:rPr lang="de-DE"/>
+              <a:t>Zweite Ebene</a:t>
+            </a:r>
+          </a:p>
+          <a:p>
+            <a:pPr lvl="2"/>
+            <a:r>
+              <a:rPr lang="de-DE"/>
+              <a:t>Dritte Ebene</a:t>
+            </a:r>
+          </a:p>
+          <a:p>
+            <a:pPr lvl="3"/>
+            <a:r>
+              <a:rPr lang="de-DE"/>
+              <a:t>Vierte Ebene</a:t>
+            </a:r>
+          </a:p>
+          <a:p>
+            <a:pPr lvl="4"/>
+            <a:r>
+              <a:rPr lang="de-DE"/>
+              <a:t>Fünfte Ebene</a:t>
+            </a:r>
+            <a:endParaRPr lang="de-AT"/>
+          </a:p>
+        </p:txBody>
+      </p:sp>
+      <p:sp>
+        <p:nvSpPr>
+          <p:cNvPr id="6" name="Fußzeilenplatzhalter 5"/>
+          <p:cNvSpPr>
+            <a:spLocks noGrp="1"/>
+          </p:cNvSpPr>
+          <p:nvPr>
+            <p:ph type="ftr" sz="quarter" idx="4"/>
+          </p:nvPr>
+        </p:nvSpPr>
+        <p:spPr>
+          <a:xfrm>
+            <a:off x="0" y="8685213"/>
+            <a:ext cx="2971800" cy="458787"/>
+          </a:xfrm>
+          <a:prstGeom prst="rect">
+            <a:avLst/>
+          </a:prstGeom>
+        </p:spPr>
+        <p:txBody>
+          <a:bodyPr vert="horz" lIns="91440" tIns="45720" rIns="91440" bIns="45720" rtlCol="0" anchor="b"/>
+          <a:lstStyle>
+            <a:lvl1pPr algn="l">
+              <a:defRPr sz="1200"/>
+            </a:lvl1pPr>
+          </a:lstStyle>
+          <a:p>
+            <a:endParaRPr lang="de-AT"/>
+          </a:p>
+        </p:txBody>
+      </p:sp>
+      <p:sp>
+        <p:nvSpPr>
+          <p:cNvPr id="7" name="Foliennummernplatzhalter 6"/>
+          <p:cNvSpPr>
+            <a:spLocks noGrp="1"/>
+          </p:cNvSpPr>
+          <p:nvPr>
+            <p:ph type="sldNum" sz="quarter" idx="5"/>
+          </p:nvPr>
+        </p:nvSpPr>
+        <p:spPr>
+          <a:xfrm>
+            <a:off x="3884613" y="8685213"/>
+            <a:ext cx="2971800" cy="458787"/>
+          </a:xfrm>
+          <a:prstGeom prst="rect">
+            <a:avLst/>
+          </a:prstGeom>
+        </p:spPr>
+        <p:txBody>
+          <a:bodyPr vert="horz" lIns="91440" tIns="45720" rIns="91440" bIns="45720" rtlCol="0" anchor="b"/>
+          <a:lstStyle>
+            <a:lvl1pPr algn="r">
+              <a:defRPr sz="1200"/>
+            </a:lvl1pPr>
+          </a:lstStyle>
+          <a:p>
+            <a:fld id="{A96C298E-B08E-C94D-BC8F-479A81B39683}" type="slidenum">
+              <a:rPr lang="de-AT" smtClean="0"/>
+              <a:t>‹Nr.›</a:t>
+            </a:fld>
+            <a:endParaRPr lang="de-AT"/>
+          </a:p>
+        </p:txBody>
+      </p:sp>
+    </p:spTree>
+    <p:extLst>
+      <p:ext uri="{BB962C8B-B14F-4D97-AF65-F5344CB8AC3E}">
+        <p14:creationId xmlns:p14="http://schemas.microsoft.com/office/powerpoint/2010/main" val="1482156614"/>
+      </p:ext>
+    </p:extLst>
+  </p:cSld>
+  <p:clrMap bg1="lt1" tx1="dk1" bg2="lt2" tx2="dk2" accent1="accent1" accent2="accent2" accent3="accent3" accent4="accent4" accent5="accent5" accent6="accent6" hlink="hlink" folHlink="folHlink"/>
+  <p:notesStyle>
+    <a:lvl1pPr marL="0" algn="l" defTabSz="914400" rtl="0" eaLnBrk="1" latinLnBrk="0" hangingPunct="1">
+      <a:defRPr sz="1200" kern="1200">
+        <a:solidFill>
+          <a:schemeClr val="tx1"/>
+        </a:solidFill>
+        <a:latin typeface="+mn-lt"/>
+        <a:ea typeface="+mn-ea"/>
+        <a:cs typeface="+mn-cs"/>
+      </a:defRPr>
+    </a:lvl1pPr>
+    <a:lvl2pPr marL="457200" algn="l" defTabSz="914400" rtl="0" eaLnBrk="1" latinLnBrk="0" hangingPunct="1">
+      <a:defRPr sz="1200" kern="1200">
+        <a:solidFill>
+          <a:schemeClr val="tx1"/>
+        </a:solidFill>
+        <a:latin typeface="+mn-lt"/>
+        <a:ea typeface="+mn-ea"/>
+        <a:cs typeface="+mn-cs"/>
+      </a:defRPr>
+    </a:lvl2pPr>
+    <a:lvl3pPr marL="914400" algn="l" defTabSz="914400" rtl="0" eaLnBrk="1" latinLnBrk="0" hangingPunct="1">
+      <a:defRPr sz="1200" kern="1200">
+        <a:solidFill>
+          <a:schemeClr val="tx1"/>
+        </a:solidFill>
+        <a:latin typeface="+mn-lt"/>
+        <a:ea typeface="+mn-ea"/>
+        <a:cs typeface="+mn-cs"/>
+      </a:defRPr>
+    </a:lvl3pPr>
+    <a:lvl4pPr marL="1371600" algn="l" defTabSz="914400" rtl="0" eaLnBrk="1" latinLnBrk="0" hangingPunct="1">
+      <a:defRPr sz="1200" kern="1200">
+        <a:solidFill>
+          <a:schemeClr val="tx1"/>
+        </a:solidFill>
+        <a:latin typeface="+mn-lt"/>
+        <a:ea typeface="+mn-ea"/>
+        <a:cs typeface="+mn-cs"/>
+      </a:defRPr>
+    </a:lvl4pPr>
+    <a:lvl5pPr marL="1828800" algn="l" defTabSz="914400" rtl="0" eaLnBrk="1" latinLnBrk="0" hangingPunct="1">
+      <a:defRPr sz="1200" kern="1200">
+        <a:solidFill>
+          <a:schemeClr val="tx1"/>
+        </a:solidFill>
+        <a:latin typeface="+mn-lt"/>
+        <a:ea typeface="+mn-ea"/>
+        <a:cs typeface="+mn-cs"/>
+      </a:defRPr>
+    </a:lvl5pPr>
+    <a:lvl6pPr marL="2286000" algn="l" defTabSz="914400" rtl="0" eaLnBrk="1" latinLnBrk="0" hangingPunct="1">
+      <a:defRPr sz="1200" kern="1200">
+        <a:solidFill>
+          <a:schemeClr val="tx1"/>
+        </a:solidFill>
+        <a:latin typeface="+mn-lt"/>
+        <a:ea typeface="+mn-ea"/>
+        <a:cs typeface="+mn-cs"/>
+      </a:defRPr>
+    </a:lvl6pPr>
+    <a:lvl7pPr marL="2743200" algn="l" defTabSz="914400" rtl="0" eaLnBrk="1" latinLnBrk="0" hangingPunct="1">
+      <a:defRPr sz="1200" kern="1200">
+        <a:solidFill>
+          <a:schemeClr val="tx1"/>
+        </a:solidFill>
+        <a:latin typeface="+mn-lt"/>
+        <a:ea typeface="+mn-ea"/>
+        <a:cs typeface="+mn-cs"/>
+      </a:defRPr>
+    </a:lvl7pPr>
+    <a:lvl8pPr marL="3200400" algn="l" defTabSz="914400" rtl="0" eaLnBrk="1" latinLnBrk="0" hangingPunct="1">
+      <a:defRPr sz="1200" kern="1200">
+        <a:solidFill>
+          <a:schemeClr val="tx1"/>
+        </a:solidFill>
+        <a:latin typeface="+mn-lt"/>
+        <a:ea typeface="+mn-ea"/>
+        <a:cs typeface="+mn-cs"/>
+      </a:defRPr>
+    </a:lvl8pPr>
+    <a:lvl9pPr marL="3657600" algn="l" defTabSz="914400" rtl="0" eaLnBrk="1" latinLnBrk="0" hangingPunct="1">
+      <a:defRPr sz="1200" kern="1200">
+        <a:solidFill>
+          <a:schemeClr val="tx1"/>
+        </a:solidFill>
+        <a:latin typeface="+mn-lt"/>
+        <a:ea typeface="+mn-ea"/>
+        <a:cs typeface="+mn-cs"/>
+      </a:defRPr>
+    </a:lvl9pPr>
+  </p:notesStyle>
+</p:notesMaster>
+</file>
+
+<file path=ppt/notesSlides/notesSlide1.xml><?xml version="1.0" encoding="utf-8"?>
+<p:notes xmlns:a="http://schemas.openxmlformats.org/drawingml/2006/main" xmlns:r="http://schemas.openxmlformats.org/officeDocument/2006/relationships" xmlns:p="http://schemas.openxmlformats.org/presentationml/2006/main">
+  <p:cSld>
+    <p:spTree>
+      <p:nvGrpSpPr>
+        <p:cNvPr id="1" name=""/>
+        <p:cNvGrpSpPr/>
+        <p:nvPr/>
+      </p:nvGrpSpPr>
+      <p:grpSpPr>
+        <a:xfrm>
+          <a:off x="0" y="0"/>
+          <a:ext cx="0" cy="0"/>
+          <a:chOff x="0" y="0"/>
+          <a:chExt cx="0" cy="0"/>
+        </a:xfrm>
+      </p:grpSpPr>
+      <p:sp>
+        <p:nvSpPr>
+          <p:cNvPr id="2" name="Folienbildplatzhalter 1"/>
+          <p:cNvSpPr>
+            <a:spLocks noGrp="1" noRot="1" noChangeAspect="1"/>
+          </p:cNvSpPr>
+          <p:nvPr>
+            <p:ph type="sldImg"/>
+          </p:nvPr>
+        </p:nvSpPr>
+        <p:spPr/>
+      </p:sp>
+      <p:sp>
+        <p:nvSpPr>
+          <p:cNvPr id="3" name="Notizenplatzhalter 2"/>
+          <p:cNvSpPr>
+            <a:spLocks noGrp="1"/>
+          </p:cNvSpPr>
+          <p:nvPr>
+            <p:ph type="body" idx="1"/>
+          </p:nvPr>
+        </p:nvSpPr>
+        <p:spPr/>
+        <p:txBody>
+          <a:bodyPr/>
+          <a:lstStyle/>
+          <a:p>
+            <a:endParaRPr lang="de-AT" dirty="0"/>
+          </a:p>
+        </p:txBody>
+      </p:sp>
+      <p:sp>
+        <p:nvSpPr>
+          <p:cNvPr id="4" name="Foliennummernplatzhalter 3"/>
+          <p:cNvSpPr>
+            <a:spLocks noGrp="1"/>
+          </p:cNvSpPr>
+          <p:nvPr>
+            <p:ph type="sldNum" sz="quarter" idx="5"/>
+          </p:nvPr>
+        </p:nvSpPr>
+        <p:spPr/>
+        <p:txBody>
+          <a:bodyPr/>
+          <a:lstStyle/>
+          <a:p>
+            <a:fld id="{A96C298E-B08E-C94D-BC8F-479A81B39683}" type="slidenum">
+              <a:rPr lang="de-AT" smtClean="0"/>
+              <a:t>7</a:t>
+            </a:fld>
+            <a:endParaRPr lang="de-AT"/>
+          </a:p>
+        </p:txBody>
+      </p:sp>
+    </p:spTree>
+    <p:extLst>
+      <p:ext uri="{BB962C8B-B14F-4D97-AF65-F5344CB8AC3E}">
+        <p14:creationId xmlns:p14="http://schemas.microsoft.com/office/powerpoint/2010/main" val="2487528790"/>
+      </p:ext>
+    </p:extLst>
+  </p:cSld>
+  <p:clrMapOvr>
+    <a:masterClrMapping/>
+  </p:clrMapOvr>
+</p:notes>
+</file>
+
 <file path=ppt/slideLayouts/slideLayout1.xml><?xml version="1.0" encoding="utf-8"?>
 <p:sldLayout xmlns:a="http://schemas.openxmlformats.org/drawingml/2006/main" xmlns:r="http://schemas.openxmlformats.org/officeDocument/2006/relationships" xmlns:p="http://schemas.openxmlformats.org/presentationml/2006/main" type="title" preserve="1">
   <p:cSld name="Titelfolie">
@@ -3821,7 +4728,7 @@
           <a:p>
             <a:fld id="{4DB221A6-2486-4C42-A2DE-093B5CE9B803}" type="datetimeFigureOut">
               <a:rPr lang="de-AT" smtClean="0"/>
-              <a:t>17.06.24</a:t>
+              <a:t>18.06.24</a:t>
             </a:fld>
             <a:endParaRPr lang="de-AT"/>
           </a:p>
@@ -3991,7 +4898,7 @@
           <a:p>
             <a:fld id="{4DB221A6-2486-4C42-A2DE-093B5CE9B803}" type="datetimeFigureOut">
               <a:rPr lang="de-AT" smtClean="0"/>
-              <a:t>17.06.24</a:t>
+              <a:t>18.06.24</a:t>
             </a:fld>
             <a:endParaRPr lang="de-AT"/>
           </a:p>
@@ -4171,7 +5078,7 @@
           <a:p>
             <a:fld id="{4DB221A6-2486-4C42-A2DE-093B5CE9B803}" type="datetimeFigureOut">
               <a:rPr lang="de-AT" smtClean="0"/>
-              <a:t>17.06.24</a:t>
+              <a:t>18.06.24</a:t>
             </a:fld>
             <a:endParaRPr lang="de-AT"/>
           </a:p>
@@ -4341,7 +5248,7 @@
           <a:p>
             <a:fld id="{4DB221A6-2486-4C42-A2DE-093B5CE9B803}" type="datetimeFigureOut">
               <a:rPr lang="de-AT" smtClean="0"/>
-              <a:t>17.06.24</a:t>
+              <a:t>18.06.24</a:t>
             </a:fld>
             <a:endParaRPr lang="de-AT"/>
           </a:p>
@@ -4587,7 +5494,7 @@
           <a:p>
             <a:fld id="{4DB221A6-2486-4C42-A2DE-093B5CE9B803}" type="datetimeFigureOut">
               <a:rPr lang="de-AT" smtClean="0"/>
-              <a:t>17.06.24</a:t>
+              <a:t>18.06.24</a:t>
             </a:fld>
             <a:endParaRPr lang="de-AT"/>
           </a:p>
@@ -4819,7 +5726,7 @@
           <a:p>
             <a:fld id="{4DB221A6-2486-4C42-A2DE-093B5CE9B803}" type="datetimeFigureOut">
               <a:rPr lang="de-AT" smtClean="0"/>
-              <a:t>17.06.24</a:t>
+              <a:t>18.06.24</a:t>
             </a:fld>
             <a:endParaRPr lang="de-AT"/>
           </a:p>
@@ -5186,7 +6093,7 @@
           <a:p>
             <a:fld id="{4DB221A6-2486-4C42-A2DE-093B5CE9B803}" type="datetimeFigureOut">
               <a:rPr lang="de-AT" smtClean="0"/>
-              <a:t>17.06.24</a:t>
+              <a:t>18.06.24</a:t>
             </a:fld>
             <a:endParaRPr lang="de-AT"/>
           </a:p>
@@ -5304,7 +6211,7 @@
           <a:p>
             <a:fld id="{4DB221A6-2486-4C42-A2DE-093B5CE9B803}" type="datetimeFigureOut">
               <a:rPr lang="de-AT" smtClean="0"/>
-              <a:t>17.06.24</a:t>
+              <a:t>18.06.24</a:t>
             </a:fld>
             <a:endParaRPr lang="de-AT"/>
           </a:p>
@@ -5399,7 +6306,7 @@
           <a:p>
             <a:fld id="{4DB221A6-2486-4C42-A2DE-093B5CE9B803}" type="datetimeFigureOut">
               <a:rPr lang="de-AT" smtClean="0"/>
-              <a:t>17.06.24</a:t>
+              <a:t>18.06.24</a:t>
             </a:fld>
             <a:endParaRPr lang="de-AT"/>
           </a:p>
@@ -5676,7 +6583,7 @@
           <a:p>
             <a:fld id="{4DB221A6-2486-4C42-A2DE-093B5CE9B803}" type="datetimeFigureOut">
               <a:rPr lang="de-AT" smtClean="0"/>
-              <a:t>17.06.24</a:t>
+              <a:t>18.06.24</a:t>
             </a:fld>
             <a:endParaRPr lang="de-AT"/>
           </a:p>
@@ -5933,7 +6840,7 @@
           <a:p>
             <a:fld id="{4DB221A6-2486-4C42-A2DE-093B5CE9B803}" type="datetimeFigureOut">
               <a:rPr lang="de-AT" smtClean="0"/>
-              <a:t>17.06.24</a:t>
+              <a:t>18.06.24</a:t>
             </a:fld>
             <a:endParaRPr lang="de-AT"/>
           </a:p>
@@ -6146,7 +7053,7 @@
           <a:p>
             <a:fld id="{4DB221A6-2486-4C42-A2DE-093B5CE9B803}" type="datetimeFigureOut">
               <a:rPr lang="de-AT" smtClean="0"/>
-              <a:t>17.06.24</a:t>
+              <a:t>18.06.24</a:t>
             </a:fld>
             <a:endParaRPr lang="de-AT"/>
           </a:p>
@@ -7662,10 +8569,9 @@
           </a:p>
           <a:p>
             <a:r>
-              <a:rPr lang="de-AT" sz="2000" dirty="0" err="1"/>
-              <a:t>Clockify</a:t>
+              <a:rPr lang="de-AT" sz="2000" dirty="0"/>
+              <a:t>Technologien</a:t>
             </a:r>
-            <a:endParaRPr lang="de-AT" sz="2000" dirty="0"/>
           </a:p>
           <a:p>
             <a:r>
@@ -7679,17 +8585,10 @@
           </a:p>
           <a:p>
             <a:r>
-              <a:rPr lang="de-AT" sz="2000" dirty="0"/>
-              <a:t>Technologien(</a:t>
+              <a:rPr lang="de-AT" sz="2000" dirty="0" err="1"/>
+              <a:t>Clockify</a:t>
             </a:r>
-            <a:r>
-              <a:rPr lang="de-AT" sz="2000" dirty="0" err="1"/>
-              <a:t>Github</a:t>
-            </a:r>
-            <a:r>
-              <a:rPr lang="de-AT" sz="2000" dirty="0"/>
-              <a:t> Screenshot)</a:t>
-            </a:r>
+            <a:endParaRPr lang="de-AT" sz="2000" dirty="0"/>
           </a:p>
           <a:p>
             <a:r>
@@ -8098,7 +8997,7 @@
             <p:ph idx="1"/>
             <p:extLst>
               <p:ext uri="{D42A27DB-BD31-4B8C-83A1-F6EECF244321}">
-                <p14:modId xmlns:p14="http://schemas.microsoft.com/office/powerpoint/2010/main" val="3192337966"/>
+                <p14:modId xmlns:p14="http://schemas.microsoft.com/office/powerpoint/2010/main" val="362930148"/>
               </p:ext>
             </p:extLst>
           </p:nvPr>
@@ -8129,6 +9028,14 @@
 <file path=ppt/slides/slide4.xml><?xml version="1.0" encoding="utf-8"?>
 <p:sld xmlns:a="http://schemas.openxmlformats.org/drawingml/2006/main" xmlns:r="http://schemas.openxmlformats.org/officeDocument/2006/relationships" xmlns:p="http://schemas.openxmlformats.org/presentationml/2006/main">
   <p:cSld>
+    <p:bg>
+      <p:bgPr>
+        <a:solidFill>
+          <a:schemeClr val="bg1"/>
+        </a:solidFill>
+        <a:effectLst/>
+      </p:bgPr>
+    </p:bg>
     <p:spTree>
       <p:nvGrpSpPr>
         <p:cNvPr id="1" name=""/>
@@ -8145,17 +9052,19 @@
       </p:grpSpPr>
       <p:sp useBgFill="1">
         <p:nvSpPr>
-          <p:cNvPr id="2" name="Rectangle 1030">
+          <p:cNvPr id="2055" name="Rectangle 2054">
             <a:extLst>
               <a:ext uri="{FF2B5EF4-FFF2-40B4-BE49-F238E27FC236}">
-                <a16:creationId xmlns:a16="http://schemas.microsoft.com/office/drawing/2014/main" id="{6519A4E8-8A8A-78E4-8F4B-C0C739CE82DC}"/>
+                <a16:creationId xmlns:a16="http://schemas.microsoft.com/office/drawing/2014/main" id="{C4285719-470E-454C-AF62-8323075F1F5B}"/>
               </a:ext>
               <a:ext uri="{C183D7F6-B498-43B3-948B-1728B52AA6E4}">
                 <adec:decorative xmlns:adec="http://schemas.microsoft.com/office/drawing/2017/decorative" val="1"/>
               </a:ext>
             </a:extLst>
           </p:cNvPr>
-          <p:cNvSpPr/>
+          <p:cNvSpPr>
+            <a:spLocks noGrp="1" noRot="1" noChangeAspect="1" noMove="1" noResize="1" noEditPoints="1" noAdjustHandles="1" noChangeArrowheads="1" noChangeShapeType="1" noTextEdit="1"/>
+          </p:cNvSpPr>
           <p:nvPr>
             <p:extLst>
               <p:ext uri="{386F3935-93C4-4BCD-93E2-E3B085C9AB24}">
@@ -8167,7 +9076,7 @@
         <p:spPr>
           <a:xfrm>
             <a:off x="0" y="0"/>
-            <a:ext cx="12192000" cy="6858000"/>
+            <a:ext cx="12188952" cy="6858000"/>
           </a:xfrm>
           <a:prstGeom prst="rect">
             <a:avLst/>
@@ -8219,6 +9128,476 @@
       </p:sp>
       <p:sp>
         <p:nvSpPr>
+          <p:cNvPr id="2057" name="Rectangle 2056">
+            <a:extLst>
+              <a:ext uri="{FF2B5EF4-FFF2-40B4-BE49-F238E27FC236}">
+                <a16:creationId xmlns:a16="http://schemas.microsoft.com/office/drawing/2014/main" id="{CD9FE4EF-C4D8-49A0-B2FF-81D8DB7D8A24}"/>
+              </a:ext>
+              <a:ext uri="{C183D7F6-B498-43B3-948B-1728B52AA6E4}">
+                <adec:decorative xmlns:adec="http://schemas.microsoft.com/office/drawing/2017/decorative" val="1"/>
+              </a:ext>
+            </a:extLst>
+          </p:cNvPr>
+          <p:cNvSpPr>
+            <a:spLocks noGrp="1" noRot="1" noChangeAspect="1" noMove="1" noResize="1" noEditPoints="1" noAdjustHandles="1" noChangeArrowheads="1" noChangeShapeType="1" noTextEdit="1"/>
+          </p:cNvSpPr>
+          <p:nvPr>
+            <p:extLst>
+              <p:ext uri="{386F3935-93C4-4BCD-93E2-E3B085C9AB24}">
+                <p16:designElem xmlns:p16="http://schemas.microsoft.com/office/powerpoint/2015/main" val="1"/>
+              </p:ext>
+            </p:extLst>
+          </p:nvPr>
+        </p:nvSpPr>
+        <p:spPr>
+          <a:xfrm rot="5400000" flipH="1">
+            <a:off x="-1410084" y="1410082"/>
+            <a:ext cx="6858000" cy="4037836"/>
+          </a:xfrm>
+          <a:prstGeom prst="rect">
+            <a:avLst/>
+          </a:prstGeom>
+          <a:gradFill>
+            <a:gsLst>
+              <a:gs pos="8000">
+                <a:srgbClr val="000000"/>
+              </a:gs>
+              <a:gs pos="100000">
+                <a:schemeClr val="accent1">
+                  <a:lumMod val="75000"/>
+                </a:schemeClr>
+              </a:gs>
+            </a:gsLst>
+            <a:lin ang="3000000" scaled="0"/>
+          </a:gradFill>
+          <a:ln>
+            <a:noFill/>
+          </a:ln>
+        </p:spPr>
+        <p:style>
+          <a:lnRef idx="2">
+            <a:schemeClr val="accent1">
+              <a:shade val="50000"/>
+            </a:schemeClr>
+          </a:lnRef>
+          <a:fillRef idx="1">
+            <a:schemeClr val="accent1"/>
+          </a:fillRef>
+          <a:effectRef idx="0">
+            <a:schemeClr val="accent1"/>
+          </a:effectRef>
+          <a:fontRef idx="minor">
+            <a:schemeClr val="lt1"/>
+          </a:fontRef>
+        </p:style>
+        <p:txBody>
+          <a:bodyPr rtlCol="0" anchor="ctr"/>
+          <a:lstStyle/>
+          <a:p>
+            <a:pPr algn="ctr"/>
+            <a:endParaRPr lang="en-US"/>
+          </a:p>
+        </p:txBody>
+      </p:sp>
+      <p:sp>
+        <p:nvSpPr>
+          <p:cNvPr id="2059" name="Rectangle 2058">
+            <a:extLst>
+              <a:ext uri="{FF2B5EF4-FFF2-40B4-BE49-F238E27FC236}">
+                <a16:creationId xmlns:a16="http://schemas.microsoft.com/office/drawing/2014/main" id="{4300840D-0A0B-4512-BACA-B439D5B9C57C}"/>
+              </a:ext>
+              <a:ext uri="{C183D7F6-B498-43B3-948B-1728B52AA6E4}">
+                <adec:decorative xmlns:adec="http://schemas.microsoft.com/office/drawing/2017/decorative" val="1"/>
+              </a:ext>
+            </a:extLst>
+          </p:cNvPr>
+          <p:cNvSpPr>
+            <a:spLocks noGrp="1" noRot="1" noChangeAspect="1" noMove="1" noResize="1" noEditPoints="1" noAdjustHandles="1" noChangeArrowheads="1" noChangeShapeType="1" noTextEdit="1"/>
+          </p:cNvSpPr>
+          <p:nvPr>
+            <p:extLst>
+              <p:ext uri="{386F3935-93C4-4BCD-93E2-E3B085C9AB24}">
+                <p16:designElem xmlns:p16="http://schemas.microsoft.com/office/powerpoint/2015/main" val="1"/>
+              </p:ext>
+            </p:extLst>
+          </p:nvPr>
+        </p:nvSpPr>
+        <p:spPr>
+          <a:xfrm rot="5400000" flipH="1">
+            <a:off x="-1410085" y="1420219"/>
+            <a:ext cx="6857999" cy="4037839"/>
+          </a:xfrm>
+          <a:prstGeom prst="rect">
+            <a:avLst/>
+          </a:prstGeom>
+          <a:gradFill>
+            <a:gsLst>
+              <a:gs pos="0">
+                <a:srgbClr val="000000">
+                  <a:alpha val="0"/>
+                </a:srgbClr>
+              </a:gs>
+              <a:gs pos="99000">
+                <a:schemeClr val="accent1">
+                  <a:alpha val="46000"/>
+                </a:schemeClr>
+              </a:gs>
+            </a:gsLst>
+            <a:lin ang="1800000" scaled="0"/>
+          </a:gradFill>
+          <a:ln>
+            <a:noFill/>
+          </a:ln>
+        </p:spPr>
+        <p:style>
+          <a:lnRef idx="2">
+            <a:schemeClr val="accent1">
+              <a:shade val="50000"/>
+            </a:schemeClr>
+          </a:lnRef>
+          <a:fillRef idx="1">
+            <a:schemeClr val="accent1"/>
+          </a:fillRef>
+          <a:effectRef idx="0">
+            <a:schemeClr val="accent1"/>
+          </a:effectRef>
+          <a:fontRef idx="minor">
+            <a:schemeClr val="lt1"/>
+          </a:fontRef>
+        </p:style>
+        <p:txBody>
+          <a:bodyPr rtlCol="0" anchor="ctr"/>
+          <a:lstStyle/>
+          <a:p>
+            <a:pPr algn="ctr"/>
+            <a:endParaRPr lang="en-US"/>
+          </a:p>
+        </p:txBody>
+      </p:sp>
+      <p:sp>
+        <p:nvSpPr>
+          <p:cNvPr id="2061" name="Rectangle 2060">
+            <a:extLst>
+              <a:ext uri="{FF2B5EF4-FFF2-40B4-BE49-F238E27FC236}">
+                <a16:creationId xmlns:a16="http://schemas.microsoft.com/office/drawing/2014/main" id="{D2B78728-A580-49A7-84F9-6EF6F583ADE0}"/>
+              </a:ext>
+              <a:ext uri="{C183D7F6-B498-43B3-948B-1728B52AA6E4}">
+                <adec:decorative xmlns:adec="http://schemas.microsoft.com/office/drawing/2017/decorative" val="1"/>
+              </a:ext>
+            </a:extLst>
+          </p:cNvPr>
+          <p:cNvSpPr>
+            <a:spLocks noGrp="1" noRot="1" noChangeAspect="1" noMove="1" noResize="1" noEditPoints="1" noAdjustHandles="1" noChangeArrowheads="1" noChangeShapeType="1" noTextEdit="1"/>
+          </p:cNvSpPr>
+          <p:nvPr>
+            <p:extLst>
+              <p:ext uri="{386F3935-93C4-4BCD-93E2-E3B085C9AB24}">
+                <p16:designElem xmlns:p16="http://schemas.microsoft.com/office/powerpoint/2015/main" val="1"/>
+              </p:ext>
+            </p:extLst>
+          </p:nvPr>
+        </p:nvSpPr>
+        <p:spPr>
+          <a:xfrm rot="5400000" flipH="1">
+            <a:off x="767923" y="3588085"/>
+            <a:ext cx="2501979" cy="4037841"/>
+          </a:xfrm>
+          <a:prstGeom prst="rect">
+            <a:avLst/>
+          </a:prstGeom>
+          <a:gradFill>
+            <a:gsLst>
+              <a:gs pos="2000">
+                <a:schemeClr val="accent1">
+                  <a:alpha val="29000"/>
+                </a:schemeClr>
+              </a:gs>
+              <a:gs pos="100000">
+                <a:srgbClr val="000000">
+                  <a:alpha val="30000"/>
+                </a:srgbClr>
+              </a:gs>
+            </a:gsLst>
+            <a:lin ang="7800000" scaled="0"/>
+          </a:gradFill>
+          <a:ln>
+            <a:noFill/>
+          </a:ln>
+        </p:spPr>
+        <p:style>
+          <a:lnRef idx="2">
+            <a:schemeClr val="accent1">
+              <a:shade val="50000"/>
+            </a:schemeClr>
+          </a:lnRef>
+          <a:fillRef idx="1">
+            <a:schemeClr val="accent1"/>
+          </a:fillRef>
+          <a:effectRef idx="0">
+            <a:schemeClr val="accent1"/>
+          </a:effectRef>
+          <a:fontRef idx="minor">
+            <a:schemeClr val="lt1"/>
+          </a:fontRef>
+        </p:style>
+        <p:txBody>
+          <a:bodyPr rtlCol="0" anchor="ctr"/>
+          <a:lstStyle/>
+          <a:p>
+            <a:pPr algn="ctr"/>
+            <a:endParaRPr lang="en-US" dirty="0"/>
+          </a:p>
+        </p:txBody>
+      </p:sp>
+      <p:sp>
+        <p:nvSpPr>
+          <p:cNvPr id="2063" name="Freeform: Shape 2062">
+            <a:extLst>
+              <a:ext uri="{FF2B5EF4-FFF2-40B4-BE49-F238E27FC236}">
+                <a16:creationId xmlns:a16="http://schemas.microsoft.com/office/drawing/2014/main" id="{38FAA1A1-D861-433F-88FA-1E9D6FD31D11}"/>
+              </a:ext>
+              <a:ext uri="{C183D7F6-B498-43B3-948B-1728B52AA6E4}">
+                <adec:decorative xmlns:adec="http://schemas.microsoft.com/office/drawing/2017/decorative" val="1"/>
+              </a:ext>
+            </a:extLst>
+          </p:cNvPr>
+          <p:cNvSpPr>
+            <a:spLocks noGrp="1" noRot="1" noChangeAspect="1" noMove="1" noResize="1" noEditPoints="1" noAdjustHandles="1" noChangeArrowheads="1" noChangeShapeType="1" noTextEdit="1"/>
+          </p:cNvSpPr>
+          <p:nvPr>
+            <p:extLst>
+              <p:ext uri="{386F3935-93C4-4BCD-93E2-E3B085C9AB24}">
+                <p16:designElem xmlns:p16="http://schemas.microsoft.com/office/powerpoint/2015/main" val="1"/>
+              </p:ext>
+            </p:extLst>
+          </p:nvPr>
+        </p:nvSpPr>
+        <p:spPr>
+          <a:xfrm rot="20635413">
+            <a:off x="-501737" y="969718"/>
+            <a:ext cx="3900357" cy="4178958"/>
+          </a:xfrm>
+          <a:custGeom>
+            <a:avLst/>
+            <a:gdLst>
+              <a:gd name="connsiteX0" fmla="*/ 2432225 w 3900357"/>
+              <a:gd name="connsiteY0" fmla="*/ 93939 h 4178958"/>
+              <a:gd name="connsiteX1" fmla="*/ 3900357 w 3900357"/>
+              <a:gd name="connsiteY1" fmla="*/ 2089479 h 4178958"/>
+              <a:gd name="connsiteX2" fmla="*/ 1810878 w 3900357"/>
+              <a:gd name="connsiteY2" fmla="*/ 4178958 h 4178958"/>
+              <a:gd name="connsiteX3" fmla="*/ 78249 w 3900357"/>
+              <a:gd name="connsiteY3" fmla="*/ 3257727 h 4178958"/>
+              <a:gd name="connsiteX4" fmla="*/ 0 w 3900357"/>
+              <a:gd name="connsiteY4" fmla="*/ 3128923 h 4178958"/>
+              <a:gd name="connsiteX5" fmla="*/ 831324 w 3900357"/>
+              <a:gd name="connsiteY5" fmla="*/ 244281 h 4178958"/>
+              <a:gd name="connsiteX6" fmla="*/ 997559 w 3900357"/>
+              <a:gd name="connsiteY6" fmla="*/ 164202 h 4178958"/>
+              <a:gd name="connsiteX7" fmla="*/ 1810878 w 3900357"/>
+              <a:gd name="connsiteY7" fmla="*/ 0 h 4178958"/>
+              <a:gd name="connsiteX8" fmla="*/ 2432225 w 3900357"/>
+              <a:gd name="connsiteY8" fmla="*/ 93939 h 4178958"/>
+            </a:gdLst>
+            <a:ahLst/>
+            <a:cxnLst>
+              <a:cxn ang="0">
+                <a:pos x="connsiteX0" y="connsiteY0"/>
+              </a:cxn>
+              <a:cxn ang="0">
+                <a:pos x="connsiteX1" y="connsiteY1"/>
+              </a:cxn>
+              <a:cxn ang="0">
+                <a:pos x="connsiteX2" y="connsiteY2"/>
+              </a:cxn>
+              <a:cxn ang="0">
+                <a:pos x="connsiteX3" y="connsiteY3"/>
+              </a:cxn>
+              <a:cxn ang="0">
+                <a:pos x="connsiteX4" y="connsiteY4"/>
+              </a:cxn>
+              <a:cxn ang="0">
+                <a:pos x="connsiteX5" y="connsiteY5"/>
+              </a:cxn>
+              <a:cxn ang="0">
+                <a:pos x="connsiteX6" y="connsiteY6"/>
+              </a:cxn>
+              <a:cxn ang="0">
+                <a:pos x="connsiteX7" y="connsiteY7"/>
+              </a:cxn>
+              <a:cxn ang="0">
+                <a:pos x="connsiteX8" y="connsiteY8"/>
+              </a:cxn>
+            </a:cxnLst>
+            <a:rect l="l" t="t" r="r" b="b"/>
+            <a:pathLst>
+              <a:path w="3900357" h="4178958">
+                <a:moveTo>
+                  <a:pt x="2432225" y="93939"/>
+                </a:moveTo>
+                <a:cubicBezTo>
+                  <a:pt x="3282786" y="358491"/>
+                  <a:pt x="3900357" y="1151865"/>
+                  <a:pt x="3900357" y="2089479"/>
+                </a:cubicBezTo>
+                <a:cubicBezTo>
+                  <a:pt x="3900357" y="3243466"/>
+                  <a:pt x="2964865" y="4178958"/>
+                  <a:pt x="1810878" y="4178958"/>
+                </a:cubicBezTo>
+                <a:cubicBezTo>
+                  <a:pt x="1089636" y="4178958"/>
+                  <a:pt x="453744" y="3813531"/>
+                  <a:pt x="78249" y="3257727"/>
+                </a:cubicBezTo>
+                <a:lnTo>
+                  <a:pt x="0" y="3128923"/>
+                </a:lnTo>
+                <a:lnTo>
+                  <a:pt x="831324" y="244281"/>
+                </a:lnTo>
+                <a:lnTo>
+                  <a:pt x="997559" y="164202"/>
+                </a:lnTo>
+                <a:cubicBezTo>
+                  <a:pt x="1247540" y="58468"/>
+                  <a:pt x="1522381" y="0"/>
+                  <a:pt x="1810878" y="0"/>
+                </a:cubicBezTo>
+                <a:cubicBezTo>
+                  <a:pt x="2027251" y="0"/>
+                  <a:pt x="2235942" y="32888"/>
+                  <a:pt x="2432225" y="93939"/>
+                </a:cubicBezTo>
+                <a:close/>
+              </a:path>
+            </a:pathLst>
+          </a:custGeom>
+          <a:gradFill>
+            <a:gsLst>
+              <a:gs pos="29000">
+                <a:srgbClr val="000000">
+                  <a:alpha val="0"/>
+                </a:srgbClr>
+              </a:gs>
+              <a:gs pos="100000">
+                <a:schemeClr val="accent1">
+                  <a:alpha val="43000"/>
+                </a:schemeClr>
+              </a:gs>
+            </a:gsLst>
+            <a:lin ang="1800000" scaled="0"/>
+          </a:gradFill>
+          <a:ln>
+            <a:noFill/>
+          </a:ln>
+        </p:spPr>
+        <p:style>
+          <a:lnRef idx="2">
+            <a:schemeClr val="accent1">
+              <a:shade val="50000"/>
+            </a:schemeClr>
+          </a:lnRef>
+          <a:fillRef idx="1">
+            <a:schemeClr val="accent1"/>
+          </a:fillRef>
+          <a:effectRef idx="0">
+            <a:schemeClr val="accent1"/>
+          </a:effectRef>
+          <a:fontRef idx="minor">
+            <a:schemeClr val="lt1"/>
+          </a:fontRef>
+        </p:style>
+        <p:txBody>
+          <a:bodyPr wrap="square" rtlCol="0" anchor="ctr">
+            <a:noAutofit/>
+          </a:bodyPr>
+          <a:lstStyle/>
+          <a:p>
+            <a:pPr algn="ctr"/>
+            <a:endParaRPr lang="en-US" dirty="0"/>
+          </a:p>
+        </p:txBody>
+      </p:sp>
+      <p:sp>
+        <p:nvSpPr>
+          <p:cNvPr id="2065" name="Rectangle 2064">
+            <a:extLst>
+              <a:ext uri="{FF2B5EF4-FFF2-40B4-BE49-F238E27FC236}">
+                <a16:creationId xmlns:a16="http://schemas.microsoft.com/office/drawing/2014/main" id="{8D71EDA1-87BF-4D5D-AB79-F346FD19278A}"/>
+              </a:ext>
+              <a:ext uri="{C183D7F6-B498-43B3-948B-1728B52AA6E4}">
+                <adec:decorative xmlns:adec="http://schemas.microsoft.com/office/drawing/2017/decorative" val="1"/>
+              </a:ext>
+            </a:extLst>
+          </p:cNvPr>
+          <p:cNvSpPr>
+            <a:spLocks noGrp="1" noRot="1" noChangeAspect="1" noMove="1" noResize="1" noEditPoints="1" noAdjustHandles="1" noChangeArrowheads="1" noChangeShapeType="1" noTextEdit="1"/>
+          </p:cNvSpPr>
+          <p:nvPr>
+            <p:extLst>
+              <p:ext uri="{386F3935-93C4-4BCD-93E2-E3B085C9AB24}">
+                <p16:designElem xmlns:p16="http://schemas.microsoft.com/office/powerpoint/2015/main" val="1"/>
+              </p:ext>
+            </p:extLst>
+          </p:nvPr>
+        </p:nvSpPr>
+        <p:spPr>
+          <a:xfrm rot="5400000" flipH="1">
+            <a:off x="-1410093" y="1399943"/>
+            <a:ext cx="6858003" cy="4037835"/>
+          </a:xfrm>
+          <a:prstGeom prst="rect">
+            <a:avLst/>
+          </a:prstGeom>
+          <a:gradFill>
+            <a:gsLst>
+              <a:gs pos="0">
+                <a:srgbClr val="000000">
+                  <a:alpha val="0"/>
+                </a:srgbClr>
+              </a:gs>
+              <a:gs pos="99000">
+                <a:schemeClr val="accent1">
+                  <a:lumMod val="60000"/>
+                  <a:lumOff val="40000"/>
+                  <a:alpha val="11000"/>
+                </a:schemeClr>
+              </a:gs>
+            </a:gsLst>
+            <a:lin ang="7200000" scaled="0"/>
+          </a:gradFill>
+          <a:ln>
+            <a:noFill/>
+          </a:ln>
+        </p:spPr>
+        <p:style>
+          <a:lnRef idx="2">
+            <a:schemeClr val="accent1">
+              <a:shade val="50000"/>
+            </a:schemeClr>
+          </a:lnRef>
+          <a:fillRef idx="1">
+            <a:schemeClr val="accent1"/>
+          </a:fillRef>
+          <a:effectRef idx="0">
+            <a:schemeClr val="accent1"/>
+          </a:effectRef>
+          <a:fontRef idx="minor">
+            <a:schemeClr val="lt1"/>
+          </a:fontRef>
+        </p:style>
+        <p:txBody>
+          <a:bodyPr rtlCol="0" anchor="ctr"/>
+          <a:lstStyle/>
+          <a:p>
+            <a:pPr algn="ctr"/>
+            <a:endParaRPr lang="en-US"/>
+          </a:p>
+        </p:txBody>
+      </p:sp>
+      <p:sp>
+        <p:nvSpPr>
           <p:cNvPr id="3" name="Titel 1">
             <a:extLst>
               <a:ext uri="{FF2B5EF4-FFF2-40B4-BE49-F238E27FC236}">
@@ -8233,15 +9612,15 @@
         </p:nvSpPr>
         <p:spPr>
           <a:xfrm>
-            <a:off x="1136397" y="502020"/>
-            <a:ext cx="5323715" cy="1642970"/>
+            <a:off x="466722" y="586855"/>
+            <a:ext cx="3201366" cy="3387497"/>
           </a:xfrm>
           <a:prstGeom prst="rect">
             <a:avLst/>
           </a:prstGeom>
         </p:spPr>
         <p:txBody>
-          <a:bodyPr anchor="b">
+          <a:bodyPr vert="horz" lIns="91440" tIns="45720" rIns="91440" bIns="45720" rtlCol="0" anchor="b">
             <a:normAutofit/>
           </a:bodyPr>
           <a:lstStyle>
@@ -8264,11 +9643,22 @@
             </a:lvl1pPr>
           </a:lstStyle>
           <a:p>
+            <a:pPr algn="r">
+              <a:spcAft>
+                <a:spcPts val="600"/>
+              </a:spcAft>
+            </a:pPr>
             <a:r>
-              <a:rPr lang="de-AT" sz="4000"/>
+              <a:rPr lang="en-US" sz="4000" kern="1200">
+                <a:solidFill>
+                  <a:srgbClr val="FFFFFF"/>
+                </a:solidFill>
+                <a:latin typeface="+mj-lt"/>
+                <a:ea typeface="+mj-ea"/>
+                <a:cs typeface="+mj-cs"/>
+              </a:rPr>
               <a:t>Idee</a:t>
             </a:r>
-            <a:endParaRPr lang="de-AT" sz="4000" dirty="0"/>
           </a:p>
         </p:txBody>
       </p:sp>
@@ -8288,15 +9678,15 @@
         </p:nvSpPr>
         <p:spPr>
           <a:xfrm>
-            <a:off x="1144923" y="2405894"/>
-            <a:ext cx="6978410" cy="3535083"/>
+            <a:off x="4581727" y="968188"/>
+            <a:ext cx="3260598" cy="5227339"/>
           </a:xfrm>
           <a:prstGeom prst="rect">
             <a:avLst/>
           </a:prstGeom>
         </p:spPr>
         <p:txBody>
-          <a:bodyPr anchor="t">
+          <a:bodyPr vert="horz" lIns="91440" tIns="45720" rIns="91440" bIns="45720" rtlCol="0" anchor="ctr">
             <a:normAutofit/>
           </a:bodyPr>
           <a:lstStyle>
@@ -8464,400 +9854,90 @@
             </a:lvl9pPr>
           </a:lstStyle>
           <a:p>
-            <a:pPr>
-              <a:lnSpc>
-                <a:spcPct val="100000"/>
-              </a:lnSpc>
+            <a:r>
+              <a:rPr lang="en-US" sz="2000" dirty="0" err="1"/>
+              <a:t>Bekanntes</a:t>
+            </a:r>
+            <a:r>
+              <a:rPr lang="en-US" sz="2000" dirty="0"/>
+              <a:t> </a:t>
+            </a:r>
+            <a:r>
+              <a:rPr lang="en-US" sz="2000" dirty="0" err="1"/>
+              <a:t>analoges</a:t>
+            </a:r>
+            <a:r>
+              <a:rPr lang="en-US" sz="2000" dirty="0"/>
+              <a:t> Spiel: </a:t>
+            </a:r>
+          </a:p>
+          <a:p>
+            <a:pPr lvl="1"/>
+            <a:r>
+              <a:rPr lang="en-US" sz="2000" dirty="0"/>
+              <a:t>Stadt – Land – </a:t>
+            </a:r>
+            <a:r>
+              <a:rPr lang="en-US" sz="2000" dirty="0" err="1"/>
+              <a:t>Vollpfosten</a:t>
+            </a:r>
+            <a:endParaRPr lang="en-US" sz="2000" dirty="0"/>
+          </a:p>
+          <a:p>
+            <a:pPr marL="457200" lvl="1" indent="0">
+              <a:buNone/>
             </a:pPr>
+            <a:endParaRPr lang="en-US" sz="2000" dirty="0"/>
+          </a:p>
+          <a:p>
             <a:r>
-              <a:rPr lang="de-AT" sz="2400"/>
-              <a:t>Bekanntes analoges Spiel: </a:t>
-            </a:r>
-          </a:p>
-          <a:p>
-            <a:pPr lvl="1">
-              <a:lnSpc>
-                <a:spcPct val="100000"/>
-              </a:lnSpc>
-            </a:pPr>
-            <a:r>
-              <a:rPr lang="de-AT" sz="2000"/>
-              <a:t>Stadt – Land – Fluss</a:t>
-            </a:r>
-          </a:p>
-          <a:p>
-            <a:pPr>
-              <a:lnSpc>
-                <a:spcPct val="100000"/>
-              </a:lnSpc>
-            </a:pPr>
-            <a:r>
-              <a:rPr lang="de-AT" sz="2400"/>
+              <a:rPr lang="en-US" sz="2000" dirty="0"/>
               <a:t>Online Version:</a:t>
             </a:r>
           </a:p>
           <a:p>
-            <a:pPr lvl="1">
-              <a:lnSpc>
-                <a:spcPct val="100000"/>
-              </a:lnSpc>
-            </a:pPr>
+            <a:pPr lvl="1"/>
             <a:r>
-              <a:rPr lang="de-AT" sz="2000"/>
-              <a:t>Multiplayer</a:t>
+              <a:rPr lang="en-US" sz="2000" dirty="0" err="1"/>
+              <a:t>Lobbysystem</a:t>
             </a:r>
-          </a:p>
-          <a:p>
-            <a:pPr lvl="1">
-              <a:lnSpc>
-                <a:spcPct val="100000"/>
-              </a:lnSpc>
-            </a:pPr>
+            <a:endParaRPr lang="en-US" sz="2000" dirty="0"/>
+          </a:p>
+          <a:p>
+            <a:pPr lvl="1"/>
             <a:r>
-              <a:rPr lang="de-AT" sz="2000"/>
-              <a:t>Charaktererstellung</a:t>
+              <a:rPr lang="en-US" sz="2000" dirty="0" err="1"/>
+              <a:t>Charakterauswahl</a:t>
             </a:r>
-          </a:p>
-          <a:p>
-            <a:pPr lvl="1">
-              <a:lnSpc>
-                <a:spcPct val="100000"/>
-              </a:lnSpc>
-            </a:pPr>
+            <a:endParaRPr lang="en-US" sz="2000" dirty="0"/>
+          </a:p>
+          <a:p>
+            <a:pPr lvl="1"/>
             <a:r>
-              <a:rPr lang="de-AT" sz="2000"/>
-              <a:t>Scoreboard</a:t>
+              <a:rPr lang="en-US" sz="2000" dirty="0"/>
+              <a:t>Voting</a:t>
             </a:r>
           </a:p>
           <a:p>
-            <a:pPr>
-              <a:lnSpc>
-                <a:spcPct val="100000"/>
-              </a:lnSpc>
-            </a:pPr>
+            <a:pPr lvl="1"/>
             <a:r>
-              <a:rPr lang="de-AT" sz="2400"/>
-              <a:t>Zukünftig:</a:t>
+              <a:rPr lang="en-US" sz="2000" dirty="0" err="1"/>
+              <a:t>Punktesystem</a:t>
             </a:r>
-          </a:p>
-          <a:p>
-            <a:pPr lvl="1">
-              <a:lnSpc>
-                <a:spcPct val="100000"/>
-              </a:lnSpc>
-            </a:pPr>
-            <a:r>
-              <a:rPr lang="de-AT" sz="2000"/>
-              <a:t>Eigene Kategorien</a:t>
-            </a:r>
-          </a:p>
-          <a:p>
-            <a:pPr marL="0" indent="0">
-              <a:buFont typeface="Arial" panose="020B0604020202020204" pitchFamily="34" charset="0"/>
-              <a:buNone/>
-            </a:pPr>
-            <a:endParaRPr lang="de-AT" sz="2000" dirty="0"/>
-          </a:p>
-        </p:txBody>
-      </p:sp>
-      <p:sp>
-        <p:nvSpPr>
-          <p:cNvPr id="5" name="Rectangle 1032">
-            <a:extLst>
-              <a:ext uri="{FF2B5EF4-FFF2-40B4-BE49-F238E27FC236}">
-                <a16:creationId xmlns:a16="http://schemas.microsoft.com/office/drawing/2014/main" id="{CDC14DFF-7DF8-D25C-2881-94EC65E3085A}"/>
-              </a:ext>
-              <a:ext uri="{C183D7F6-B498-43B3-948B-1728B52AA6E4}">
-                <adec:decorative xmlns:adec="http://schemas.microsoft.com/office/drawing/2017/decorative" val="1"/>
-              </a:ext>
-            </a:extLst>
-          </p:cNvPr>
-          <p:cNvSpPr/>
-          <p:nvPr>
-            <p:extLst>
-              <p:ext uri="{386F3935-93C4-4BCD-93E2-E3B085C9AB24}">
-                <p16:designElem xmlns:p16="http://schemas.microsoft.com/office/powerpoint/2015/main" val="1"/>
-              </p:ext>
-            </p:extLst>
-          </p:nvPr>
-        </p:nvSpPr>
-        <p:spPr>
-          <a:xfrm rot="10800000" flipH="1">
-            <a:off x="8123333" y="-5"/>
-            <a:ext cx="4092521" cy="6858000"/>
-          </a:xfrm>
-          <a:prstGeom prst="rect">
-            <a:avLst/>
-          </a:prstGeom>
-          <a:gradFill>
-            <a:gsLst>
-              <a:gs pos="8000">
-                <a:srgbClr val="000000">
-                  <a:alpha val="94000"/>
-                </a:srgbClr>
-              </a:gs>
-              <a:gs pos="100000">
-                <a:schemeClr val="accent1"/>
-              </a:gs>
-            </a:gsLst>
-            <a:lin ang="2400000" scaled="0"/>
-          </a:gradFill>
-          <a:ln>
-            <a:noFill/>
-          </a:ln>
-        </p:spPr>
-        <p:style>
-          <a:lnRef idx="2">
-            <a:schemeClr val="accent1">
-              <a:shade val="50000"/>
-            </a:schemeClr>
-          </a:lnRef>
-          <a:fillRef idx="1">
-            <a:schemeClr val="accent1"/>
-          </a:fillRef>
-          <a:effectRef idx="0">
-            <a:schemeClr val="accent1"/>
-          </a:effectRef>
-          <a:fontRef idx="minor">
-            <a:schemeClr val="lt1"/>
-          </a:fontRef>
-        </p:style>
-        <p:txBody>
-          <a:bodyPr rtlCol="0" anchor="ctr"/>
-          <a:lstStyle/>
-          <a:p>
-            <a:pPr algn="ctr"/>
-            <a:endParaRPr lang="en-US"/>
-          </a:p>
-        </p:txBody>
-      </p:sp>
-      <p:sp>
-        <p:nvSpPr>
-          <p:cNvPr id="6" name="Rectangle 1034">
-            <a:extLst>
-              <a:ext uri="{FF2B5EF4-FFF2-40B4-BE49-F238E27FC236}">
-                <a16:creationId xmlns:a16="http://schemas.microsoft.com/office/drawing/2014/main" id="{9462AFEF-68BA-BDFD-3454-E5E6CCB6C5F2}"/>
-              </a:ext>
-              <a:ext uri="{C183D7F6-B498-43B3-948B-1728B52AA6E4}">
-                <adec:decorative xmlns:adec="http://schemas.microsoft.com/office/drawing/2017/decorative" val="1"/>
-              </a:ext>
-            </a:extLst>
-          </p:cNvPr>
-          <p:cNvSpPr/>
-          <p:nvPr>
-            <p:extLst>
-              <p:ext uri="{386F3935-93C4-4BCD-93E2-E3B085C9AB24}">
-                <p16:designElem xmlns:p16="http://schemas.microsoft.com/office/powerpoint/2015/main" val="1"/>
-              </p:ext>
-            </p:extLst>
-          </p:nvPr>
-        </p:nvSpPr>
-        <p:spPr>
-          <a:xfrm rot="10800000" flipH="1">
-            <a:off x="8123333" y="-2"/>
-            <a:ext cx="4092521" cy="6400369"/>
-          </a:xfrm>
-          <a:prstGeom prst="rect">
-            <a:avLst/>
-          </a:prstGeom>
-          <a:gradFill>
-            <a:gsLst>
-              <a:gs pos="31000">
-                <a:schemeClr val="accent1">
-                  <a:lumMod val="50000"/>
-                  <a:alpha val="0"/>
-                </a:schemeClr>
-              </a:gs>
-              <a:gs pos="100000">
-                <a:schemeClr val="accent1">
-                  <a:lumMod val="50000"/>
-                  <a:alpha val="26000"/>
-                </a:schemeClr>
-              </a:gs>
-            </a:gsLst>
-            <a:lin ang="18000000" scaled="0"/>
-          </a:gradFill>
-          <a:ln>
-            <a:noFill/>
-          </a:ln>
-        </p:spPr>
-        <p:style>
-          <a:lnRef idx="2">
-            <a:schemeClr val="accent1">
-              <a:shade val="50000"/>
-            </a:schemeClr>
-          </a:lnRef>
-          <a:fillRef idx="1">
-            <a:schemeClr val="accent1"/>
-          </a:fillRef>
-          <a:effectRef idx="0">
-            <a:schemeClr val="accent1"/>
-          </a:effectRef>
-          <a:fontRef idx="minor">
-            <a:schemeClr val="lt1"/>
-          </a:fontRef>
-        </p:style>
-        <p:txBody>
-          <a:bodyPr rtlCol="0" anchor="ctr"/>
-          <a:lstStyle/>
-          <a:p>
-            <a:pPr algn="ctr"/>
-            <a:endParaRPr lang="en-US" dirty="0"/>
-          </a:p>
-        </p:txBody>
-      </p:sp>
-      <p:sp>
-        <p:nvSpPr>
-          <p:cNvPr id="7" name="Rectangle 1036">
-            <a:extLst>
-              <a:ext uri="{FF2B5EF4-FFF2-40B4-BE49-F238E27FC236}">
-                <a16:creationId xmlns:a16="http://schemas.microsoft.com/office/drawing/2014/main" id="{8A402376-CC3B-0BAA-C8B4-54824EBB7819}"/>
-              </a:ext>
-              <a:ext uri="{C183D7F6-B498-43B3-948B-1728B52AA6E4}">
-                <adec:decorative xmlns:adec="http://schemas.microsoft.com/office/drawing/2017/decorative" val="1"/>
-              </a:ext>
-            </a:extLst>
-          </p:cNvPr>
-          <p:cNvSpPr/>
-          <p:nvPr>
-            <p:extLst>
-              <p:ext uri="{386F3935-93C4-4BCD-93E2-E3B085C9AB24}">
-                <p16:designElem xmlns:p16="http://schemas.microsoft.com/office/powerpoint/2015/main" val="1"/>
-              </p:ext>
-            </p:extLst>
-          </p:nvPr>
-        </p:nvSpPr>
-        <p:spPr>
-          <a:xfrm rot="10800000" flipH="1">
-            <a:off x="8123333" y="-22"/>
-            <a:ext cx="4068667" cy="6400389"/>
-          </a:xfrm>
-          <a:prstGeom prst="rect">
-            <a:avLst/>
-          </a:prstGeom>
-          <a:gradFill>
-            <a:gsLst>
-              <a:gs pos="0">
-                <a:schemeClr val="accent1">
-                  <a:alpha val="0"/>
-                </a:schemeClr>
-              </a:gs>
-              <a:gs pos="72000">
-                <a:srgbClr val="000000">
-                  <a:alpha val="21000"/>
-                </a:srgbClr>
-              </a:gs>
-            </a:gsLst>
-            <a:lin ang="3000000" scaled="0"/>
-          </a:gradFill>
-          <a:ln>
-            <a:noFill/>
-          </a:ln>
-        </p:spPr>
-        <p:style>
-          <a:lnRef idx="2">
-            <a:schemeClr val="accent1">
-              <a:shade val="50000"/>
-            </a:schemeClr>
-          </a:lnRef>
-          <a:fillRef idx="1">
-            <a:schemeClr val="accent1"/>
-          </a:fillRef>
-          <a:effectRef idx="0">
-            <a:schemeClr val="accent1"/>
-          </a:effectRef>
-          <a:fontRef idx="minor">
-            <a:schemeClr val="lt1"/>
-          </a:fontRef>
-        </p:style>
-        <p:txBody>
-          <a:bodyPr rtlCol="0" anchor="ctr"/>
-          <a:lstStyle/>
-          <a:p>
-            <a:pPr algn="ctr"/>
-            <a:endParaRPr lang="en-US" dirty="0"/>
-          </a:p>
-        </p:txBody>
-      </p:sp>
-      <p:sp>
-        <p:nvSpPr>
-          <p:cNvPr id="8" name="Rectangle 1038">
-            <a:extLst>
-              <a:ext uri="{FF2B5EF4-FFF2-40B4-BE49-F238E27FC236}">
-                <a16:creationId xmlns:a16="http://schemas.microsoft.com/office/drawing/2014/main" id="{9E5ABCD2-0D68-91DE-1869-94CBFB96E455}"/>
-              </a:ext>
-              <a:ext uri="{C183D7F6-B498-43B3-948B-1728B52AA6E4}">
-                <adec:decorative xmlns:adec="http://schemas.microsoft.com/office/drawing/2017/decorative" val="1"/>
-              </a:ext>
-            </a:extLst>
-          </p:cNvPr>
-          <p:cNvSpPr/>
-          <p:nvPr>
-            <p:extLst>
-              <p:ext uri="{386F3935-93C4-4BCD-93E2-E3B085C9AB24}">
-                <p16:designElem xmlns:p16="http://schemas.microsoft.com/office/powerpoint/2015/main" val="1"/>
-              </p:ext>
-            </p:extLst>
-          </p:nvPr>
-        </p:nvSpPr>
-        <p:spPr>
-          <a:xfrm rot="10800000" flipH="1">
-            <a:off x="8123333" y="-10"/>
-            <a:ext cx="3611467" cy="6857997"/>
-          </a:xfrm>
-          <a:prstGeom prst="rect">
-            <a:avLst/>
-          </a:prstGeom>
-          <a:gradFill>
-            <a:gsLst>
-              <a:gs pos="0">
-                <a:schemeClr val="accent1">
-                  <a:alpha val="0"/>
-                </a:schemeClr>
-              </a:gs>
-              <a:gs pos="93000">
-                <a:srgbClr val="000000">
-                  <a:alpha val="29000"/>
-                </a:srgbClr>
-              </a:gs>
-            </a:gsLst>
-            <a:lin ang="5400000" scaled="0"/>
-          </a:gradFill>
-          <a:ln>
-            <a:noFill/>
-          </a:ln>
-        </p:spPr>
-        <p:style>
-          <a:lnRef idx="2">
-            <a:schemeClr val="accent1">
-              <a:shade val="50000"/>
-            </a:schemeClr>
-          </a:lnRef>
-          <a:fillRef idx="1">
-            <a:schemeClr val="accent1"/>
-          </a:fillRef>
-          <a:effectRef idx="0">
-            <a:schemeClr val="accent1"/>
-          </a:effectRef>
-          <a:fontRef idx="minor">
-            <a:schemeClr val="lt1"/>
-          </a:fontRef>
-        </p:style>
-        <p:txBody>
-          <a:bodyPr rtlCol="0" anchor="ctr"/>
-          <a:lstStyle/>
-          <a:p>
-            <a:pPr algn="ctr"/>
-            <a:endParaRPr lang="en-US" dirty="0"/>
+            <a:endParaRPr lang="en-US" sz="2000" dirty="0"/>
+          </a:p>
+          <a:p>
+            <a:pPr lvl="1"/>
+            <a:endParaRPr lang="en-US" sz="2000" dirty="0"/>
           </a:p>
         </p:txBody>
       </p:sp>
       <p:pic>
         <p:nvPicPr>
-          <p:cNvPr id="9" name="Picture 2" descr="Stadt Land Fluss - Papierspiele.at">
+          <p:cNvPr id="2050" name="Picture 2" descr="Denkriesen - Stadt Land Vollpfosten® Classic Edition – &quot;Intelligenz ist  relativ.&quot;' kaufen - Spielwaren">
             <a:extLst>
               <a:ext uri="{FF2B5EF4-FFF2-40B4-BE49-F238E27FC236}">
-                <a16:creationId xmlns:a16="http://schemas.microsoft.com/office/drawing/2014/main" id="{444A99C5-CF23-804A-F83E-67BBD63F00E6}"/>
+                <a16:creationId xmlns:a16="http://schemas.microsoft.com/office/drawing/2014/main" id="{F69765AE-B27C-C716-1CBC-65BBE43111B7}"/>
               </a:ext>
             </a:extLst>
           </p:cNvPr>
@@ -8880,8 +9960,8 @@
         </p:blipFill>
         <p:spPr bwMode="auto">
           <a:xfrm>
-            <a:off x="7097360" y="1359681"/>
-            <a:ext cx="4170530" cy="4170530"/>
+            <a:off x="8109502" y="1627051"/>
+            <a:ext cx="3615776" cy="3615776"/>
           </a:xfrm>
           <a:prstGeom prst="rect">
             <a:avLst/>
@@ -8898,69 +9978,6 @@
           </a:extLst>
         </p:spPr>
       </p:pic>
-      <p:sp>
-        <p:nvSpPr>
-          <p:cNvPr id="10" name="Textfeld 9">
-            <a:extLst>
-              <a:ext uri="{FF2B5EF4-FFF2-40B4-BE49-F238E27FC236}">
-                <a16:creationId xmlns:a16="http://schemas.microsoft.com/office/drawing/2014/main" id="{04BC82BF-6600-5D0A-C5EF-8861743E8622}"/>
-              </a:ext>
-            </a:extLst>
-          </p:cNvPr>
-          <p:cNvSpPr txBox="1"/>
-          <p:nvPr/>
-        </p:nvSpPr>
-        <p:spPr>
-          <a:xfrm>
-            <a:off x="7097360" y="5113158"/>
-            <a:ext cx="4170530" cy="417053"/>
-          </a:xfrm>
-          <a:prstGeom prst="rect">
-            <a:avLst/>
-          </a:prstGeom>
-          <a:solidFill>
-            <a:srgbClr val="000000">
-              <a:alpha val="50000"/>
-            </a:srgbClr>
-          </a:solidFill>
-          <a:ln>
-            <a:noFill/>
-          </a:ln>
-        </p:spPr>
-        <p:txBody>
-          <a:bodyPr wrap="square">
-            <a:noAutofit/>
-          </a:bodyPr>
-          <a:lstStyle/>
-          <a:p>
-            <a:pPr algn="ctr">
-              <a:spcAft>
-                <a:spcPts val="600"/>
-              </a:spcAft>
-            </a:pPr>
-            <a:r>
-              <a:rPr lang="de-DE" sz="1300">
-                <a:solidFill>
-                  <a:srgbClr val="FFFFFF"/>
-                </a:solidFill>
-                <a:hlinkClick r:id="rId3">
-                  <a:extLst>
-                    <a:ext uri="{A12FA001-AC4F-418D-AE19-62706E023703}">
-                      <ahyp:hlinkClr xmlns:ahyp="http://schemas.microsoft.com/office/drawing/2018/hyperlinkcolor" val="tx"/>
-                    </a:ext>
-                  </a:extLst>
-                </a:hlinkClick>
-              </a:rPr>
-              <a:t>stadt-land-fluss</a:t>
-            </a:r>
-            <a:endParaRPr lang="de-DE" sz="1300">
-              <a:solidFill>
-                <a:srgbClr val="FFFFFF"/>
-              </a:solidFill>
-            </a:endParaRPr>
-          </a:p>
-        </p:txBody>
-      </p:sp>
     </p:spTree>
     <p:extLst>
       <p:ext uri="{BB962C8B-B14F-4D97-AF65-F5344CB8AC3E}">
@@ -9001,7 +10018,7 @@
       </p:grpSpPr>
       <p:sp useBgFill="1">
         <p:nvSpPr>
-          <p:cNvPr id="30" name="Rectangle 29">
+          <p:cNvPr id="20" name="Rectangle 22">
             <a:extLst>
               <a:ext uri="{FF2B5EF4-FFF2-40B4-BE49-F238E27FC236}">
                 <a16:creationId xmlns:a16="http://schemas.microsoft.com/office/drawing/2014/main" id="{A8384FB5-9ADC-4DDC-881B-597D56F5B15D}"/>
@@ -9077,7 +10094,7 @@
       </p:sp>
       <p:sp>
         <p:nvSpPr>
-          <p:cNvPr id="32" name="Rectangle 31">
+          <p:cNvPr id="21" name="Rectangle 24">
             <a:extLst>
               <a:ext uri="{FF2B5EF4-FFF2-40B4-BE49-F238E27FC236}">
                 <a16:creationId xmlns:a16="http://schemas.microsoft.com/office/drawing/2014/main" id="{1199E1B1-A8C0-4FE8-A5A8-1CB41D69F857}"/>
@@ -9152,7 +10169,7 @@
       </p:sp>
       <p:sp>
         <p:nvSpPr>
-          <p:cNvPr id="34" name="Rectangle 33">
+          <p:cNvPr id="24" name="Rectangle 26">
             <a:extLst>
               <a:ext uri="{FF2B5EF4-FFF2-40B4-BE49-F238E27FC236}">
                 <a16:creationId xmlns:a16="http://schemas.microsoft.com/office/drawing/2014/main" id="{84A8DE83-DE75-4B41-9DB4-A7EC0B0DEC0B}"/>
@@ -9229,7 +10246,7 @@
       </p:sp>
       <p:sp>
         <p:nvSpPr>
-          <p:cNvPr id="36" name="Rectangle 35">
+          <p:cNvPr id="26" name="Rectangle 28">
             <a:extLst>
               <a:ext uri="{FF2B5EF4-FFF2-40B4-BE49-F238E27FC236}">
                 <a16:creationId xmlns:a16="http://schemas.microsoft.com/office/drawing/2014/main" id="{A7009A0A-BEF5-4EAC-AF15-E4F9F002E239}"/>
@@ -9307,7 +10324,7 @@
           <p:cNvPr id="2" name="Titel 1">
             <a:extLst>
               <a:ext uri="{FF2B5EF4-FFF2-40B4-BE49-F238E27FC236}">
-                <a16:creationId xmlns:a16="http://schemas.microsoft.com/office/drawing/2014/main" id="{130DB177-6AA1-7614-CC74-F42141AE8E93}"/>
+                <a16:creationId xmlns:a16="http://schemas.microsoft.com/office/drawing/2014/main" id="{48DF6141-78EB-EC20-2E28-140C34C2ADC3}"/>
               </a:ext>
             </a:extLst>
           </p:cNvPr>
@@ -9339,17 +10356,17 @@
                 <a:ea typeface="+mj-ea"/>
                 <a:cs typeface="+mj-cs"/>
               </a:rPr>
-              <a:t>Clockify</a:t>
+              <a:t>Technologien</a:t>
             </a:r>
           </a:p>
         </p:txBody>
       </p:sp>
       <p:pic>
         <p:nvPicPr>
-          <p:cNvPr id="9" name="Inhaltsplatzhalter 8" descr="Ein Bild, das Baby, Menschliches Gesicht, Pony, Person enthält.&#10;&#10;Automatisch generierte Beschreibung">
+          <p:cNvPr id="7" name="Inhaltsplatzhalter 6" descr="Ein Bild, das Text, Screenshot, Schrift enthält.&#10;&#10;Automatisch generierte Beschreibung">
             <a:extLst>
               <a:ext uri="{FF2B5EF4-FFF2-40B4-BE49-F238E27FC236}">
-                <a16:creationId xmlns:a16="http://schemas.microsoft.com/office/drawing/2014/main" id="{7852D209-7032-5E85-7580-74635263AA36}"/>
+                <a16:creationId xmlns:a16="http://schemas.microsoft.com/office/drawing/2014/main" id="{F1480E2A-AF53-0356-C859-20E30727ADCE}"/>
               </a:ext>
             </a:extLst>
           </p:cNvPr>
@@ -9361,120 +10378,25 @@
           </p:nvPr>
         </p:nvPicPr>
         <p:blipFill>
-          <a:blip r:embed="rId3">
-            <a:extLst>
-              <a:ext uri="{837473B0-CC2E-450A-ABE3-18F120FF3D39}">
-                <a1611:picAttrSrcUrl xmlns:a1611="http://schemas.microsoft.com/office/drawing/2016/11/main" r:id="rId4"/>
-              </a:ext>
-            </a:extLst>
-          </a:blip>
+          <a:blip r:embed="rId2"/>
           <a:stretch>
             <a:fillRect/>
           </a:stretch>
         </p:blipFill>
         <p:spPr>
           <a:xfrm>
-            <a:off x="432225" y="2139255"/>
-            <a:ext cx="11327549" cy="4106236"/>
+            <a:off x="432225" y="2861386"/>
+            <a:ext cx="11327549" cy="2661974"/>
           </a:xfrm>
           <a:prstGeom prst="rect">
             <a:avLst/>
           </a:prstGeom>
         </p:spPr>
       </p:pic>
-      <p:sp>
-        <p:nvSpPr>
-          <p:cNvPr id="10" name="Textfeld 9">
-            <a:extLst>
-              <a:ext uri="{FF2B5EF4-FFF2-40B4-BE49-F238E27FC236}">
-                <a16:creationId xmlns:a16="http://schemas.microsoft.com/office/drawing/2014/main" id="{4AEBE1FA-3905-F796-5E24-E35BD3B214F2}"/>
-              </a:ext>
-            </a:extLst>
-          </p:cNvPr>
-          <p:cNvSpPr txBox="1"/>
-          <p:nvPr/>
-        </p:nvSpPr>
-        <p:spPr>
-          <a:xfrm>
-            <a:off x="9235743" y="6870700"/>
-            <a:ext cx="2956257" cy="200055"/>
-          </a:xfrm>
-          <a:prstGeom prst="rect">
-            <a:avLst/>
-          </a:prstGeom>
-          <a:solidFill>
-            <a:srgbClr val="000000"/>
-          </a:solidFill>
-        </p:spPr>
-        <p:txBody>
-          <a:bodyPr wrap="none" rtlCol="0">
-            <a:spAutoFit/>
-          </a:bodyPr>
-          <a:lstStyle/>
-          <a:p>
-            <a:pPr algn="r">
-              <a:spcAft>
-                <a:spcPts val="600"/>
-              </a:spcAft>
-            </a:pPr>
-            <a:r>
-              <a:rPr lang="de-AT" sz="700">
-                <a:solidFill>
-                  <a:srgbClr val="FFFFFF"/>
-                </a:solidFill>
-              </a:rPr>
-              <a:t>"</a:t>
-            </a:r>
-            <a:r>
-              <a:rPr lang="de-AT" sz="700">
-                <a:solidFill>
-                  <a:srgbClr val="FFFFFF"/>
-                </a:solidFill>
-                <a:hlinkClick r:id="rId4" tooltip="https://downsindromearenmundua.blogspot.com/2011/01/el-educador-social-en-la-sociedad-de-la.html">
-                  <a:extLst>
-                    <a:ext uri="{A12FA001-AC4F-418D-AE19-62706E023703}">
-                      <ahyp:hlinkClr xmlns:ahyp="http://schemas.microsoft.com/office/drawing/2018/hyperlinkcolor" val="tx"/>
-                    </a:ext>
-                  </a:extLst>
-                </a:hlinkClick>
-              </a:rPr>
-              <a:t>Dieses Foto</a:t>
-            </a:r>
-            <a:r>
-              <a:rPr lang="de-AT" sz="700">
-                <a:solidFill>
-                  <a:srgbClr val="FFFFFF"/>
-                </a:solidFill>
-              </a:rPr>
-              <a:t>" von Unbekannter Autor ist lizenziert gemäß </a:t>
-            </a:r>
-            <a:r>
-              <a:rPr lang="de-AT" sz="700">
-                <a:solidFill>
-                  <a:srgbClr val="FFFFFF"/>
-                </a:solidFill>
-                <a:hlinkClick r:id="rId5" tooltip="https://creativecommons.org/licenses/by-nc-nd/3.0/">
-                  <a:extLst>
-                    <a:ext uri="{A12FA001-AC4F-418D-AE19-62706E023703}">
-                      <ahyp:hlinkClr xmlns:ahyp="http://schemas.microsoft.com/office/drawing/2018/hyperlinkcolor" val="tx"/>
-                    </a:ext>
-                  </a:extLst>
-                </a:hlinkClick>
-              </a:rPr>
-              <a:t>CC BY-NC-ND</a:t>
-            </a:r>
-            <a:endParaRPr lang="de-AT" sz="700">
-              <a:solidFill>
-                <a:srgbClr val="FFFFFF"/>
-              </a:solidFill>
-            </a:endParaRPr>
-          </a:p>
-        </p:txBody>
-      </p:sp>
     </p:spTree>
     <p:extLst>
       <p:ext uri="{BB962C8B-B14F-4D97-AF65-F5344CB8AC3E}">
-        <p14:creationId xmlns:p14="http://schemas.microsoft.com/office/powerpoint/2010/main" val="2778858687"/>
+        <p14:creationId xmlns:p14="http://schemas.microsoft.com/office/powerpoint/2010/main" val="1842017856"/>
       </p:ext>
     </p:extLst>
   </p:cSld>
@@ -9923,10 +10845,10 @@
       </p:sp>
       <p:pic>
         <p:nvPicPr>
-          <p:cNvPr id="5" name="Inhaltsplatzhalter 4" descr="Ein Bild, das Text, Schrift, Screenshot, Grafiken enthält.&#10;&#10;Automatisch generierte Beschreibung">
+          <p:cNvPr id="4" name="Grafik 3">
             <a:extLst>
               <a:ext uri="{FF2B5EF4-FFF2-40B4-BE49-F238E27FC236}">
-                <a16:creationId xmlns:a16="http://schemas.microsoft.com/office/drawing/2014/main" id="{4AC05772-16C6-685C-689D-965C8920885D}"/>
+                <a16:creationId xmlns:a16="http://schemas.microsoft.com/office/drawing/2014/main" id="{B0D6BA97-3EF3-B59C-33C6-BDF1AD85E8EA}"/>
               </a:ext>
             </a:extLst>
           </p:cNvPr>
@@ -9936,19 +10858,29 @@
           <p:nvPr/>
         </p:nvPicPr>
         <p:blipFill>
-          <a:blip r:embed="rId2"/>
+          <a:blip r:embed="rId2">
+            <a:alphaModFix/>
+          </a:blip>
           <a:stretch>
             <a:fillRect/>
           </a:stretch>
         </p:blipFill>
         <p:spPr>
           <a:xfrm>
-            <a:off x="1940256" y="830629"/>
-            <a:ext cx="8311487" cy="2359154"/>
+            <a:off x="3228814" y="465360"/>
+            <a:ext cx="5727700" cy="4330700"/>
           </a:xfrm>
           <a:prstGeom prst="rect">
             <a:avLst/>
           </a:prstGeom>
+          <a:solidFill>
+            <a:schemeClr val="tx1"/>
+          </a:solidFill>
+          <a:effectLst>
+            <a:outerShdw blurRad="50800" dist="50800" dir="5400000" sx="96000" sy="96000" algn="ctr" rotWithShape="0">
+              <a:schemeClr val="bg1"/>
+            </a:outerShdw>
+          </a:effectLst>
         </p:spPr>
       </p:pic>
     </p:spTree>
@@ -9991,10 +10923,10 @@
       </p:grpSpPr>
       <p:sp useBgFill="1">
         <p:nvSpPr>
-          <p:cNvPr id="10" name="Rectangle 9">
+          <p:cNvPr id="31" name="Rectangle 30">
             <a:extLst>
               <a:ext uri="{FF2B5EF4-FFF2-40B4-BE49-F238E27FC236}">
-                <a16:creationId xmlns:a16="http://schemas.microsoft.com/office/drawing/2014/main" id="{A8384FB5-9ADC-4DDC-881B-597D56F5B15D}"/>
+                <a16:creationId xmlns:a16="http://schemas.microsoft.com/office/drawing/2014/main" id="{0E30439A-8A5B-46EC-8283-9B6B031D40D0}"/>
               </a:ext>
               <a:ext uri="{C183D7F6-B498-43B3-948B-1728B52AA6E4}">
                 <adec:decorative xmlns:adec="http://schemas.microsoft.com/office/drawing/2017/decorative" val="1"/>
@@ -10067,10 +10999,10 @@
       </p:sp>
       <p:sp>
         <p:nvSpPr>
-          <p:cNvPr id="12" name="Rectangle 11">
+          <p:cNvPr id="33" name="Rectangle 32">
             <a:extLst>
               <a:ext uri="{FF2B5EF4-FFF2-40B4-BE49-F238E27FC236}">
-                <a16:creationId xmlns:a16="http://schemas.microsoft.com/office/drawing/2014/main" id="{91E5A9A7-95C6-4F4F-B00E-C82E07FE62EF}"/>
+                <a16:creationId xmlns:a16="http://schemas.microsoft.com/office/drawing/2014/main" id="{5CEAD642-85CF-4750-8432-7C80C901F001}"/>
               </a:ext>
               <a:ext uri="{C183D7F6-B498-43B3-948B-1728B52AA6E4}">
                 <adec:decorative xmlns:adec="http://schemas.microsoft.com/office/drawing/2017/decorative" val="1"/>
@@ -10089,9 +11021,9 @@
           </p:nvPr>
         </p:nvSpPr>
         <p:spPr>
-          <a:xfrm rot="5400000" flipH="1">
-            <a:off x="-1417539" y="1417538"/>
-            <a:ext cx="6875818" cy="4040744"/>
+          <a:xfrm>
+            <a:off x="0" y="-427"/>
+            <a:ext cx="12192001" cy="6858000"/>
           </a:xfrm>
           <a:prstGeom prst="rect">
             <a:avLst/>
@@ -10107,7 +11039,7 @@
                 </a:schemeClr>
               </a:gs>
             </a:gsLst>
-            <a:lin ang="18600000" scaled="0"/>
+            <a:lin ang="15000000" scaled="0"/>
           </a:gradFill>
           <a:ln>
             <a:noFill/>
@@ -10134,16 +11066,16 @@
           <a:lstStyle/>
           <a:p>
             <a:pPr algn="ctr"/>
-            <a:endParaRPr lang="en-US" dirty="0"/>
+            <a:endParaRPr lang="en-US"/>
           </a:p>
         </p:txBody>
       </p:sp>
       <p:sp>
         <p:nvSpPr>
-          <p:cNvPr id="14" name="Rectangle 13">
+          <p:cNvPr id="35" name="Rectangle 34">
             <a:extLst>
               <a:ext uri="{FF2B5EF4-FFF2-40B4-BE49-F238E27FC236}">
-                <a16:creationId xmlns:a16="http://schemas.microsoft.com/office/drawing/2014/main" id="{D07DD2DE-F619-49DD-B5E7-03A290FF4ED1}"/>
+                <a16:creationId xmlns:a16="http://schemas.microsoft.com/office/drawing/2014/main" id="{FA33EEAE-15D5-4119-8C1E-89D943F911EF}"/>
               </a:ext>
               <a:ext uri="{C183D7F6-B498-43B3-948B-1728B52AA6E4}">
                 <adec:decorative xmlns:adec="http://schemas.microsoft.com/office/drawing/2017/decorative" val="1"/>
@@ -10162,28 +11094,28 @@
           </p:nvPr>
         </p:nvSpPr>
         <p:spPr>
-          <a:xfrm rot="16200000">
-            <a:off x="-158495" y="2660473"/>
-            <a:ext cx="4355594" cy="4038603"/>
+          <a:xfrm rot="10800000" flipH="1">
+            <a:off x="455521" y="-1720"/>
+            <a:ext cx="11750040" cy="6840685"/>
           </a:xfrm>
           <a:prstGeom prst="rect">
             <a:avLst/>
           </a:prstGeom>
           <a:gradFill>
             <a:gsLst>
-              <a:gs pos="0">
+              <a:gs pos="21000">
                 <a:schemeClr val="accent1">
-                  <a:alpha val="50000"/>
+                  <a:lumMod val="50000"/>
+                  <a:alpha val="61000"/>
                 </a:schemeClr>
               </a:gs>
               <a:gs pos="100000">
                 <a:schemeClr val="accent1">
-                  <a:lumMod val="50000"/>
                   <a:alpha val="0"/>
                 </a:schemeClr>
               </a:gs>
             </a:gsLst>
-            <a:lin ang="11400000" scaled="0"/>
+            <a:lin ang="21594000" scaled="0"/>
           </a:gradFill>
           <a:ln>
             <a:noFill/>
@@ -10216,10 +11148,10 @@
       </p:sp>
       <p:sp>
         <p:nvSpPr>
-          <p:cNvPr id="16" name="Rectangle 15">
+          <p:cNvPr id="37" name="Rectangle 36">
             <a:extLst>
               <a:ext uri="{FF2B5EF4-FFF2-40B4-BE49-F238E27FC236}">
-                <a16:creationId xmlns:a16="http://schemas.microsoft.com/office/drawing/2014/main" id="{85149191-5F60-4A28-AAFF-039F96B0F3EC}"/>
+                <a16:creationId xmlns:a16="http://schemas.microsoft.com/office/drawing/2014/main" id="{730D8B3B-9B80-4025-B934-26DC7D7CD231}"/>
               </a:ext>
               <a:ext uri="{C183D7F6-B498-43B3-948B-1728B52AA6E4}">
                 <adec:decorative xmlns:adec="http://schemas.microsoft.com/office/drawing/2017/decorative" val="1"/>
@@ -10238,9 +11170,9 @@
           </p:nvPr>
         </p:nvSpPr>
         <p:spPr>
-          <a:xfrm rot="16200000" flipH="1">
-            <a:off x="-1180882" y="1638085"/>
-            <a:ext cx="6857572" cy="3581401"/>
+          <a:xfrm>
+            <a:off x="8606054" y="-1291"/>
+            <a:ext cx="3608179" cy="6858864"/>
           </a:xfrm>
           <a:prstGeom prst="rect">
             <a:avLst/>
@@ -10248,17 +11180,18 @@
           <a:gradFill>
             <a:gsLst>
               <a:gs pos="0">
-                <a:srgbClr val="000000">
-                  <a:alpha val="59000"/>
-                </a:srgbClr>
-              </a:gs>
-              <a:gs pos="69000">
                 <a:schemeClr val="accent1">
+                  <a:lumMod val="75000"/>
                   <a:alpha val="0"/>
                 </a:schemeClr>
               </a:gs>
+              <a:gs pos="99000">
+                <a:srgbClr val="000000">
+                  <a:alpha val="41000"/>
+                </a:srgbClr>
+              </a:gs>
             </a:gsLst>
-            <a:lin ang="13200000" scaled="0"/>
+            <a:lin ang="16200000" scaled="0"/>
           </a:gradFill>
           <a:ln>
             <a:noFill/>
@@ -10285,16 +11218,16 @@
           <a:lstStyle/>
           <a:p>
             <a:pPr algn="ctr"/>
-            <a:endParaRPr lang="en-US" dirty="0"/>
+            <a:endParaRPr lang="en-US"/>
           </a:p>
         </p:txBody>
       </p:sp>
       <p:sp>
         <p:nvSpPr>
-          <p:cNvPr id="18" name="Freeform: Shape 17">
+          <p:cNvPr id="39" name="Oval 38">
             <a:extLst>
               <a:ext uri="{FF2B5EF4-FFF2-40B4-BE49-F238E27FC236}">
-                <a16:creationId xmlns:a16="http://schemas.microsoft.com/office/drawing/2014/main" id="{F8260ED5-17F7-4158-B241-D51DD4CF1B7E}"/>
+                <a16:creationId xmlns:a16="http://schemas.microsoft.com/office/drawing/2014/main" id="{B5A1B09C-1565-46F8-B70F-621C5EB48A09}"/>
               </a:ext>
               <a:ext uri="{C183D7F6-B498-43B3-948B-1728B52AA6E4}">
                 <adec:decorative xmlns:adec="http://schemas.microsoft.com/office/drawing/2017/decorative" val="1"/>
@@ -10313,123 +11246,29 @@
           </p:nvPr>
         </p:nvSpPr>
         <p:spPr>
-          <a:xfrm rot="6097846">
-            <a:off x="-747355" y="1201312"/>
-            <a:ext cx="4808302" cy="4088666"/>
+          <a:xfrm rot="15274173">
+            <a:off x="6059728" y="779270"/>
+            <a:ext cx="4967533" cy="4988390"/>
           </a:xfrm>
-          <a:custGeom>
+          <a:prstGeom prst="ellipse">
             <a:avLst/>
-            <a:gdLst>
-              <a:gd name="connsiteX0" fmla="*/ 48844 w 4808302"/>
-              <a:gd name="connsiteY0" fmla="*/ 2888671 h 4088666"/>
-              <a:gd name="connsiteX1" fmla="*/ 0 w 4808302"/>
-              <a:gd name="connsiteY1" fmla="*/ 2404151 h 4088666"/>
-              <a:gd name="connsiteX2" fmla="*/ 2404151 w 4808302"/>
-              <a:gd name="connsiteY2" fmla="*/ 0 h 4088666"/>
-              <a:gd name="connsiteX3" fmla="*/ 4808302 w 4808302"/>
-              <a:gd name="connsiteY3" fmla="*/ 2404151 h 4088666"/>
-              <a:gd name="connsiteX4" fmla="*/ 4700216 w 4808302"/>
-              <a:gd name="connsiteY4" fmla="*/ 3119072 h 4088666"/>
-              <a:gd name="connsiteX5" fmla="*/ 4643143 w 4808302"/>
-              <a:gd name="connsiteY5" fmla="*/ 3275009 h 4088666"/>
-              <a:gd name="connsiteX6" fmla="*/ 690093 w 4808302"/>
-              <a:gd name="connsiteY6" fmla="*/ 4088666 h 4088666"/>
-              <a:gd name="connsiteX7" fmla="*/ 548991 w 4808302"/>
-              <a:gd name="connsiteY7" fmla="*/ 3933414 h 4088666"/>
-              <a:gd name="connsiteX8" fmla="*/ 48844 w 4808302"/>
-              <a:gd name="connsiteY8" fmla="*/ 2888671 h 4088666"/>
-            </a:gdLst>
-            <a:ahLst/>
-            <a:cxnLst>
-              <a:cxn ang="0">
-                <a:pos x="connsiteX0" y="connsiteY0"/>
-              </a:cxn>
-              <a:cxn ang="0">
-                <a:pos x="connsiteX1" y="connsiteY1"/>
-              </a:cxn>
-              <a:cxn ang="0">
-                <a:pos x="connsiteX2" y="connsiteY2"/>
-              </a:cxn>
-              <a:cxn ang="0">
-                <a:pos x="connsiteX3" y="connsiteY3"/>
-              </a:cxn>
-              <a:cxn ang="0">
-                <a:pos x="connsiteX4" y="connsiteY4"/>
-              </a:cxn>
-              <a:cxn ang="0">
-                <a:pos x="connsiteX5" y="connsiteY5"/>
-              </a:cxn>
-              <a:cxn ang="0">
-                <a:pos x="connsiteX6" y="connsiteY6"/>
-              </a:cxn>
-              <a:cxn ang="0">
-                <a:pos x="connsiteX7" y="connsiteY7"/>
-              </a:cxn>
-              <a:cxn ang="0">
-                <a:pos x="connsiteX8" y="connsiteY8"/>
-              </a:cxn>
-            </a:cxnLst>
-            <a:rect l="l" t="t" r="r" b="b"/>
-            <a:pathLst>
-              <a:path w="4808302" h="4088666">
-                <a:moveTo>
-                  <a:pt x="48844" y="2888671"/>
-                </a:moveTo>
-                <a:cubicBezTo>
-                  <a:pt x="16818" y="2732167"/>
-                  <a:pt x="0" y="2570123"/>
-                  <a:pt x="0" y="2404151"/>
-                </a:cubicBezTo>
-                <a:cubicBezTo>
-                  <a:pt x="0" y="1076375"/>
-                  <a:pt x="1076375" y="0"/>
-                  <a:pt x="2404151" y="0"/>
-                </a:cubicBezTo>
-                <a:cubicBezTo>
-                  <a:pt x="3731927" y="0"/>
-                  <a:pt x="4808302" y="1076375"/>
-                  <a:pt x="4808302" y="2404151"/>
-                </a:cubicBezTo>
-                <a:cubicBezTo>
-                  <a:pt x="4808302" y="2653109"/>
-                  <a:pt x="4770461" y="2893229"/>
-                  <a:pt x="4700216" y="3119072"/>
-                </a:cubicBezTo>
-                <a:lnTo>
-                  <a:pt x="4643143" y="3275009"/>
-                </a:lnTo>
-                <a:lnTo>
-                  <a:pt x="690093" y="4088666"/>
-                </a:lnTo>
-                <a:lnTo>
-                  <a:pt x="548991" y="3933414"/>
-                </a:lnTo>
-                <a:cubicBezTo>
-                  <a:pt x="304015" y="3636572"/>
-                  <a:pt x="128908" y="3279932"/>
-                  <a:pt x="48844" y="2888671"/>
-                </a:cubicBezTo>
-                <a:close/>
-              </a:path>
-            </a:pathLst>
-          </a:custGeom>
+          </a:prstGeom>
           <a:gradFill>
             <a:gsLst>
-              <a:gs pos="39000">
+              <a:gs pos="0">
+                <a:schemeClr val="accent1">
+                  <a:alpha val="24000"/>
+                </a:schemeClr>
+              </a:gs>
+              <a:gs pos="79000">
                 <a:schemeClr val="accent1">
                   <a:lumMod val="60000"/>
                   <a:lumOff val="40000"/>
                   <a:alpha val="0"/>
                 </a:schemeClr>
               </a:gs>
-              <a:gs pos="100000">
-                <a:schemeClr val="accent1">
-                  <a:lumMod val="75000"/>
-                  <a:alpha val="26000"/>
-                </a:schemeClr>
-              </a:gs>
             </a:gsLst>
-            <a:lin ang="18600000" scaled="0"/>
+            <a:lin ang="14400000" scaled="0"/>
           </a:gradFill>
           <a:ln>
             <a:noFill/>
@@ -10452,9 +11291,7 @@
           </a:fontRef>
         </p:style>
         <p:txBody>
-          <a:bodyPr wrap="square" rtlCol="0" anchor="ctr">
-            <a:noAutofit/>
-          </a:bodyPr>
+          <a:bodyPr rtlCol="0" anchor="ctr"/>
           <a:lstStyle/>
           <a:p>
             <a:pPr algn="ctr"/>
@@ -10467,7 +11304,7 @@
           <p:cNvPr id="2" name="Titel 1">
             <a:extLst>
               <a:ext uri="{FF2B5EF4-FFF2-40B4-BE49-F238E27FC236}">
-                <a16:creationId xmlns:a16="http://schemas.microsoft.com/office/drawing/2014/main" id="{48DF6141-78EB-EC20-2E28-140C34C2ADC3}"/>
+                <a16:creationId xmlns:a16="http://schemas.microsoft.com/office/drawing/2014/main" id="{130DB177-6AA1-7614-CC74-F42141AE8E93}"/>
               </a:ext>
             </a:extLst>
           </p:cNvPr>
@@ -10480,18 +11317,19 @@
         </p:nvSpPr>
         <p:spPr>
           <a:xfrm>
-            <a:off x="660041" y="2767106"/>
-            <a:ext cx="2880828" cy="3071906"/>
+            <a:off x="1386865" y="818984"/>
+            <a:ext cx="6596245" cy="3268520"/>
           </a:xfrm>
         </p:spPr>
         <p:txBody>
-          <a:bodyPr vert="horz" lIns="91440" tIns="45720" rIns="91440" bIns="45720" rtlCol="0" anchor="t">
+          <a:bodyPr vert="horz" lIns="91440" tIns="45720" rIns="91440" bIns="45720" rtlCol="0" anchor="b">
             <a:normAutofit/>
           </a:bodyPr>
           <a:lstStyle/>
           <a:p>
+            <a:pPr algn="r"/>
             <a:r>
-              <a:rPr lang="en-US" sz="3700" kern="1200">
+              <a:rPr lang="en-US" sz="4800" kern="1200" dirty="0" err="1">
                 <a:solidFill>
                   <a:srgbClr val="FFFFFF"/>
                 </a:solidFill>
@@ -10499,53 +11337,175 @@
                 <a:ea typeface="+mj-ea"/>
                 <a:cs typeface="+mj-cs"/>
               </a:rPr>
-              <a:t>Technologien</a:t>
+              <a:t>Clockify</a:t>
             </a:r>
+            <a:endParaRPr lang="en-US" sz="4800" kern="1200" dirty="0">
+              <a:solidFill>
+                <a:srgbClr val="FFFFFF"/>
+              </a:solidFill>
+              <a:latin typeface="+mj-lt"/>
+              <a:ea typeface="+mj-ea"/>
+              <a:cs typeface="+mj-cs"/>
+            </a:endParaRPr>
           </a:p>
         </p:txBody>
       </p:sp>
-      <p:pic>
-        <p:nvPicPr>
-          <p:cNvPr id="5" name="Inhaltsplatzhalter 4" descr="Ein Bild, das Menschliches Gesicht, draußen, Person, Mensch enthält.&#10;&#10;Automatisch generierte Beschreibung">
+      <p:sp>
+        <p:nvSpPr>
+          <p:cNvPr id="41" name="Rectangle 40">
             <a:extLst>
               <a:ext uri="{FF2B5EF4-FFF2-40B4-BE49-F238E27FC236}">
-                <a16:creationId xmlns:a16="http://schemas.microsoft.com/office/drawing/2014/main" id="{DD2A62F2-1783-3A56-90F7-BB257B483076}"/>
+                <a16:creationId xmlns:a16="http://schemas.microsoft.com/office/drawing/2014/main" id="{8C516CC8-80AC-446C-A56E-9F54B7210402}"/>
+              </a:ext>
+              <a:ext uri="{C183D7F6-B498-43B3-948B-1728B52AA6E4}">
+                <adec:decorative xmlns:adec="http://schemas.microsoft.com/office/drawing/2017/decorative" val="1"/>
               </a:ext>
             </a:extLst>
           </p:cNvPr>
-          <p:cNvPicPr>
-            <a:picLocks noGrp="1" noChangeAspect="1"/>
-          </p:cNvPicPr>
+          <p:cNvSpPr>
+            <a:spLocks noGrp="1" noRot="1" noChangeAspect="1" noMove="1" noResize="1" noEditPoints="1" noAdjustHandles="1" noChangeArrowheads="1" noChangeShapeType="1" noTextEdit="1"/>
+          </p:cNvSpPr>
           <p:nvPr>
-            <p:ph idx="1"/>
+            <p:extLst>
+              <p:ext uri="{386F3935-93C4-4BCD-93E2-E3B085C9AB24}">
+                <p16:designElem xmlns:p16="http://schemas.microsoft.com/office/powerpoint/2015/main" val="1"/>
+              </p:ext>
+            </p:extLst>
           </p:nvPr>
-        </p:nvPicPr>
-        <p:blipFill>
-          <a:blip r:embed="rId2">
-            <a:extLst>
-              <a:ext uri="{837473B0-CC2E-450A-ABE3-18F120FF3D39}">
-                <a1611:picAttrSrcUrl xmlns:a1611="http://schemas.microsoft.com/office/drawing/2016/11/main" r:id="rId3"/>
-              </a:ext>
-            </a:extLst>
-          </a:blip>
-          <a:stretch>
-            <a:fillRect/>
-          </a:stretch>
-        </p:blipFill>
+        </p:nvSpPr>
         <p:spPr>
-          <a:xfrm>
-            <a:off x="4502428" y="1017407"/>
-            <a:ext cx="7225748" cy="4823186"/>
+          <a:xfrm rot="10800000" flipH="1">
+            <a:off x="6314" y="4480038"/>
+            <a:ext cx="12179371" cy="2377962"/>
           </a:xfrm>
           <a:prstGeom prst="rect">
             <a:avLst/>
           </a:prstGeom>
+          <a:gradFill>
+            <a:gsLst>
+              <a:gs pos="0">
+                <a:schemeClr val="accent1">
+                  <a:lumMod val="75000"/>
+                  <a:alpha val="50000"/>
+                </a:schemeClr>
+              </a:gs>
+              <a:gs pos="99000">
+                <a:srgbClr val="000000">
+                  <a:alpha val="34000"/>
+                </a:srgbClr>
+              </a:gs>
+            </a:gsLst>
+            <a:lin ang="17400000" scaled="0"/>
+          </a:gradFill>
+          <a:ln>
+            <a:noFill/>
+          </a:ln>
         </p:spPr>
-      </p:pic>
+        <p:style>
+          <a:lnRef idx="2">
+            <a:schemeClr val="accent1">
+              <a:shade val="50000"/>
+            </a:schemeClr>
+          </a:lnRef>
+          <a:fillRef idx="1">
+            <a:schemeClr val="accent1"/>
+          </a:fillRef>
+          <a:effectRef idx="0">
+            <a:schemeClr val="accent1"/>
+          </a:effectRef>
+          <a:fontRef idx="minor">
+            <a:schemeClr val="lt1"/>
+          </a:fontRef>
+        </p:style>
+        <p:txBody>
+          <a:bodyPr rtlCol="0" anchor="ctr"/>
+          <a:lstStyle/>
+          <a:p>
+            <a:pPr algn="ctr"/>
+            <a:endParaRPr lang="en-US"/>
+          </a:p>
+        </p:txBody>
+      </p:sp>
+      <p:sp>
+        <p:nvSpPr>
+          <p:cNvPr id="43" name="Rectangle 42">
+            <a:extLst>
+              <a:ext uri="{FF2B5EF4-FFF2-40B4-BE49-F238E27FC236}">
+                <a16:creationId xmlns:a16="http://schemas.microsoft.com/office/drawing/2014/main" id="{53947E58-F088-49F1-A3D1-DEA690192E84}"/>
+              </a:ext>
+              <a:ext uri="{C183D7F6-B498-43B3-948B-1728B52AA6E4}">
+                <adec:decorative xmlns:adec="http://schemas.microsoft.com/office/drawing/2017/decorative" val="1"/>
+              </a:ext>
+            </a:extLst>
+          </p:cNvPr>
+          <p:cNvSpPr>
+            <a:spLocks noGrp="1" noRot="1" noChangeAspect="1" noMove="1" noResize="1" noEditPoints="1" noAdjustHandles="1" noChangeArrowheads="1" noChangeShapeType="1" noTextEdit="1"/>
+          </p:cNvSpPr>
+          <p:nvPr>
+            <p:extLst>
+              <p:ext uri="{386F3935-93C4-4BCD-93E2-E3B085C9AB24}">
+                <p16:designElem xmlns:p16="http://schemas.microsoft.com/office/powerpoint/2015/main" val="1"/>
+              </p:ext>
+            </p:extLst>
+          </p:nvPr>
+        </p:nvSpPr>
+        <p:spPr>
+          <a:xfrm rot="16200000" flipH="1">
+            <a:off x="6967085" y="1632660"/>
+            <a:ext cx="6857572" cy="3592258"/>
+          </a:xfrm>
+          <a:prstGeom prst="rect">
+            <a:avLst/>
+          </a:prstGeom>
+          <a:gradFill>
+            <a:gsLst>
+              <a:gs pos="0">
+                <a:schemeClr val="accent1">
+                  <a:lumMod val="75000"/>
+                  <a:alpha val="50000"/>
+                </a:schemeClr>
+              </a:gs>
+              <a:gs pos="99000">
+                <a:srgbClr val="000000">
+                  <a:alpha val="0"/>
+                </a:srgbClr>
+              </a:gs>
+            </a:gsLst>
+            <a:lin ang="15600000" scaled="0"/>
+          </a:gradFill>
+          <a:ln>
+            <a:noFill/>
+          </a:ln>
+        </p:spPr>
+        <p:style>
+          <a:lnRef idx="2">
+            <a:schemeClr val="accent1">
+              <a:shade val="50000"/>
+            </a:schemeClr>
+          </a:lnRef>
+          <a:fillRef idx="1">
+            <a:schemeClr val="accent1"/>
+          </a:fillRef>
+          <a:effectRef idx="0">
+            <a:schemeClr val="accent1"/>
+          </a:effectRef>
+          <a:fontRef idx="minor">
+            <a:schemeClr val="lt1"/>
+          </a:fontRef>
+        </p:style>
+        <p:txBody>
+          <a:bodyPr rtlCol="0" anchor="ctr"/>
+          <a:lstStyle/>
+          <a:p>
+            <a:pPr algn="ctr"/>
+            <a:endParaRPr lang="en-US"/>
+          </a:p>
+        </p:txBody>
+      </p:sp>
     </p:spTree>
     <p:extLst>
       <p:ext uri="{BB962C8B-B14F-4D97-AF65-F5344CB8AC3E}">
-        <p14:creationId xmlns:p14="http://schemas.microsoft.com/office/powerpoint/2010/main" val="1842017856"/>
+        <p14:creationId xmlns:p14="http://schemas.microsoft.com/office/powerpoint/2010/main" val="2778858687"/>
       </p:ext>
     </p:extLst>
   </p:cSld>
@@ -10909,7 +11869,7 @@
           <a:lstStyle/>
           <a:p>
             <a:r>
-              <a:rPr lang="en-US" sz="4800" kern="1200">
+              <a:rPr lang="en-US" sz="4800" kern="1200" dirty="0">
                 <a:solidFill>
                   <a:srgbClr val="FFFFFF"/>
                 </a:solidFill>
@@ -11428,6 +12388,321 @@
 </a:theme>
 </file>
 
+<file path=ppt/theme/theme2.xml><?xml version="1.0" encoding="utf-8"?>
+<a:theme xmlns:a="http://schemas.openxmlformats.org/drawingml/2006/main" name="Office">
+  <a:themeElements>
+    <a:clrScheme name="Office">
+      <a:dk1>
+        <a:sysClr val="windowText" lastClr="000000"/>
+      </a:dk1>
+      <a:lt1>
+        <a:sysClr val="window" lastClr="FFFFFF"/>
+      </a:lt1>
+      <a:dk2>
+        <a:srgbClr val="0E2841"/>
+      </a:dk2>
+      <a:lt2>
+        <a:srgbClr val="E8E8E8"/>
+      </a:lt2>
+      <a:accent1>
+        <a:srgbClr val="156082"/>
+      </a:accent1>
+      <a:accent2>
+        <a:srgbClr val="E97132"/>
+      </a:accent2>
+      <a:accent3>
+        <a:srgbClr val="196B24"/>
+      </a:accent3>
+      <a:accent4>
+        <a:srgbClr val="0F9ED5"/>
+      </a:accent4>
+      <a:accent5>
+        <a:srgbClr val="A02B93"/>
+      </a:accent5>
+      <a:accent6>
+        <a:srgbClr val="4EA72E"/>
+      </a:accent6>
+      <a:hlink>
+        <a:srgbClr val="467886"/>
+      </a:hlink>
+      <a:folHlink>
+        <a:srgbClr val="96607D"/>
+      </a:folHlink>
+    </a:clrScheme>
+    <a:fontScheme name="Office">
+      <a:majorFont>
+        <a:latin typeface="Aptos Display" panose="02110004020202020204"/>
+        <a:ea typeface=""/>
+        <a:cs typeface=""/>
+        <a:font script="Jpan" typeface="游ゴシック Light"/>
+        <a:font script="Hang" typeface="맑은 고딕"/>
+        <a:font script="Hans" typeface="等线 Light"/>
+        <a:font script="Hant" typeface="新細明體"/>
+        <a:font script="Arab" typeface="Times New Roman"/>
+        <a:font script="Hebr" typeface="Times New Roman"/>
+        <a:font script="Thai" typeface="Angsana New"/>
+        <a:font script="Ethi" typeface="Nyala"/>
+        <a:font script="Beng" typeface="Vrinda"/>
+        <a:font script="Gujr" typeface="Shruti"/>
+        <a:font script="Khmr" typeface="MoolBoran"/>
+        <a:font script="Knda" typeface="Tunga"/>
+        <a:font script="Guru" typeface="Raavi"/>
+        <a:font script="Cans" typeface="Euphemia"/>
+        <a:font script="Cher" typeface="Plantagenet Cherokee"/>
+        <a:font script="Yiii" typeface="Microsoft Yi Baiti"/>
+        <a:font script="Tibt" typeface="Microsoft Himalaya"/>
+        <a:font script="Thaa" typeface="MV Boli"/>
+        <a:font script="Deva" typeface="Mangal"/>
+        <a:font script="Telu" typeface="Gautami"/>
+        <a:font script="Taml" typeface="Latha"/>
+        <a:font script="Syrc" typeface="Estrangelo Edessa"/>
+        <a:font script="Orya" typeface="Kalinga"/>
+        <a:font script="Mlym" typeface="Kartika"/>
+        <a:font script="Laoo" typeface="DokChampa"/>
+        <a:font script="Sinh" typeface="Iskoola Pota"/>
+        <a:font script="Mong" typeface="Mongolian Baiti"/>
+        <a:font script="Viet" typeface="Times New Roman"/>
+        <a:font script="Uigh" typeface="Microsoft Uighur"/>
+        <a:font script="Geor" typeface="Sylfaen"/>
+        <a:font script="Armn" typeface="Arial"/>
+        <a:font script="Bugi" typeface="Leelawadee UI"/>
+        <a:font script="Bopo" typeface="Microsoft JhengHei"/>
+        <a:font script="Java" typeface="Javanese Text"/>
+        <a:font script="Lisu" typeface="Segoe UI"/>
+        <a:font script="Mymr" typeface="Myanmar Text"/>
+        <a:font script="Nkoo" typeface="Ebrima"/>
+        <a:font script="Olck" typeface="Nirmala UI"/>
+        <a:font script="Osma" typeface="Ebrima"/>
+        <a:font script="Phag" typeface="Phagspa"/>
+        <a:font script="Syrn" typeface="Estrangelo Edessa"/>
+        <a:font script="Syrj" typeface="Estrangelo Edessa"/>
+        <a:font script="Syre" typeface="Estrangelo Edessa"/>
+        <a:font script="Sora" typeface="Nirmala UI"/>
+        <a:font script="Tale" typeface="Microsoft Tai Le"/>
+        <a:font script="Talu" typeface="Microsoft New Tai Lue"/>
+        <a:font script="Tfng" typeface="Ebrima"/>
+      </a:majorFont>
+      <a:minorFont>
+        <a:latin typeface="Aptos" panose="02110004020202020204"/>
+        <a:ea typeface=""/>
+        <a:cs typeface=""/>
+        <a:font script="Jpan" typeface="游ゴシック"/>
+        <a:font script="Hang" typeface="맑은 고딕"/>
+        <a:font script="Hans" typeface="等线"/>
+        <a:font script="Hant" typeface="新細明體"/>
+        <a:font script="Arab" typeface="Arial"/>
+        <a:font script="Hebr" typeface="Arial"/>
+        <a:font script="Thai" typeface="Cordia New"/>
+        <a:font script="Ethi" typeface="Nyala"/>
+        <a:font script="Beng" typeface="Vrinda"/>
+        <a:font script="Gujr" typeface="Shruti"/>
+        <a:font script="Khmr" typeface="DaunPenh"/>
+        <a:font script="Knda" typeface="Tunga"/>
+        <a:font script="Guru" typeface="Raavi"/>
+        <a:font script="Cans" typeface="Euphemia"/>
+        <a:font script="Cher" typeface="Plantagenet Cherokee"/>
+        <a:font script="Yiii" typeface="Microsoft Yi Baiti"/>
+        <a:font script="Tibt" typeface="Microsoft Himalaya"/>
+        <a:font script="Thaa" typeface="MV Boli"/>
+        <a:font script="Deva" typeface="Mangal"/>
+        <a:font script="Telu" typeface="Gautami"/>
+        <a:font script="Taml" typeface="Latha"/>
+        <a:font script="Syrc" typeface="Estrangelo Edessa"/>
+        <a:font script="Orya" typeface="Kalinga"/>
+        <a:font script="Mlym" typeface="Kartika"/>
+        <a:font script="Laoo" typeface="DokChampa"/>
+        <a:font script="Sinh" typeface="Iskoola Pota"/>
+        <a:font script="Mong" typeface="Mongolian Baiti"/>
+        <a:font script="Viet" typeface="Arial"/>
+        <a:font script="Uigh" typeface="Microsoft Uighur"/>
+        <a:font script="Geor" typeface="Sylfaen"/>
+        <a:font script="Armn" typeface="Arial"/>
+        <a:font script="Bugi" typeface="Leelawadee UI"/>
+        <a:font script="Bopo" typeface="Microsoft JhengHei"/>
+        <a:font script="Java" typeface="Javanese Text"/>
+        <a:font script="Lisu" typeface="Segoe UI"/>
+        <a:font script="Mymr" typeface="Myanmar Text"/>
+        <a:font script="Nkoo" typeface="Ebrima"/>
+        <a:font script="Olck" typeface="Nirmala UI"/>
+        <a:font script="Osma" typeface="Ebrima"/>
+        <a:font script="Phag" typeface="Phagspa"/>
+        <a:font script="Syrn" typeface="Estrangelo Edessa"/>
+        <a:font script="Syrj" typeface="Estrangelo Edessa"/>
+        <a:font script="Syre" typeface="Estrangelo Edessa"/>
+        <a:font script="Sora" typeface="Nirmala UI"/>
+        <a:font script="Tale" typeface="Microsoft Tai Le"/>
+        <a:font script="Talu" typeface="Microsoft New Tai Lue"/>
+        <a:font script="Tfng" typeface="Ebrima"/>
+      </a:minorFont>
+    </a:fontScheme>
+    <a:fmtScheme name="Office">
+      <a:fillStyleLst>
+        <a:solidFill>
+          <a:schemeClr val="phClr"/>
+        </a:solidFill>
+        <a:gradFill rotWithShape="1">
+          <a:gsLst>
+            <a:gs pos="0">
+              <a:schemeClr val="phClr">
+                <a:lumMod val="110000"/>
+                <a:satMod val="105000"/>
+                <a:tint val="67000"/>
+              </a:schemeClr>
+            </a:gs>
+            <a:gs pos="50000">
+              <a:schemeClr val="phClr">
+                <a:lumMod val="105000"/>
+                <a:satMod val="103000"/>
+                <a:tint val="73000"/>
+              </a:schemeClr>
+            </a:gs>
+            <a:gs pos="100000">
+              <a:schemeClr val="phClr">
+                <a:lumMod val="105000"/>
+                <a:satMod val="109000"/>
+                <a:tint val="81000"/>
+              </a:schemeClr>
+            </a:gs>
+          </a:gsLst>
+          <a:lin ang="5400000" scaled="0"/>
+        </a:gradFill>
+        <a:gradFill rotWithShape="1">
+          <a:gsLst>
+            <a:gs pos="0">
+              <a:schemeClr val="phClr">
+                <a:satMod val="103000"/>
+                <a:lumMod val="102000"/>
+                <a:tint val="94000"/>
+              </a:schemeClr>
+            </a:gs>
+            <a:gs pos="50000">
+              <a:schemeClr val="phClr">
+                <a:satMod val="110000"/>
+                <a:lumMod val="100000"/>
+                <a:shade val="100000"/>
+              </a:schemeClr>
+            </a:gs>
+            <a:gs pos="100000">
+              <a:schemeClr val="phClr">
+                <a:lumMod val="99000"/>
+                <a:satMod val="120000"/>
+                <a:shade val="78000"/>
+              </a:schemeClr>
+            </a:gs>
+          </a:gsLst>
+          <a:lin ang="5400000" scaled="0"/>
+        </a:gradFill>
+      </a:fillStyleLst>
+      <a:lnStyleLst>
+        <a:ln w="12700" cap="flat" cmpd="sng" algn="ctr">
+          <a:solidFill>
+            <a:schemeClr val="phClr"/>
+          </a:solidFill>
+          <a:prstDash val="solid"/>
+          <a:miter lim="800000"/>
+        </a:ln>
+        <a:ln w="19050" cap="flat" cmpd="sng" algn="ctr">
+          <a:solidFill>
+            <a:schemeClr val="phClr"/>
+          </a:solidFill>
+          <a:prstDash val="solid"/>
+          <a:miter lim="800000"/>
+        </a:ln>
+        <a:ln w="25400" cap="flat" cmpd="sng" algn="ctr">
+          <a:solidFill>
+            <a:schemeClr val="phClr"/>
+          </a:solidFill>
+          <a:prstDash val="solid"/>
+          <a:miter lim="800000"/>
+        </a:ln>
+      </a:lnStyleLst>
+      <a:effectStyleLst>
+        <a:effectStyle>
+          <a:effectLst/>
+        </a:effectStyle>
+        <a:effectStyle>
+          <a:effectLst/>
+        </a:effectStyle>
+        <a:effectStyle>
+          <a:effectLst>
+            <a:outerShdw blurRad="57150" dist="19050" dir="5400000" algn="ctr" rotWithShape="0">
+              <a:srgbClr val="000000">
+                <a:alpha val="63000"/>
+              </a:srgbClr>
+            </a:outerShdw>
+          </a:effectLst>
+        </a:effectStyle>
+      </a:effectStyleLst>
+      <a:bgFillStyleLst>
+        <a:solidFill>
+          <a:schemeClr val="phClr"/>
+        </a:solidFill>
+        <a:solidFill>
+          <a:schemeClr val="phClr">
+            <a:tint val="95000"/>
+            <a:satMod val="170000"/>
+          </a:schemeClr>
+        </a:solidFill>
+        <a:gradFill rotWithShape="1">
+          <a:gsLst>
+            <a:gs pos="0">
+              <a:schemeClr val="phClr">
+                <a:tint val="93000"/>
+                <a:satMod val="150000"/>
+                <a:shade val="98000"/>
+                <a:lumMod val="102000"/>
+              </a:schemeClr>
+            </a:gs>
+            <a:gs pos="50000">
+              <a:schemeClr val="phClr">
+                <a:tint val="98000"/>
+                <a:satMod val="130000"/>
+                <a:shade val="90000"/>
+                <a:lumMod val="103000"/>
+              </a:schemeClr>
+            </a:gs>
+            <a:gs pos="100000">
+              <a:schemeClr val="phClr">
+                <a:shade val="63000"/>
+                <a:satMod val="120000"/>
+              </a:schemeClr>
+            </a:gs>
+          </a:gsLst>
+          <a:lin ang="5400000" scaled="0"/>
+        </a:gradFill>
+      </a:bgFillStyleLst>
+    </a:fmtScheme>
+  </a:themeElements>
+  <a:objectDefaults>
+    <a:lnDef>
+      <a:spPr/>
+      <a:bodyPr/>
+      <a:lstStyle/>
+      <a:style>
+        <a:lnRef idx="2">
+          <a:schemeClr val="accent1"/>
+        </a:lnRef>
+        <a:fillRef idx="0">
+          <a:schemeClr val="accent1"/>
+        </a:fillRef>
+        <a:effectRef idx="1">
+          <a:schemeClr val="accent1"/>
+        </a:effectRef>
+        <a:fontRef idx="minor">
+          <a:schemeClr val="tx1"/>
+        </a:fontRef>
+      </a:style>
+    </a:lnDef>
+  </a:objectDefaults>
+  <a:extraClrSchemeLst/>
+  <a:extLst>
+    <a:ext uri="{05A4C25C-085E-4340-85A3-A5531E510DB2}">
+      <thm15:themeFamily xmlns:thm15="http://schemas.microsoft.com/office/thememl/2012/main" name="Office Theme" id="{2E142A2C-CD16-42D6-873A-C26D2A0506FA}" vid="{1BDDFF52-6CD6-40A5-AB3C-68EB2F1E4D0A}"/>
+    </a:ext>
+  </a:extLst>
+</a:theme>
+</file>
+
 <file path=ppt/theme/themeOverride1.xml><?xml version="1.0" encoding="utf-8"?>
 <a:themeOverride xmlns:a="http://schemas.openxmlformats.org/drawingml/2006/main">
   <a:clrScheme name="Office">

</xml_diff>

<commit_message>
Revert "Merge branch 'main' of https://github.com/pfarrhoferphilip/Stadt-Land-Vollpfosten-Online"
This reverts commit acc88b2594d631900a29d7c79322e5e010b7afe4, reversing
changes made to 4f1044ac72ba3100c52b1846c84ae0f4d3e5c57b.
</commit_message>
<xml_diff>
--- a/Dokumentation/Präsentation_abschluss.pptx
+++ b/Dokumentation/Präsentation_abschluss.pptx
@@ -4,17 +4,14 @@
   <p:sldMasterIdLst>
     <p:sldMasterId id="2147483684" r:id="rId1"/>
   </p:sldMasterIdLst>
-  <p:notesMasterIdLst>
-    <p:notesMasterId r:id="rId10"/>
-  </p:notesMasterIdLst>
   <p:sldIdLst>
     <p:sldId id="256" r:id="rId2"/>
     <p:sldId id="257" r:id="rId3"/>
     <p:sldId id="258" r:id="rId4"/>
     <p:sldId id="259" r:id="rId5"/>
-    <p:sldId id="262" r:id="rId6"/>
+    <p:sldId id="261" r:id="rId6"/>
     <p:sldId id="260" r:id="rId7"/>
-    <p:sldId id="261" r:id="rId8"/>
+    <p:sldId id="262" r:id="rId8"/>
     <p:sldId id="263" r:id="rId9"/>
   </p:sldIdLst>
   <p:sldSz cx="12192000" cy="6858000"/>
@@ -125,7 +122,7 @@
 <file path=ppt/revisionInfo.xml><?xml version="1.0" encoding="utf-8"?>
 <p1510:revInfo xmlns:a="http://schemas.openxmlformats.org/drawingml/2006/main" xmlns:r="http://schemas.openxmlformats.org/officeDocument/2006/relationships" xmlns:p1510="http://schemas.microsoft.com/office/powerpoint/2015/10/main">
   <p1510:revLst>
-    <p1510:client id="{056C6563-87CA-9F41-86EA-9A3B7E1F5939}" v="56" dt="2024-06-18T07:22:18.915"/>
+    <p1510:client id="{056C6563-87CA-9F41-86EA-9A3B7E1F5939}" v="15" dt="2024-06-17T07:45:10.262"/>
   </p1510:revLst>
 </p1510:revInfo>
 </file>
@@ -134,19 +131,19 @@
 <pc:chgInfo xmlns:a="http://schemas.openxmlformats.org/drawingml/2006/main" xmlns:r="http://schemas.openxmlformats.org/officeDocument/2006/relationships" xmlns:ac="http://schemas.microsoft.com/office/drawing/2013/main/command" xmlns:pc="http://schemas.microsoft.com/office/powerpoint/2013/main/command">
   <pc:docChgLst>
     <pc:chgData name="Alexander Hahn" userId="56d4792ddc6be58c" providerId="LiveId" clId="{056C6563-87CA-9F41-86EA-9A3B7E1F5939}"/>
-    <pc:docChg chg="undo custSel addSld modSld sldOrd">
-      <pc:chgData name="Alexander Hahn" userId="56d4792ddc6be58c" providerId="LiveId" clId="{056C6563-87CA-9F41-86EA-9A3B7E1F5939}" dt="2024-06-18T07:27:45.486" v="441" actId="20577"/>
+    <pc:docChg chg="undo custSel addSld modSld">
+      <pc:chgData name="Alexander Hahn" userId="56d4792ddc6be58c" providerId="LiveId" clId="{056C6563-87CA-9F41-86EA-9A3B7E1F5939}" dt="2024-06-17T07:45:59.347" v="68" actId="478"/>
       <pc:docMkLst>
         <pc:docMk/>
       </pc:docMkLst>
       <pc:sldChg chg="modSp mod">
-        <pc:chgData name="Alexander Hahn" userId="56d4792ddc6be58c" providerId="LiveId" clId="{056C6563-87CA-9F41-86EA-9A3B7E1F5939}" dt="2024-06-18T07:25:06.862" v="387" actId="20577"/>
+        <pc:chgData name="Alexander Hahn" userId="56d4792ddc6be58c" providerId="LiveId" clId="{056C6563-87CA-9F41-86EA-9A3B7E1F5939}" dt="2024-06-17T07:41:15.119" v="8" actId="20577"/>
         <pc:sldMkLst>
           <pc:docMk/>
           <pc:sldMk cId="2280991357" sldId="257"/>
         </pc:sldMkLst>
         <pc:spChg chg="mod">
-          <ac:chgData name="Alexander Hahn" userId="56d4792ddc6be58c" providerId="LiveId" clId="{056C6563-87CA-9F41-86EA-9A3B7E1F5939}" dt="2024-06-18T07:25:06.862" v="387" actId="20577"/>
+          <ac:chgData name="Alexander Hahn" userId="56d4792ddc6be58c" providerId="LiveId" clId="{056C6563-87CA-9F41-86EA-9A3B7E1F5939}" dt="2024-06-17T07:41:15.119" v="8" actId="20577"/>
           <ac:spMkLst>
             <pc:docMk/>
             <pc:sldMk cId="2280991357" sldId="257"/>
@@ -154,158 +151,8 @@
           </ac:spMkLst>
         </pc:spChg>
       </pc:sldChg>
-      <pc:sldChg chg="modSp">
-        <pc:chgData name="Alexander Hahn" userId="56d4792ddc6be58c" providerId="LiveId" clId="{056C6563-87CA-9F41-86EA-9A3B7E1F5939}" dt="2024-06-18T07:19:15.348" v="214"/>
-        <pc:sldMkLst>
-          <pc:docMk/>
-          <pc:sldMk cId="1134258423" sldId="258"/>
-        </pc:sldMkLst>
-        <pc:graphicFrameChg chg="mod">
-          <ac:chgData name="Alexander Hahn" userId="56d4792ddc6be58c" providerId="LiveId" clId="{056C6563-87CA-9F41-86EA-9A3B7E1F5939}" dt="2024-06-18T07:19:15.348" v="214"/>
-          <ac:graphicFrameMkLst>
-            <pc:docMk/>
-            <pc:sldMk cId="1134258423" sldId="258"/>
-            <ac:graphicFrameMk id="4" creationId="{7B2070E2-8C00-1436-6BBB-842E1006C831}"/>
-          </ac:graphicFrameMkLst>
-        </pc:graphicFrameChg>
-      </pc:sldChg>
       <pc:sldChg chg="addSp delSp modSp mod setBg">
-        <pc:chgData name="Alexander Hahn" userId="56d4792ddc6be58c" providerId="LiveId" clId="{056C6563-87CA-9F41-86EA-9A3B7E1F5939}" dt="2024-06-18T07:24:46.596" v="380" actId="14100"/>
-        <pc:sldMkLst>
-          <pc:docMk/>
-          <pc:sldMk cId="4181717768" sldId="259"/>
-        </pc:sldMkLst>
-        <pc:spChg chg="del">
-          <ac:chgData name="Alexander Hahn" userId="56d4792ddc6be58c" providerId="LiveId" clId="{056C6563-87CA-9F41-86EA-9A3B7E1F5939}" dt="2024-06-18T07:20:13.493" v="231" actId="26606"/>
-          <ac:spMkLst>
-            <pc:docMk/>
-            <pc:sldMk cId="4181717768" sldId="259"/>
-            <ac:spMk id="2" creationId="{6519A4E8-8A8A-78E4-8F4B-C0C739CE82DC}"/>
-          </ac:spMkLst>
-        </pc:spChg>
-        <pc:spChg chg="mod">
-          <ac:chgData name="Alexander Hahn" userId="56d4792ddc6be58c" providerId="LiveId" clId="{056C6563-87CA-9F41-86EA-9A3B7E1F5939}" dt="2024-06-18T07:20:13.493" v="231" actId="26606"/>
-          <ac:spMkLst>
-            <pc:docMk/>
-            <pc:sldMk cId="4181717768" sldId="259"/>
-            <ac:spMk id="3" creationId="{3D6C8044-614B-652D-5396-89C7FE7A0CDD}"/>
-          </ac:spMkLst>
-        </pc:spChg>
-        <pc:spChg chg="mod">
-          <ac:chgData name="Alexander Hahn" userId="56d4792ddc6be58c" providerId="LiveId" clId="{056C6563-87CA-9F41-86EA-9A3B7E1F5939}" dt="2024-06-18T07:24:46.596" v="380" actId="14100"/>
-          <ac:spMkLst>
-            <pc:docMk/>
-            <pc:sldMk cId="4181717768" sldId="259"/>
-            <ac:spMk id="4" creationId="{BB292303-B8C8-8513-DA96-210168295CD6}"/>
-          </ac:spMkLst>
-        </pc:spChg>
-        <pc:spChg chg="del">
-          <ac:chgData name="Alexander Hahn" userId="56d4792ddc6be58c" providerId="LiveId" clId="{056C6563-87CA-9F41-86EA-9A3B7E1F5939}" dt="2024-06-18T07:20:13.493" v="231" actId="26606"/>
-          <ac:spMkLst>
-            <pc:docMk/>
-            <pc:sldMk cId="4181717768" sldId="259"/>
-            <ac:spMk id="5" creationId="{CDC14DFF-7DF8-D25C-2881-94EC65E3085A}"/>
-          </ac:spMkLst>
-        </pc:spChg>
-        <pc:spChg chg="del">
-          <ac:chgData name="Alexander Hahn" userId="56d4792ddc6be58c" providerId="LiveId" clId="{056C6563-87CA-9F41-86EA-9A3B7E1F5939}" dt="2024-06-18T07:20:13.493" v="231" actId="26606"/>
-          <ac:spMkLst>
-            <pc:docMk/>
-            <pc:sldMk cId="4181717768" sldId="259"/>
-            <ac:spMk id="6" creationId="{9462AFEF-68BA-BDFD-3454-E5E6CCB6C5F2}"/>
-          </ac:spMkLst>
-        </pc:spChg>
-        <pc:spChg chg="del">
-          <ac:chgData name="Alexander Hahn" userId="56d4792ddc6be58c" providerId="LiveId" clId="{056C6563-87CA-9F41-86EA-9A3B7E1F5939}" dt="2024-06-18T07:20:13.493" v="231" actId="26606"/>
-          <ac:spMkLst>
-            <pc:docMk/>
-            <pc:sldMk cId="4181717768" sldId="259"/>
-            <ac:spMk id="7" creationId="{8A402376-CC3B-0BAA-C8B4-54824EBB7819}"/>
-          </ac:spMkLst>
-        </pc:spChg>
-        <pc:spChg chg="del">
-          <ac:chgData name="Alexander Hahn" userId="56d4792ddc6be58c" providerId="LiveId" clId="{056C6563-87CA-9F41-86EA-9A3B7E1F5939}" dt="2024-06-18T07:20:13.493" v="231" actId="26606"/>
-          <ac:spMkLst>
-            <pc:docMk/>
-            <pc:sldMk cId="4181717768" sldId="259"/>
-            <ac:spMk id="8" creationId="{9E5ABCD2-0D68-91DE-1869-94CBFB96E455}"/>
-          </ac:spMkLst>
-        </pc:spChg>
-        <pc:spChg chg="del mod">
-          <ac:chgData name="Alexander Hahn" userId="56d4792ddc6be58c" providerId="LiveId" clId="{056C6563-87CA-9F41-86EA-9A3B7E1F5939}" dt="2024-06-18T07:19:57.503" v="230" actId="478"/>
-          <ac:spMkLst>
-            <pc:docMk/>
-            <pc:sldMk cId="4181717768" sldId="259"/>
-            <ac:spMk id="10" creationId="{04BC82BF-6600-5D0A-C5EF-8861743E8622}"/>
-          </ac:spMkLst>
-        </pc:spChg>
-        <pc:spChg chg="add">
-          <ac:chgData name="Alexander Hahn" userId="56d4792ddc6be58c" providerId="LiveId" clId="{056C6563-87CA-9F41-86EA-9A3B7E1F5939}" dt="2024-06-18T07:20:13.493" v="231" actId="26606"/>
-          <ac:spMkLst>
-            <pc:docMk/>
-            <pc:sldMk cId="4181717768" sldId="259"/>
-            <ac:spMk id="2055" creationId="{C4285719-470E-454C-AF62-8323075F1F5B}"/>
-          </ac:spMkLst>
-        </pc:spChg>
-        <pc:spChg chg="add">
-          <ac:chgData name="Alexander Hahn" userId="56d4792ddc6be58c" providerId="LiveId" clId="{056C6563-87CA-9F41-86EA-9A3B7E1F5939}" dt="2024-06-18T07:20:13.493" v="231" actId="26606"/>
-          <ac:spMkLst>
-            <pc:docMk/>
-            <pc:sldMk cId="4181717768" sldId="259"/>
-            <ac:spMk id="2057" creationId="{CD9FE4EF-C4D8-49A0-B2FF-81D8DB7D8A24}"/>
-          </ac:spMkLst>
-        </pc:spChg>
-        <pc:spChg chg="add">
-          <ac:chgData name="Alexander Hahn" userId="56d4792ddc6be58c" providerId="LiveId" clId="{056C6563-87CA-9F41-86EA-9A3B7E1F5939}" dt="2024-06-18T07:20:13.493" v="231" actId="26606"/>
-          <ac:spMkLst>
-            <pc:docMk/>
-            <pc:sldMk cId="4181717768" sldId="259"/>
-            <ac:spMk id="2059" creationId="{4300840D-0A0B-4512-BACA-B439D5B9C57C}"/>
-          </ac:spMkLst>
-        </pc:spChg>
-        <pc:spChg chg="add">
-          <ac:chgData name="Alexander Hahn" userId="56d4792ddc6be58c" providerId="LiveId" clId="{056C6563-87CA-9F41-86EA-9A3B7E1F5939}" dt="2024-06-18T07:20:13.493" v="231" actId="26606"/>
-          <ac:spMkLst>
-            <pc:docMk/>
-            <pc:sldMk cId="4181717768" sldId="259"/>
-            <ac:spMk id="2061" creationId="{D2B78728-A580-49A7-84F9-6EF6F583ADE0}"/>
-          </ac:spMkLst>
-        </pc:spChg>
-        <pc:spChg chg="add">
-          <ac:chgData name="Alexander Hahn" userId="56d4792ddc6be58c" providerId="LiveId" clId="{056C6563-87CA-9F41-86EA-9A3B7E1F5939}" dt="2024-06-18T07:20:13.493" v="231" actId="26606"/>
-          <ac:spMkLst>
-            <pc:docMk/>
-            <pc:sldMk cId="4181717768" sldId="259"/>
-            <ac:spMk id="2063" creationId="{38FAA1A1-D861-433F-88FA-1E9D6FD31D11}"/>
-          </ac:spMkLst>
-        </pc:spChg>
-        <pc:spChg chg="add">
-          <ac:chgData name="Alexander Hahn" userId="56d4792ddc6be58c" providerId="LiveId" clId="{056C6563-87CA-9F41-86EA-9A3B7E1F5939}" dt="2024-06-18T07:20:13.493" v="231" actId="26606"/>
-          <ac:spMkLst>
-            <pc:docMk/>
-            <pc:sldMk cId="4181717768" sldId="259"/>
-            <ac:spMk id="2065" creationId="{8D71EDA1-87BF-4D5D-AB79-F346FD19278A}"/>
-          </ac:spMkLst>
-        </pc:spChg>
-        <pc:picChg chg="del">
-          <ac:chgData name="Alexander Hahn" userId="56d4792ddc6be58c" providerId="LiveId" clId="{056C6563-87CA-9F41-86EA-9A3B7E1F5939}" dt="2024-06-18T07:19:47.294" v="226" actId="478"/>
-          <ac:picMkLst>
-            <pc:docMk/>
-            <pc:sldMk cId="4181717768" sldId="259"/>
-            <ac:picMk id="9" creationId="{444A99C5-CF23-804A-F83E-67BBD63F00E6}"/>
-          </ac:picMkLst>
-        </pc:picChg>
-        <pc:picChg chg="add mod">
-          <ac:chgData name="Alexander Hahn" userId="56d4792ddc6be58c" providerId="LiveId" clId="{056C6563-87CA-9F41-86EA-9A3B7E1F5939}" dt="2024-06-18T07:22:18.915" v="257"/>
-          <ac:picMkLst>
-            <pc:docMk/>
-            <pc:sldMk cId="4181717768" sldId="259"/>
-            <ac:picMk id="2050" creationId="{F69765AE-B27C-C716-1CBC-65BBE43111B7}"/>
-          </ac:picMkLst>
-        </pc:picChg>
-      </pc:sldChg>
-      <pc:sldChg chg="addSp delSp modSp mod setBg">
-        <pc:chgData name="Alexander Hahn" userId="56d4792ddc6be58c" providerId="LiveId" clId="{056C6563-87CA-9F41-86EA-9A3B7E1F5939}" dt="2024-06-18T07:10:09.409" v="149" actId="1076"/>
+        <pc:chgData name="Alexander Hahn" userId="56d4792ddc6be58c" providerId="LiveId" clId="{056C6563-87CA-9F41-86EA-9A3B7E1F5939}" dt="2024-06-17T07:42:18.231" v="25" actId="478"/>
         <pc:sldMkLst>
           <pc:docMk/>
           <pc:sldMk cId="3575696004" sldId="260"/>
@@ -375,15 +222,7 @@
           </ac:spMkLst>
         </pc:spChg>
         <pc:picChg chg="add mod">
-          <ac:chgData name="Alexander Hahn" userId="56d4792ddc6be58c" providerId="LiveId" clId="{056C6563-87CA-9F41-86EA-9A3B7E1F5939}" dt="2024-06-18T07:10:09.409" v="149" actId="1076"/>
-          <ac:picMkLst>
-            <pc:docMk/>
-            <pc:sldMk cId="3575696004" sldId="260"/>
-            <ac:picMk id="4" creationId="{B0D6BA97-3EF3-B59C-33C6-BDF1AD85E8EA}"/>
-          </ac:picMkLst>
-        </pc:picChg>
-        <pc:picChg chg="add del mod">
-          <ac:chgData name="Alexander Hahn" userId="56d4792ddc6be58c" providerId="LiveId" clId="{056C6563-87CA-9F41-86EA-9A3B7E1F5939}" dt="2024-06-18T07:08:33.464" v="69" actId="478"/>
+          <ac:chgData name="Alexander Hahn" userId="56d4792ddc6be58c" providerId="LiveId" clId="{056C6563-87CA-9F41-86EA-9A3B7E1F5939}" dt="2024-06-17T07:42:16.086" v="24" actId="26606"/>
           <ac:picMkLst>
             <pc:docMk/>
             <pc:sldMk cId="3575696004" sldId="260"/>
@@ -391,14 +230,14 @@
           </ac:picMkLst>
         </pc:picChg>
       </pc:sldChg>
-      <pc:sldChg chg="addSp delSp modSp new mod ord setBg modClrScheme setClrOvrMap delDesignElem chgLayout">
-        <pc:chgData name="Alexander Hahn" userId="56d4792ddc6be58c" providerId="LiveId" clId="{056C6563-87CA-9F41-86EA-9A3B7E1F5939}" dt="2024-06-18T07:27:45.486" v="441" actId="20577"/>
+      <pc:sldChg chg="addSp delSp modSp new mod setBg setClrOvrMap chgLayout">
+        <pc:chgData name="Alexander Hahn" userId="56d4792ddc6be58c" providerId="LiveId" clId="{056C6563-87CA-9F41-86EA-9A3B7E1F5939}" dt="2024-06-17T07:45:25.861" v="54" actId="26606"/>
         <pc:sldMkLst>
           <pc:docMk/>
           <pc:sldMk cId="2778858687" sldId="261"/>
         </pc:sldMkLst>
         <pc:spChg chg="mod ord">
-          <ac:chgData name="Alexander Hahn" userId="56d4792ddc6be58c" providerId="LiveId" clId="{056C6563-87CA-9F41-86EA-9A3B7E1F5939}" dt="2024-06-18T07:27:45.486" v="441" actId="20577"/>
+          <ac:chgData name="Alexander Hahn" userId="56d4792ddc6be58c" providerId="LiveId" clId="{056C6563-87CA-9F41-86EA-9A3B7E1F5939}" dt="2024-06-17T07:45:25.861" v="54" actId="26606"/>
           <ac:spMkLst>
             <pc:docMk/>
             <pc:sldMk cId="2778858687" sldId="261"/>
@@ -413,30 +252,6 @@
             <ac:spMk id="3" creationId="{7A3B3A14-0962-06E0-DD19-BDC4F89B6B5F}"/>
           </ac:spMkLst>
         </pc:spChg>
-        <pc:spChg chg="add del mod">
-          <ac:chgData name="Alexander Hahn" userId="56d4792ddc6be58c" providerId="LiveId" clId="{056C6563-87CA-9F41-86EA-9A3B7E1F5939}" dt="2024-06-18T07:12:56.082" v="191" actId="478"/>
-          <ac:spMkLst>
-            <pc:docMk/>
-            <pc:sldMk cId="2778858687" sldId="261"/>
-            <ac:spMk id="4" creationId="{A36E0ADC-14DA-B858-70DE-78047132197E}"/>
-          </ac:spMkLst>
-        </pc:spChg>
-        <pc:spChg chg="add del mod ord">
-          <ac:chgData name="Alexander Hahn" userId="56d4792ddc6be58c" providerId="LiveId" clId="{056C6563-87CA-9F41-86EA-9A3B7E1F5939}" dt="2024-06-18T07:13:08.137" v="194" actId="478"/>
-          <ac:spMkLst>
-            <pc:docMk/>
-            <pc:sldMk cId="2778858687" sldId="261"/>
-            <ac:spMk id="5" creationId="{BC1BE9D0-70F9-16E7-D8F6-7D6DB6194C2D}"/>
-          </ac:spMkLst>
-        </pc:spChg>
-        <pc:spChg chg="add del mod ord">
-          <ac:chgData name="Alexander Hahn" userId="56d4792ddc6be58c" providerId="LiveId" clId="{056C6563-87CA-9F41-86EA-9A3B7E1F5939}" dt="2024-06-18T07:27:22.951" v="391" actId="700"/>
-          <ac:spMkLst>
-            <pc:docMk/>
-            <pc:sldMk cId="2778858687" sldId="261"/>
-            <ac:spMk id="6" creationId="{4FF1ED09-02E9-DD75-AF69-11B01BB2E7B9}"/>
-          </ac:spMkLst>
-        </pc:spChg>
         <pc:spChg chg="add del mod ord">
           <ac:chgData name="Alexander Hahn" userId="56d4792ddc6be58c" providerId="LiveId" clId="{056C6563-87CA-9F41-86EA-9A3B7E1F5939}" dt="2024-06-17T07:45:10.262" v="50" actId="931"/>
           <ac:spMkLst>
@@ -445,8 +260,8 @@
             <ac:spMk id="7" creationId="{D0444CA0-12E9-3EB3-613B-F25919A6D030}"/>
           </ac:spMkLst>
         </pc:spChg>
-        <pc:spChg chg="add del mod ord">
-          <ac:chgData name="Alexander Hahn" userId="56d4792ddc6be58c" providerId="LiveId" clId="{056C6563-87CA-9F41-86EA-9A3B7E1F5939}" dt="2024-06-18T07:25:27.921" v="389" actId="478"/>
+        <pc:spChg chg="add mod">
+          <ac:chgData name="Alexander Hahn" userId="56d4792ddc6be58c" providerId="LiveId" clId="{056C6563-87CA-9F41-86EA-9A3B7E1F5939}" dt="2024-06-17T07:45:17.066" v="52" actId="26606"/>
           <ac:spMkLst>
             <pc:docMk/>
             <pc:sldMk cId="2778858687" sldId="261"/>
@@ -486,27 +301,11 @@
           </ac:spMkLst>
         </pc:spChg>
         <pc:spChg chg="add del">
-          <ac:chgData name="Alexander Hahn" userId="56d4792ddc6be58c" providerId="LiveId" clId="{056C6563-87CA-9F41-86EA-9A3B7E1F5939}" dt="2024-06-18T07:27:28.400" v="392" actId="26606"/>
-          <ac:spMkLst>
-            <pc:docMk/>
-            <pc:sldMk cId="2778858687" sldId="261"/>
-            <ac:spMk id="16" creationId="{6F5A5072-7B47-4D32-B52A-4EBBF590B8A5}"/>
-          </ac:spMkLst>
-        </pc:spChg>
-        <pc:spChg chg="add del">
           <ac:chgData name="Alexander Hahn" userId="56d4792ddc6be58c" providerId="LiveId" clId="{056C6563-87CA-9F41-86EA-9A3B7E1F5939}" dt="2024-06-17T07:45:25.861" v="54" actId="26606"/>
           <ac:spMkLst>
             <pc:docMk/>
             <pc:sldMk cId="2778858687" sldId="261"/>
             <ac:spMk id="17" creationId="{1B15ED52-F352-441B-82BF-E0EA34836D08}"/>
-          </ac:spMkLst>
-        </pc:spChg>
-        <pc:spChg chg="add del">
-          <ac:chgData name="Alexander Hahn" userId="56d4792ddc6be58c" providerId="LiveId" clId="{056C6563-87CA-9F41-86EA-9A3B7E1F5939}" dt="2024-06-18T07:27:28.400" v="392" actId="26606"/>
-          <ac:spMkLst>
-            <pc:docMk/>
-            <pc:sldMk cId="2778858687" sldId="261"/>
-            <ac:spMk id="18" creationId="{9715DAF0-AE1B-46C9-8A6B-DB2AA05AB91D}"/>
           </ac:spMkLst>
         </pc:spChg>
         <pc:spChg chg="add del">
@@ -518,35 +317,11 @@
           </ac:spMkLst>
         </pc:spChg>
         <pc:spChg chg="add del">
-          <ac:chgData name="Alexander Hahn" userId="56d4792ddc6be58c" providerId="LiveId" clId="{056C6563-87CA-9F41-86EA-9A3B7E1F5939}" dt="2024-06-18T07:27:28.400" v="392" actId="26606"/>
-          <ac:spMkLst>
-            <pc:docMk/>
-            <pc:sldMk cId="2778858687" sldId="261"/>
-            <ac:spMk id="20" creationId="{6016219D-510E-4184-9090-6D5578A87BD1}"/>
-          </ac:spMkLst>
-        </pc:spChg>
-        <pc:spChg chg="add del">
-          <ac:chgData name="Alexander Hahn" userId="56d4792ddc6be58c" providerId="LiveId" clId="{056C6563-87CA-9F41-86EA-9A3B7E1F5939}" dt="2024-06-18T07:27:28.400" v="392" actId="26606"/>
-          <ac:spMkLst>
-            <pc:docMk/>
-            <pc:sldMk cId="2778858687" sldId="261"/>
-            <ac:spMk id="22" creationId="{AFF4A713-7B75-4B21-90D7-5AB19547C728}"/>
-          </ac:spMkLst>
-        </pc:spChg>
-        <pc:spChg chg="add del">
           <ac:chgData name="Alexander Hahn" userId="56d4792ddc6be58c" providerId="LiveId" clId="{056C6563-87CA-9F41-86EA-9A3B7E1F5939}" dt="2024-06-17T07:45:25.861" v="54" actId="26606"/>
           <ac:spMkLst>
             <pc:docMk/>
             <pc:sldMk cId="2778858687" sldId="261"/>
             <ac:spMk id="23" creationId="{375E0459-6403-40CD-989D-56A4407CA12E}"/>
-          </ac:spMkLst>
-        </pc:spChg>
-        <pc:spChg chg="add del">
-          <ac:chgData name="Alexander Hahn" userId="56d4792ddc6be58c" providerId="LiveId" clId="{056C6563-87CA-9F41-86EA-9A3B7E1F5939}" dt="2024-06-18T07:27:28.400" v="392" actId="26606"/>
-          <ac:spMkLst>
-            <pc:docMk/>
-            <pc:sldMk cId="2778858687" sldId="261"/>
-            <ac:spMk id="24" creationId="{DC631C0B-6DA6-4E57-8231-CE32B3434A7E}"/>
           </ac:spMkLst>
         </pc:spChg>
         <pc:spChg chg="add del">
@@ -557,16 +332,8 @@
             <ac:spMk id="25" creationId="{53E5B1A8-3AC9-4BD1-9BBC-78CA94F2D1BA}"/>
           </ac:spMkLst>
         </pc:spChg>
-        <pc:spChg chg="add del">
-          <ac:chgData name="Alexander Hahn" userId="56d4792ddc6be58c" providerId="LiveId" clId="{056C6563-87CA-9F41-86EA-9A3B7E1F5939}" dt="2024-06-18T07:27:28.400" v="392" actId="26606"/>
-          <ac:spMkLst>
-            <pc:docMk/>
-            <pc:sldMk cId="2778858687" sldId="261"/>
-            <ac:spMk id="26" creationId="{C29501E6-A978-4A61-9689-9085AF97A53A}"/>
-          </ac:spMkLst>
-        </pc:spChg>
-        <pc:spChg chg="add del">
-          <ac:chgData name="Alexander Hahn" userId="56d4792ddc6be58c" providerId="LiveId" clId="{056C6563-87CA-9F41-86EA-9A3B7E1F5939}" dt="2024-06-18T07:13:01.330" v="192" actId="700"/>
+        <pc:spChg chg="add">
+          <ac:chgData name="Alexander Hahn" userId="56d4792ddc6be58c" providerId="LiveId" clId="{056C6563-87CA-9F41-86EA-9A3B7E1F5939}" dt="2024-06-17T07:45:25.861" v="54" actId="26606"/>
           <ac:spMkLst>
             <pc:docMk/>
             <pc:sldMk cId="2778858687" sldId="261"/>
@@ -574,15 +341,7 @@
           </ac:spMkLst>
         </pc:spChg>
         <pc:spChg chg="add">
-          <ac:chgData name="Alexander Hahn" userId="56d4792ddc6be58c" providerId="LiveId" clId="{056C6563-87CA-9F41-86EA-9A3B7E1F5939}" dt="2024-06-18T07:27:28.400" v="392" actId="26606"/>
-          <ac:spMkLst>
-            <pc:docMk/>
-            <pc:sldMk cId="2778858687" sldId="261"/>
-            <ac:spMk id="31" creationId="{0E30439A-8A5B-46EC-8283-9B6B031D40D0}"/>
-          </ac:spMkLst>
-        </pc:spChg>
-        <pc:spChg chg="add del">
-          <ac:chgData name="Alexander Hahn" userId="56d4792ddc6be58c" providerId="LiveId" clId="{056C6563-87CA-9F41-86EA-9A3B7E1F5939}" dt="2024-06-18T07:13:01.330" v="192" actId="700"/>
+          <ac:chgData name="Alexander Hahn" userId="56d4792ddc6be58c" providerId="LiveId" clId="{056C6563-87CA-9F41-86EA-9A3B7E1F5939}" dt="2024-06-17T07:45:25.861" v="54" actId="26606"/>
           <ac:spMkLst>
             <pc:docMk/>
             <pc:sldMk cId="2778858687" sldId="261"/>
@@ -590,15 +349,7 @@
           </ac:spMkLst>
         </pc:spChg>
         <pc:spChg chg="add">
-          <ac:chgData name="Alexander Hahn" userId="56d4792ddc6be58c" providerId="LiveId" clId="{056C6563-87CA-9F41-86EA-9A3B7E1F5939}" dt="2024-06-18T07:27:28.400" v="392" actId="26606"/>
-          <ac:spMkLst>
-            <pc:docMk/>
-            <pc:sldMk cId="2778858687" sldId="261"/>
-            <ac:spMk id="33" creationId="{5CEAD642-85CF-4750-8432-7C80C901F001}"/>
-          </ac:spMkLst>
-        </pc:spChg>
-        <pc:spChg chg="add del">
-          <ac:chgData name="Alexander Hahn" userId="56d4792ddc6be58c" providerId="LiveId" clId="{056C6563-87CA-9F41-86EA-9A3B7E1F5939}" dt="2024-06-18T07:13:01.330" v="192" actId="700"/>
+          <ac:chgData name="Alexander Hahn" userId="56d4792ddc6be58c" providerId="LiveId" clId="{056C6563-87CA-9F41-86EA-9A3B7E1F5939}" dt="2024-06-17T07:45:25.861" v="54" actId="26606"/>
           <ac:spMkLst>
             <pc:docMk/>
             <pc:sldMk cId="2778858687" sldId="261"/>
@@ -606,75 +357,11 @@
           </ac:spMkLst>
         </pc:spChg>
         <pc:spChg chg="add">
-          <ac:chgData name="Alexander Hahn" userId="56d4792ddc6be58c" providerId="LiveId" clId="{056C6563-87CA-9F41-86EA-9A3B7E1F5939}" dt="2024-06-18T07:27:28.400" v="392" actId="26606"/>
-          <ac:spMkLst>
-            <pc:docMk/>
-            <pc:sldMk cId="2778858687" sldId="261"/>
-            <ac:spMk id="35" creationId="{FA33EEAE-15D5-4119-8C1E-89D943F911EF}"/>
-          </ac:spMkLst>
-        </pc:spChg>
-        <pc:spChg chg="add del">
-          <ac:chgData name="Alexander Hahn" userId="56d4792ddc6be58c" providerId="LiveId" clId="{056C6563-87CA-9F41-86EA-9A3B7E1F5939}" dt="2024-06-18T07:13:01.330" v="192" actId="700"/>
+          <ac:chgData name="Alexander Hahn" userId="56d4792ddc6be58c" providerId="LiveId" clId="{056C6563-87CA-9F41-86EA-9A3B7E1F5939}" dt="2024-06-17T07:45:25.861" v="54" actId="26606"/>
           <ac:spMkLst>
             <pc:docMk/>
             <pc:sldMk cId="2778858687" sldId="261"/>
             <ac:spMk id="36" creationId="{A7009A0A-BEF5-4EAC-AF15-E4F9F002E239}"/>
-          </ac:spMkLst>
-        </pc:spChg>
-        <pc:spChg chg="add">
-          <ac:chgData name="Alexander Hahn" userId="56d4792ddc6be58c" providerId="LiveId" clId="{056C6563-87CA-9F41-86EA-9A3B7E1F5939}" dt="2024-06-18T07:27:28.400" v="392" actId="26606"/>
-          <ac:spMkLst>
-            <pc:docMk/>
-            <pc:sldMk cId="2778858687" sldId="261"/>
-            <ac:spMk id="37" creationId="{730D8B3B-9B80-4025-B934-26DC7D7CD231}"/>
-          </ac:spMkLst>
-        </pc:spChg>
-        <pc:spChg chg="add">
-          <ac:chgData name="Alexander Hahn" userId="56d4792ddc6be58c" providerId="LiveId" clId="{056C6563-87CA-9F41-86EA-9A3B7E1F5939}" dt="2024-06-18T07:27:28.400" v="392" actId="26606"/>
-          <ac:spMkLst>
-            <pc:docMk/>
-            <pc:sldMk cId="2778858687" sldId="261"/>
-            <ac:spMk id="39" creationId="{B5A1B09C-1565-46F8-B70F-621C5EB48A09}"/>
-          </ac:spMkLst>
-        </pc:spChg>
-        <pc:spChg chg="add">
-          <ac:chgData name="Alexander Hahn" userId="56d4792ddc6be58c" providerId="LiveId" clId="{056C6563-87CA-9F41-86EA-9A3B7E1F5939}" dt="2024-06-18T07:27:28.400" v="392" actId="26606"/>
-          <ac:spMkLst>
-            <pc:docMk/>
-            <pc:sldMk cId="2778858687" sldId="261"/>
-            <ac:spMk id="41" creationId="{8C516CC8-80AC-446C-A56E-9F54B7210402}"/>
-          </ac:spMkLst>
-        </pc:spChg>
-        <pc:spChg chg="add">
-          <ac:chgData name="Alexander Hahn" userId="56d4792ddc6be58c" providerId="LiveId" clId="{056C6563-87CA-9F41-86EA-9A3B7E1F5939}" dt="2024-06-18T07:27:28.400" v="392" actId="26606"/>
-          <ac:spMkLst>
-            <pc:docMk/>
-            <pc:sldMk cId="2778858687" sldId="261"/>
-            <ac:spMk id="43" creationId="{53947E58-F088-49F1-A3D1-DEA690192E84}"/>
-          </ac:spMkLst>
-        </pc:spChg>
-        <pc:spChg chg="add del">
-          <ac:chgData name="Alexander Hahn" userId="56d4792ddc6be58c" providerId="LiveId" clId="{056C6563-87CA-9F41-86EA-9A3B7E1F5939}" dt="2024-06-18T07:12:40.278" v="153" actId="26606"/>
-          <ac:spMkLst>
-            <pc:docMk/>
-            <pc:sldMk cId="2778858687" sldId="261"/>
-            <ac:spMk id="1031" creationId="{32AEEBC8-9D30-42EF-95F2-386C2653FBF0}"/>
-          </ac:spMkLst>
-        </pc:spChg>
-        <pc:spChg chg="add del">
-          <ac:chgData name="Alexander Hahn" userId="56d4792ddc6be58c" providerId="LiveId" clId="{056C6563-87CA-9F41-86EA-9A3B7E1F5939}" dt="2024-06-18T07:12:40.278" v="153" actId="26606"/>
-          <ac:spMkLst>
-            <pc:docMk/>
-            <pc:sldMk cId="2778858687" sldId="261"/>
-            <ac:spMk id="1033" creationId="{3529E97A-97C3-40EA-8A04-5C02398D568F}"/>
-          </ac:spMkLst>
-        </pc:spChg>
-        <pc:spChg chg="add del">
-          <ac:chgData name="Alexander Hahn" userId="56d4792ddc6be58c" providerId="LiveId" clId="{056C6563-87CA-9F41-86EA-9A3B7E1F5939}" dt="2024-06-18T07:12:40.278" v="153" actId="26606"/>
-          <ac:spMkLst>
-            <pc:docMk/>
-            <pc:sldMk cId="2778858687" sldId="261"/>
-            <ac:spMk id="1035" creationId="{59FA8C2E-A5A7-4490-927A-7CD58343EDBB}"/>
           </ac:spMkLst>
         </pc:spChg>
         <pc:grpChg chg="add del">
@@ -709,31 +396,23 @@
             <ac:picMk id="6" creationId="{19930EA2-8AFD-650A-2AAD-9FC0CE8E5F35}"/>
           </ac:picMkLst>
         </pc:picChg>
-        <pc:picChg chg="add del mod">
-          <ac:chgData name="Alexander Hahn" userId="56d4792ddc6be58c" providerId="LiveId" clId="{056C6563-87CA-9F41-86EA-9A3B7E1F5939}" dt="2024-06-18T07:10:26.030" v="150" actId="478"/>
+        <pc:picChg chg="add mod">
+          <ac:chgData name="Alexander Hahn" userId="56d4792ddc6be58c" providerId="LiveId" clId="{056C6563-87CA-9F41-86EA-9A3B7E1F5939}" dt="2024-06-17T07:45:25.861" v="54" actId="26606"/>
           <ac:picMkLst>
             <pc:docMk/>
             <pc:sldMk cId="2778858687" sldId="261"/>
             <ac:picMk id="9" creationId="{7852D209-7032-5E85-7580-74635263AA36}"/>
           </ac:picMkLst>
         </pc:picChg>
-        <pc:picChg chg="add del mod">
-          <ac:chgData name="Alexander Hahn" userId="56d4792ddc6be58c" providerId="LiveId" clId="{056C6563-87CA-9F41-86EA-9A3B7E1F5939}" dt="2024-06-18T07:12:42.294" v="154" actId="478"/>
-          <ac:picMkLst>
-            <pc:docMk/>
-            <pc:sldMk cId="2778858687" sldId="261"/>
-            <ac:picMk id="1026" creationId="{91C018E8-427F-1710-9DA0-4425682579A0}"/>
-          </ac:picMkLst>
-        </pc:picChg>
       </pc:sldChg>
-      <pc:sldChg chg="addSp delSp modSp new mod ord setBg">
-        <pc:chgData name="Alexander Hahn" userId="56d4792ddc6be58c" providerId="LiveId" clId="{056C6563-87CA-9F41-86EA-9A3B7E1F5939}" dt="2024-06-18T07:25:08.895" v="388" actId="20578"/>
+      <pc:sldChg chg="addSp delSp modSp new mod setBg">
+        <pc:chgData name="Alexander Hahn" userId="56d4792ddc6be58c" providerId="LiveId" clId="{056C6563-87CA-9F41-86EA-9A3B7E1F5939}" dt="2024-06-17T07:45:21.409" v="53" actId="26606"/>
         <pc:sldMkLst>
           <pc:docMk/>
           <pc:sldMk cId="1842017856" sldId="262"/>
         </pc:sldMkLst>
         <pc:spChg chg="mod">
-          <ac:chgData name="Alexander Hahn" userId="56d4792ddc6be58c" providerId="LiveId" clId="{056C6563-87CA-9F41-86EA-9A3B7E1F5939}" dt="2024-06-18T07:15:52.134" v="212" actId="26606"/>
+          <ac:chgData name="Alexander Hahn" userId="56d4792ddc6be58c" providerId="LiveId" clId="{056C6563-87CA-9F41-86EA-9A3B7E1F5939}" dt="2024-06-17T07:45:21.409" v="53" actId="26606"/>
           <ac:spMkLst>
             <pc:docMk/>
             <pc:sldMk cId="1842017856" sldId="262"/>
@@ -748,214 +427,54 @@
             <ac:spMk id="3" creationId="{6FC87C11-9911-49D8-365C-1428455D4221}"/>
           </ac:spMkLst>
         </pc:spChg>
-        <pc:spChg chg="add del mod">
-          <ac:chgData name="Alexander Hahn" userId="56d4792ddc6be58c" providerId="LiveId" clId="{056C6563-87CA-9F41-86EA-9A3B7E1F5939}" dt="2024-06-18T07:15:29.371" v="202"/>
-          <ac:spMkLst>
-            <pc:docMk/>
-            <pc:sldMk cId="1842017856" sldId="262"/>
-            <ac:spMk id="4" creationId="{E3B477B6-72E8-C2BC-7558-090DC82974BC}"/>
-          </ac:spMkLst>
-        </pc:spChg>
-        <pc:spChg chg="add del">
-          <ac:chgData name="Alexander Hahn" userId="56d4792ddc6be58c" providerId="LiveId" clId="{056C6563-87CA-9F41-86EA-9A3B7E1F5939}" dt="2024-06-18T07:15:52.134" v="212" actId="26606"/>
+        <pc:spChg chg="add">
+          <ac:chgData name="Alexander Hahn" userId="56d4792ddc6be58c" providerId="LiveId" clId="{056C6563-87CA-9F41-86EA-9A3B7E1F5939}" dt="2024-06-17T07:45:21.409" v="53" actId="26606"/>
           <ac:spMkLst>
             <pc:docMk/>
             <pc:sldMk cId="1842017856" sldId="262"/>
             <ac:spMk id="10" creationId="{A8384FB5-9ADC-4DDC-881B-597D56F5B15D}"/>
           </ac:spMkLst>
         </pc:spChg>
-        <pc:spChg chg="add del">
-          <ac:chgData name="Alexander Hahn" userId="56d4792ddc6be58c" providerId="LiveId" clId="{056C6563-87CA-9F41-86EA-9A3B7E1F5939}" dt="2024-06-18T07:15:52.134" v="212" actId="26606"/>
+        <pc:spChg chg="add">
+          <ac:chgData name="Alexander Hahn" userId="56d4792ddc6be58c" providerId="LiveId" clId="{056C6563-87CA-9F41-86EA-9A3B7E1F5939}" dt="2024-06-17T07:45:21.409" v="53" actId="26606"/>
           <ac:spMkLst>
             <pc:docMk/>
             <pc:sldMk cId="1842017856" sldId="262"/>
             <ac:spMk id="12" creationId="{91E5A9A7-95C6-4F4F-B00E-C82E07FE62EF}"/>
           </ac:spMkLst>
         </pc:spChg>
-        <pc:spChg chg="add del">
-          <ac:chgData name="Alexander Hahn" userId="56d4792ddc6be58c" providerId="LiveId" clId="{056C6563-87CA-9F41-86EA-9A3B7E1F5939}" dt="2024-06-18T07:15:52.134" v="212" actId="26606"/>
+        <pc:spChg chg="add">
+          <ac:chgData name="Alexander Hahn" userId="56d4792ddc6be58c" providerId="LiveId" clId="{056C6563-87CA-9F41-86EA-9A3B7E1F5939}" dt="2024-06-17T07:45:21.409" v="53" actId="26606"/>
           <ac:spMkLst>
             <pc:docMk/>
             <pc:sldMk cId="1842017856" sldId="262"/>
             <ac:spMk id="14" creationId="{D07DD2DE-F619-49DD-B5E7-03A290FF4ED1}"/>
           </ac:spMkLst>
         </pc:spChg>
-        <pc:spChg chg="add del">
-          <ac:chgData name="Alexander Hahn" userId="56d4792ddc6be58c" providerId="LiveId" clId="{056C6563-87CA-9F41-86EA-9A3B7E1F5939}" dt="2024-06-18T07:15:52.134" v="212" actId="26606"/>
+        <pc:spChg chg="add">
+          <ac:chgData name="Alexander Hahn" userId="56d4792ddc6be58c" providerId="LiveId" clId="{056C6563-87CA-9F41-86EA-9A3B7E1F5939}" dt="2024-06-17T07:45:21.409" v="53" actId="26606"/>
           <ac:spMkLst>
             <pc:docMk/>
             <pc:sldMk cId="1842017856" sldId="262"/>
             <ac:spMk id="16" creationId="{85149191-5F60-4A28-AAFF-039F96B0F3EC}"/>
           </ac:spMkLst>
         </pc:spChg>
-        <pc:spChg chg="add del">
-          <ac:chgData name="Alexander Hahn" userId="56d4792ddc6be58c" providerId="LiveId" clId="{056C6563-87CA-9F41-86EA-9A3B7E1F5939}" dt="2024-06-18T07:15:52.134" v="212" actId="26606"/>
+        <pc:spChg chg="add">
+          <ac:chgData name="Alexander Hahn" userId="56d4792ddc6be58c" providerId="LiveId" clId="{056C6563-87CA-9F41-86EA-9A3B7E1F5939}" dt="2024-06-17T07:45:21.409" v="53" actId="26606"/>
           <ac:spMkLst>
             <pc:docMk/>
             <pc:sldMk cId="1842017856" sldId="262"/>
             <ac:spMk id="18" creationId="{F8260ED5-17F7-4158-B241-D51DD4CF1B7E}"/>
           </ac:spMkLst>
         </pc:spChg>
-        <pc:spChg chg="add">
-          <ac:chgData name="Alexander Hahn" userId="56d4792ddc6be58c" providerId="LiveId" clId="{056C6563-87CA-9F41-86EA-9A3B7E1F5939}" dt="2024-06-18T07:15:52.134" v="212" actId="26606"/>
-          <ac:spMkLst>
-            <pc:docMk/>
-            <pc:sldMk cId="1842017856" sldId="262"/>
-            <ac:spMk id="20" creationId="{A8384FB5-9ADC-4DDC-881B-597D56F5B15D}"/>
-          </ac:spMkLst>
-        </pc:spChg>
-        <pc:spChg chg="add">
-          <ac:chgData name="Alexander Hahn" userId="56d4792ddc6be58c" providerId="LiveId" clId="{056C6563-87CA-9F41-86EA-9A3B7E1F5939}" dt="2024-06-18T07:15:52.134" v="212" actId="26606"/>
-          <ac:spMkLst>
-            <pc:docMk/>
-            <pc:sldMk cId="1842017856" sldId="262"/>
-            <ac:spMk id="21" creationId="{1199E1B1-A8C0-4FE8-A5A8-1CB41D69F857}"/>
-          </ac:spMkLst>
-        </pc:spChg>
-        <pc:spChg chg="add del">
-          <ac:chgData name="Alexander Hahn" userId="56d4792ddc6be58c" providerId="LiveId" clId="{056C6563-87CA-9F41-86EA-9A3B7E1F5939}" dt="2024-06-18T07:15:38.681" v="207" actId="26606"/>
-          <ac:spMkLst>
-            <pc:docMk/>
-            <pc:sldMk cId="1842017856" sldId="262"/>
-            <ac:spMk id="22" creationId="{AE197F30-F71D-8B02-8826-021EFDE2125F}"/>
-          </ac:spMkLst>
-        </pc:spChg>
-        <pc:spChg chg="add del">
-          <ac:chgData name="Alexander Hahn" userId="56d4792ddc6be58c" providerId="LiveId" clId="{056C6563-87CA-9F41-86EA-9A3B7E1F5939}" dt="2024-06-18T07:15:36.444" v="205" actId="26606"/>
-          <ac:spMkLst>
-            <pc:docMk/>
-            <pc:sldMk cId="1842017856" sldId="262"/>
-            <ac:spMk id="23" creationId="{F0DCC097-1DB8-4B6D-85D0-6FBA0E1CA4BA}"/>
-          </ac:spMkLst>
-        </pc:spChg>
-        <pc:spChg chg="add">
-          <ac:chgData name="Alexander Hahn" userId="56d4792ddc6be58c" providerId="LiveId" clId="{056C6563-87CA-9F41-86EA-9A3B7E1F5939}" dt="2024-06-18T07:15:52.134" v="212" actId="26606"/>
-          <ac:spMkLst>
-            <pc:docMk/>
-            <pc:sldMk cId="1842017856" sldId="262"/>
-            <ac:spMk id="24" creationId="{84A8DE83-DE75-4B41-9DB4-A7EC0B0DEC0B}"/>
-          </ac:spMkLst>
-        </pc:spChg>
-        <pc:spChg chg="add del">
-          <ac:chgData name="Alexander Hahn" userId="56d4792ddc6be58c" providerId="LiveId" clId="{056C6563-87CA-9F41-86EA-9A3B7E1F5939}" dt="2024-06-18T07:15:36.444" v="205" actId="26606"/>
-          <ac:spMkLst>
-            <pc:docMk/>
-            <pc:sldMk cId="1842017856" sldId="262"/>
-            <ac:spMk id="25" creationId="{E0B58608-23C8-4441-994D-C6823EEE1DB7}"/>
-          </ac:spMkLst>
-        </pc:spChg>
-        <pc:spChg chg="add">
-          <ac:chgData name="Alexander Hahn" userId="56d4792ddc6be58c" providerId="LiveId" clId="{056C6563-87CA-9F41-86EA-9A3B7E1F5939}" dt="2024-06-18T07:15:52.134" v="212" actId="26606"/>
-          <ac:spMkLst>
-            <pc:docMk/>
-            <pc:sldMk cId="1842017856" sldId="262"/>
-            <ac:spMk id="26" creationId="{A7009A0A-BEF5-4EAC-AF15-E4F9F002E239}"/>
-          </ac:spMkLst>
-        </pc:spChg>
-        <pc:spChg chg="add del">
-          <ac:chgData name="Alexander Hahn" userId="56d4792ddc6be58c" providerId="LiveId" clId="{056C6563-87CA-9F41-86EA-9A3B7E1F5939}" dt="2024-06-18T07:15:38.681" v="207" actId="26606"/>
-          <ac:spMkLst>
-            <pc:docMk/>
-            <pc:sldMk cId="1842017856" sldId="262"/>
-            <ac:spMk id="27" creationId="{3B2E3793-BFE6-45A2-9B7B-E18844431C99}"/>
-          </ac:spMkLst>
-        </pc:spChg>
-        <pc:spChg chg="add del">
-          <ac:chgData name="Alexander Hahn" userId="56d4792ddc6be58c" providerId="LiveId" clId="{056C6563-87CA-9F41-86EA-9A3B7E1F5939}" dt="2024-06-18T07:15:38.681" v="207" actId="26606"/>
-          <ac:spMkLst>
-            <pc:docMk/>
-            <pc:sldMk cId="1842017856" sldId="262"/>
-            <ac:spMk id="28" creationId="{1B15ED52-F352-441B-82BF-E0EA34836D08}"/>
-          </ac:spMkLst>
-        </pc:spChg>
-        <pc:spChg chg="add del">
-          <ac:chgData name="Alexander Hahn" userId="56d4792ddc6be58c" providerId="LiveId" clId="{056C6563-87CA-9F41-86EA-9A3B7E1F5939}" dt="2024-06-18T07:15:38.681" v="207" actId="26606"/>
-          <ac:spMkLst>
-            <pc:docMk/>
-            <pc:sldMk cId="1842017856" sldId="262"/>
-            <ac:spMk id="29" creationId="{BC4C4868-CB8F-4AF9-9CDB-8108F2C19B67}"/>
-          </ac:spMkLst>
-        </pc:spChg>
-        <pc:spChg chg="add del">
-          <ac:chgData name="Alexander Hahn" userId="56d4792ddc6be58c" providerId="LiveId" clId="{056C6563-87CA-9F41-86EA-9A3B7E1F5939}" dt="2024-06-18T07:15:38.681" v="207" actId="26606"/>
-          <ac:spMkLst>
-            <pc:docMk/>
-            <pc:sldMk cId="1842017856" sldId="262"/>
-            <ac:spMk id="31" creationId="{375E0459-6403-40CD-989D-56A4407CA12E}"/>
-          </ac:spMkLst>
-        </pc:spChg>
-        <pc:spChg chg="add del">
-          <ac:chgData name="Alexander Hahn" userId="56d4792ddc6be58c" providerId="LiveId" clId="{056C6563-87CA-9F41-86EA-9A3B7E1F5939}" dt="2024-06-18T07:15:38.681" v="207" actId="26606"/>
-          <ac:spMkLst>
-            <pc:docMk/>
-            <pc:sldMk cId="1842017856" sldId="262"/>
-            <ac:spMk id="33" creationId="{53E5B1A8-3AC9-4BD1-9BBC-78CA94F2D1BA}"/>
-          </ac:spMkLst>
-        </pc:spChg>
-        <pc:spChg chg="add del">
-          <ac:chgData name="Alexander Hahn" userId="56d4792ddc6be58c" providerId="LiveId" clId="{056C6563-87CA-9F41-86EA-9A3B7E1F5939}" dt="2024-06-18T07:15:39.084" v="209" actId="26606"/>
-          <ac:spMkLst>
-            <pc:docMk/>
-            <pc:sldMk cId="1842017856" sldId="262"/>
-            <ac:spMk id="38" creationId="{23D09407-53BC-485E-B4CE-BC5E4FC4B25B}"/>
-          </ac:spMkLst>
-        </pc:spChg>
-        <pc:spChg chg="add del">
-          <ac:chgData name="Alexander Hahn" userId="56d4792ddc6be58c" providerId="LiveId" clId="{056C6563-87CA-9F41-86EA-9A3B7E1F5939}" dt="2024-06-18T07:15:39.084" v="209" actId="26606"/>
-          <ac:spMkLst>
-            <pc:docMk/>
-            <pc:sldMk cId="1842017856" sldId="262"/>
-            <ac:spMk id="39" creationId="{921DB988-49FC-4608-B0A2-E2F3A4019041}"/>
-          </ac:spMkLst>
-        </pc:spChg>
-        <pc:spChg chg="add del">
-          <ac:chgData name="Alexander Hahn" userId="56d4792ddc6be58c" providerId="LiveId" clId="{056C6563-87CA-9F41-86EA-9A3B7E1F5939}" dt="2024-06-18T07:15:40.236" v="211" actId="26606"/>
-          <ac:spMkLst>
-            <pc:docMk/>
-            <pc:sldMk cId="1842017856" sldId="262"/>
-            <ac:spMk id="46" creationId="{5E395AE0-8789-FAD6-A987-32E65C185100}"/>
-          </ac:spMkLst>
-        </pc:spChg>
-        <pc:grpChg chg="add del">
-          <ac:chgData name="Alexander Hahn" userId="56d4792ddc6be58c" providerId="LiveId" clId="{056C6563-87CA-9F41-86EA-9A3B7E1F5939}" dt="2024-06-18T07:15:39.084" v="209" actId="26606"/>
-          <ac:grpSpMkLst>
-            <pc:docMk/>
-            <pc:sldMk cId="1842017856" sldId="262"/>
-            <ac:grpSpMk id="40" creationId="{E9B930FD-8671-4C4C-ADCF-73AC1D0CD417}"/>
-          </ac:grpSpMkLst>
-        </pc:grpChg>
-        <pc:grpChg chg="add del">
-          <ac:chgData name="Alexander Hahn" userId="56d4792ddc6be58c" providerId="LiveId" clId="{056C6563-87CA-9F41-86EA-9A3B7E1F5939}" dt="2024-06-18T07:15:39.084" v="209" actId="26606"/>
-          <ac:grpSpMkLst>
-            <pc:docMk/>
-            <pc:sldMk cId="1842017856" sldId="262"/>
-            <ac:grpSpMk id="44" creationId="{383C2651-AE0C-4AE4-8725-E2F9414FE219}"/>
-          </ac:grpSpMkLst>
-        </pc:grpChg>
-        <pc:picChg chg="add del mod">
-          <ac:chgData name="Alexander Hahn" userId="56d4792ddc6be58c" providerId="LiveId" clId="{056C6563-87CA-9F41-86EA-9A3B7E1F5939}" dt="2024-06-18T07:15:27.045" v="201" actId="478"/>
+        <pc:picChg chg="add mod">
+          <ac:chgData name="Alexander Hahn" userId="56d4792ddc6be58c" providerId="LiveId" clId="{056C6563-87CA-9F41-86EA-9A3B7E1F5939}" dt="2024-06-17T07:45:21.409" v="53" actId="26606"/>
           <ac:picMkLst>
             <pc:docMk/>
             <pc:sldMk cId="1842017856" sldId="262"/>
             <ac:picMk id="5" creationId="{DD2A62F2-1783-3A56-90F7-BB257B483076}"/>
           </ac:picMkLst>
         </pc:picChg>
-        <pc:picChg chg="add mod">
-          <ac:chgData name="Alexander Hahn" userId="56d4792ddc6be58c" providerId="LiveId" clId="{056C6563-87CA-9F41-86EA-9A3B7E1F5939}" dt="2024-06-18T07:15:52.134" v="212" actId="26606"/>
-          <ac:picMkLst>
-            <pc:docMk/>
-            <pc:sldMk cId="1842017856" sldId="262"/>
-            <ac:picMk id="7" creationId="{F1480E2A-AF53-0356-C859-20E30727ADCE}"/>
-          </ac:picMkLst>
-        </pc:picChg>
-        <pc:cxnChg chg="add del">
-          <ac:chgData name="Alexander Hahn" userId="56d4792ddc6be58c" providerId="LiveId" clId="{056C6563-87CA-9F41-86EA-9A3B7E1F5939}" dt="2024-06-18T07:15:40.236" v="211" actId="26606"/>
-          <ac:cxnSpMkLst>
-            <pc:docMk/>
-            <pc:sldMk cId="1842017856" sldId="262"/>
-            <ac:cxnSpMk id="47" creationId="{7667AA61-5C27-F30F-D229-06CBE5709F33}"/>
-          </ac:cxnSpMkLst>
-        </pc:cxnChg>
       </pc:sldChg>
       <pc:sldChg chg="addSp delSp modSp new mod setBg modClrScheme delDesignElem chgLayout">
         <pc:chgData name="Alexander Hahn" userId="56d4792ddc6be58c" providerId="LiveId" clId="{056C6563-87CA-9F41-86EA-9A3B7E1F5939}" dt="2024-06-17T07:45:59.347" v="68" actId="478"/>
@@ -2251,12 +1770,14 @@
         <a:blipFill>
           <a:blip xmlns:r="http://schemas.openxmlformats.org/officeDocument/2006/relationships" r:embed="rId5">
             <a:extLst>
+              <a:ext uri="{28A0092B-C50C-407E-A947-70E740481C1C}">
+                <a14:useLocalDpi xmlns:a14="http://schemas.microsoft.com/office/drawing/2010/main" val="0"/>
+              </a:ext>
               <a:ext uri="{96DAC541-7B7A-43D3-8B79-37D633B846F1}">
                 <asvg:svgBlip xmlns:asvg="http://schemas.microsoft.com/office/drawing/2016/SVG/main" r:embed="rId6"/>
               </a:ext>
             </a:extLst>
           </a:blip>
-          <a:srcRect/>
           <a:stretch>
             <a:fillRect/>
           </a:stretch>
@@ -2267,7 +1788,7 @@
       </dgm:spPr>
       <dgm:extLst>
         <a:ext uri="{E40237B7-FDA0-4F09-8148-C483321AD2D9}">
-          <dgm14:cNvPr xmlns:dgm14="http://schemas.microsoft.com/office/drawing/2010/diagram" id="0" name="" descr="Server Silhouette"/>
+          <dgm14:cNvPr xmlns:dgm14="http://schemas.microsoft.com/office/drawing/2010/diagram" id="0" name="" descr="Tanabata Tree"/>
         </a:ext>
       </dgm:extLst>
     </dgm:pt>
@@ -2298,12 +1819,14 @@
         <a:blipFill>
           <a:blip xmlns:r="http://schemas.openxmlformats.org/officeDocument/2006/relationships" r:embed="rId7">
             <a:extLst>
+              <a:ext uri="{28A0092B-C50C-407E-A947-70E740481C1C}">
+                <a14:useLocalDpi xmlns:a14="http://schemas.microsoft.com/office/drawing/2010/main" val="0"/>
+              </a:ext>
               <a:ext uri="{96DAC541-7B7A-43D3-8B79-37D633B846F1}">
                 <asvg:svgBlip xmlns:asvg="http://schemas.microsoft.com/office/drawing/2016/SVG/main" r:embed="rId8"/>
               </a:ext>
             </a:extLst>
           </a:blip>
-          <a:srcRect/>
           <a:stretch>
             <a:fillRect/>
           </a:stretch>
@@ -2314,7 +1837,7 @@
       </dgm:spPr>
       <dgm:extLst>
         <a:ext uri="{E40237B7-FDA0-4F09-8148-C483321AD2D9}">
-          <dgm14:cNvPr xmlns:dgm14="http://schemas.microsoft.com/office/drawing/2010/diagram" id="0" name="" descr="Kamera Silhouette"/>
+          <dgm14:cNvPr xmlns:dgm14="http://schemas.microsoft.com/office/drawing/2010/diagram" id="0" name="" descr="Untertitel"/>
         </a:ext>
       </dgm:extLst>
     </dgm:pt>
@@ -2673,12 +2196,14 @@
         <a:blipFill>
           <a:blip xmlns:r="http://schemas.openxmlformats.org/officeDocument/2006/relationships" r:embed="rId5">
             <a:extLst>
+              <a:ext uri="{28A0092B-C50C-407E-A947-70E740481C1C}">
+                <a14:useLocalDpi xmlns:a14="http://schemas.microsoft.com/office/drawing/2010/main" val="0"/>
+              </a:ext>
               <a:ext uri="{96DAC541-7B7A-43D3-8B79-37D633B846F1}">
                 <asvg:svgBlip xmlns:asvg="http://schemas.microsoft.com/office/drawing/2016/SVG/main" r:embed="rId6"/>
               </a:ext>
             </a:extLst>
           </a:blip>
-          <a:srcRect/>
           <a:stretch>
             <a:fillRect/>
           </a:stretch>
@@ -2812,12 +2337,14 @@
         <a:blipFill>
           <a:blip xmlns:r="http://schemas.openxmlformats.org/officeDocument/2006/relationships" r:embed="rId7">
             <a:extLst>
+              <a:ext uri="{28A0092B-C50C-407E-A947-70E740481C1C}">
+                <a14:useLocalDpi xmlns:a14="http://schemas.microsoft.com/office/drawing/2010/main" val="0"/>
+              </a:ext>
               <a:ext uri="{96DAC541-7B7A-43D3-8B79-37D633B846F1}">
                 <asvg:svgBlip xmlns:asvg="http://schemas.microsoft.com/office/drawing/2016/SVG/main" r:embed="rId8"/>
               </a:ext>
             </a:extLst>
           </a:blip>
-          <a:srcRect/>
           <a:stretch>
             <a:fillRect/>
           </a:stretch>
@@ -4163,440 +3690,6 @@
 </dgm:styleDef>
 </file>
 
-<file path=ppt/notesMasters/notesMaster1.xml><?xml version="1.0" encoding="utf-8"?>
-<p:notesMaster xmlns:a="http://schemas.openxmlformats.org/drawingml/2006/main" xmlns:r="http://schemas.openxmlformats.org/officeDocument/2006/relationships" xmlns:p="http://schemas.openxmlformats.org/presentationml/2006/main">
-  <p:cSld>
-    <p:bg>
-      <p:bgRef idx="1001">
-        <a:schemeClr val="bg1"/>
-      </p:bgRef>
-    </p:bg>
-    <p:spTree>
-      <p:nvGrpSpPr>
-        <p:cNvPr id="1" name=""/>
-        <p:cNvGrpSpPr/>
-        <p:nvPr/>
-      </p:nvGrpSpPr>
-      <p:grpSpPr>
-        <a:xfrm>
-          <a:off x="0" y="0"/>
-          <a:ext cx="0" cy="0"/>
-          <a:chOff x="0" y="0"/>
-          <a:chExt cx="0" cy="0"/>
-        </a:xfrm>
-      </p:grpSpPr>
-      <p:sp>
-        <p:nvSpPr>
-          <p:cNvPr id="2" name="Kopfzeilenplatzhalter 1"/>
-          <p:cNvSpPr>
-            <a:spLocks noGrp="1"/>
-          </p:cNvSpPr>
-          <p:nvPr>
-            <p:ph type="hdr" sz="quarter"/>
-          </p:nvPr>
-        </p:nvSpPr>
-        <p:spPr>
-          <a:xfrm>
-            <a:off x="0" y="0"/>
-            <a:ext cx="2971800" cy="458788"/>
-          </a:xfrm>
-          <a:prstGeom prst="rect">
-            <a:avLst/>
-          </a:prstGeom>
-        </p:spPr>
-        <p:txBody>
-          <a:bodyPr vert="horz" lIns="91440" tIns="45720" rIns="91440" bIns="45720" rtlCol="0"/>
-          <a:lstStyle>
-            <a:lvl1pPr algn="l">
-              <a:defRPr sz="1200"/>
-            </a:lvl1pPr>
-          </a:lstStyle>
-          <a:p>
-            <a:endParaRPr lang="de-AT"/>
-          </a:p>
-        </p:txBody>
-      </p:sp>
-      <p:sp>
-        <p:nvSpPr>
-          <p:cNvPr id="3" name="Datumsplatzhalter 2"/>
-          <p:cNvSpPr>
-            <a:spLocks noGrp="1"/>
-          </p:cNvSpPr>
-          <p:nvPr>
-            <p:ph type="dt" idx="1"/>
-          </p:nvPr>
-        </p:nvSpPr>
-        <p:spPr>
-          <a:xfrm>
-            <a:off x="3884613" y="0"/>
-            <a:ext cx="2971800" cy="458788"/>
-          </a:xfrm>
-          <a:prstGeom prst="rect">
-            <a:avLst/>
-          </a:prstGeom>
-        </p:spPr>
-        <p:txBody>
-          <a:bodyPr vert="horz" lIns="91440" tIns="45720" rIns="91440" bIns="45720" rtlCol="0"/>
-          <a:lstStyle>
-            <a:lvl1pPr algn="r">
-              <a:defRPr sz="1200"/>
-            </a:lvl1pPr>
-          </a:lstStyle>
-          <a:p>
-            <a:fld id="{711D630A-C034-2842-AB1F-A1B843BC91A7}" type="datetimeFigureOut">
-              <a:rPr lang="de-AT" smtClean="0"/>
-              <a:t>18.06.24</a:t>
-            </a:fld>
-            <a:endParaRPr lang="de-AT"/>
-          </a:p>
-        </p:txBody>
-      </p:sp>
-      <p:sp>
-        <p:nvSpPr>
-          <p:cNvPr id="4" name="Folienbildplatzhalter 3"/>
-          <p:cNvSpPr>
-            <a:spLocks noGrp="1" noRot="1" noChangeAspect="1"/>
-          </p:cNvSpPr>
-          <p:nvPr>
-            <p:ph type="sldImg" idx="2"/>
-          </p:nvPr>
-        </p:nvSpPr>
-        <p:spPr>
-          <a:xfrm>
-            <a:off x="685800" y="1143000"/>
-            <a:ext cx="5486400" cy="3086100"/>
-          </a:xfrm>
-          <a:prstGeom prst="rect">
-            <a:avLst/>
-          </a:prstGeom>
-          <a:noFill/>
-          <a:ln w="12700">
-            <a:solidFill>
-              <a:prstClr val="black"/>
-            </a:solidFill>
-          </a:ln>
-        </p:spPr>
-        <p:txBody>
-          <a:bodyPr vert="horz" lIns="91440" tIns="45720" rIns="91440" bIns="45720" rtlCol="0" anchor="ctr"/>
-          <a:lstStyle/>
-          <a:p>
-            <a:endParaRPr lang="de-AT"/>
-          </a:p>
-        </p:txBody>
-      </p:sp>
-      <p:sp>
-        <p:nvSpPr>
-          <p:cNvPr id="5" name="Notizenplatzhalter 4"/>
-          <p:cNvSpPr>
-            <a:spLocks noGrp="1"/>
-          </p:cNvSpPr>
-          <p:nvPr>
-            <p:ph type="body" sz="quarter" idx="3"/>
-          </p:nvPr>
-        </p:nvSpPr>
-        <p:spPr>
-          <a:xfrm>
-            <a:off x="685800" y="4400550"/>
-            <a:ext cx="5486400" cy="3600450"/>
-          </a:xfrm>
-          <a:prstGeom prst="rect">
-            <a:avLst/>
-          </a:prstGeom>
-        </p:spPr>
-        <p:txBody>
-          <a:bodyPr vert="horz" lIns="91440" tIns="45720" rIns="91440" bIns="45720" rtlCol="0"/>
-          <a:lstStyle/>
-          <a:p>
-            <a:pPr lvl="0"/>
-            <a:r>
-              <a:rPr lang="de-DE"/>
-              <a:t>Mastertextformat bearbeiten</a:t>
-            </a:r>
-          </a:p>
-          <a:p>
-            <a:pPr lvl="1"/>
-            <a:r>
-              <a:rPr lang="de-DE"/>
-              <a:t>Zweite Ebene</a:t>
-            </a:r>
-          </a:p>
-          <a:p>
-            <a:pPr lvl="2"/>
-            <a:r>
-              <a:rPr lang="de-DE"/>
-              <a:t>Dritte Ebene</a:t>
-            </a:r>
-          </a:p>
-          <a:p>
-            <a:pPr lvl="3"/>
-            <a:r>
-              <a:rPr lang="de-DE"/>
-              <a:t>Vierte Ebene</a:t>
-            </a:r>
-          </a:p>
-          <a:p>
-            <a:pPr lvl="4"/>
-            <a:r>
-              <a:rPr lang="de-DE"/>
-              <a:t>Fünfte Ebene</a:t>
-            </a:r>
-            <a:endParaRPr lang="de-AT"/>
-          </a:p>
-        </p:txBody>
-      </p:sp>
-      <p:sp>
-        <p:nvSpPr>
-          <p:cNvPr id="6" name="Fußzeilenplatzhalter 5"/>
-          <p:cNvSpPr>
-            <a:spLocks noGrp="1"/>
-          </p:cNvSpPr>
-          <p:nvPr>
-            <p:ph type="ftr" sz="quarter" idx="4"/>
-          </p:nvPr>
-        </p:nvSpPr>
-        <p:spPr>
-          <a:xfrm>
-            <a:off x="0" y="8685213"/>
-            <a:ext cx="2971800" cy="458787"/>
-          </a:xfrm>
-          <a:prstGeom prst="rect">
-            <a:avLst/>
-          </a:prstGeom>
-        </p:spPr>
-        <p:txBody>
-          <a:bodyPr vert="horz" lIns="91440" tIns="45720" rIns="91440" bIns="45720" rtlCol="0" anchor="b"/>
-          <a:lstStyle>
-            <a:lvl1pPr algn="l">
-              <a:defRPr sz="1200"/>
-            </a:lvl1pPr>
-          </a:lstStyle>
-          <a:p>
-            <a:endParaRPr lang="de-AT"/>
-          </a:p>
-        </p:txBody>
-      </p:sp>
-      <p:sp>
-        <p:nvSpPr>
-          <p:cNvPr id="7" name="Foliennummernplatzhalter 6"/>
-          <p:cNvSpPr>
-            <a:spLocks noGrp="1"/>
-          </p:cNvSpPr>
-          <p:nvPr>
-            <p:ph type="sldNum" sz="quarter" idx="5"/>
-          </p:nvPr>
-        </p:nvSpPr>
-        <p:spPr>
-          <a:xfrm>
-            <a:off x="3884613" y="8685213"/>
-            <a:ext cx="2971800" cy="458787"/>
-          </a:xfrm>
-          <a:prstGeom prst="rect">
-            <a:avLst/>
-          </a:prstGeom>
-        </p:spPr>
-        <p:txBody>
-          <a:bodyPr vert="horz" lIns="91440" tIns="45720" rIns="91440" bIns="45720" rtlCol="0" anchor="b"/>
-          <a:lstStyle>
-            <a:lvl1pPr algn="r">
-              <a:defRPr sz="1200"/>
-            </a:lvl1pPr>
-          </a:lstStyle>
-          <a:p>
-            <a:fld id="{A96C298E-B08E-C94D-BC8F-479A81B39683}" type="slidenum">
-              <a:rPr lang="de-AT" smtClean="0"/>
-              <a:t>‹Nr.›</a:t>
-            </a:fld>
-            <a:endParaRPr lang="de-AT"/>
-          </a:p>
-        </p:txBody>
-      </p:sp>
-    </p:spTree>
-    <p:extLst>
-      <p:ext uri="{BB962C8B-B14F-4D97-AF65-F5344CB8AC3E}">
-        <p14:creationId xmlns:p14="http://schemas.microsoft.com/office/powerpoint/2010/main" val="1482156614"/>
-      </p:ext>
-    </p:extLst>
-  </p:cSld>
-  <p:clrMap bg1="lt1" tx1="dk1" bg2="lt2" tx2="dk2" accent1="accent1" accent2="accent2" accent3="accent3" accent4="accent4" accent5="accent5" accent6="accent6" hlink="hlink" folHlink="folHlink"/>
-  <p:notesStyle>
-    <a:lvl1pPr marL="0" algn="l" defTabSz="914400" rtl="0" eaLnBrk="1" latinLnBrk="0" hangingPunct="1">
-      <a:defRPr sz="1200" kern="1200">
-        <a:solidFill>
-          <a:schemeClr val="tx1"/>
-        </a:solidFill>
-        <a:latin typeface="+mn-lt"/>
-        <a:ea typeface="+mn-ea"/>
-        <a:cs typeface="+mn-cs"/>
-      </a:defRPr>
-    </a:lvl1pPr>
-    <a:lvl2pPr marL="457200" algn="l" defTabSz="914400" rtl="0" eaLnBrk="1" latinLnBrk="0" hangingPunct="1">
-      <a:defRPr sz="1200" kern="1200">
-        <a:solidFill>
-          <a:schemeClr val="tx1"/>
-        </a:solidFill>
-        <a:latin typeface="+mn-lt"/>
-        <a:ea typeface="+mn-ea"/>
-        <a:cs typeface="+mn-cs"/>
-      </a:defRPr>
-    </a:lvl2pPr>
-    <a:lvl3pPr marL="914400" algn="l" defTabSz="914400" rtl="0" eaLnBrk="1" latinLnBrk="0" hangingPunct="1">
-      <a:defRPr sz="1200" kern="1200">
-        <a:solidFill>
-          <a:schemeClr val="tx1"/>
-        </a:solidFill>
-        <a:latin typeface="+mn-lt"/>
-        <a:ea typeface="+mn-ea"/>
-        <a:cs typeface="+mn-cs"/>
-      </a:defRPr>
-    </a:lvl3pPr>
-    <a:lvl4pPr marL="1371600" algn="l" defTabSz="914400" rtl="0" eaLnBrk="1" latinLnBrk="0" hangingPunct="1">
-      <a:defRPr sz="1200" kern="1200">
-        <a:solidFill>
-          <a:schemeClr val="tx1"/>
-        </a:solidFill>
-        <a:latin typeface="+mn-lt"/>
-        <a:ea typeface="+mn-ea"/>
-        <a:cs typeface="+mn-cs"/>
-      </a:defRPr>
-    </a:lvl4pPr>
-    <a:lvl5pPr marL="1828800" algn="l" defTabSz="914400" rtl="0" eaLnBrk="1" latinLnBrk="0" hangingPunct="1">
-      <a:defRPr sz="1200" kern="1200">
-        <a:solidFill>
-          <a:schemeClr val="tx1"/>
-        </a:solidFill>
-        <a:latin typeface="+mn-lt"/>
-        <a:ea typeface="+mn-ea"/>
-        <a:cs typeface="+mn-cs"/>
-      </a:defRPr>
-    </a:lvl5pPr>
-    <a:lvl6pPr marL="2286000" algn="l" defTabSz="914400" rtl="0" eaLnBrk="1" latinLnBrk="0" hangingPunct="1">
-      <a:defRPr sz="1200" kern="1200">
-        <a:solidFill>
-          <a:schemeClr val="tx1"/>
-        </a:solidFill>
-        <a:latin typeface="+mn-lt"/>
-        <a:ea typeface="+mn-ea"/>
-        <a:cs typeface="+mn-cs"/>
-      </a:defRPr>
-    </a:lvl6pPr>
-    <a:lvl7pPr marL="2743200" algn="l" defTabSz="914400" rtl="0" eaLnBrk="1" latinLnBrk="0" hangingPunct="1">
-      <a:defRPr sz="1200" kern="1200">
-        <a:solidFill>
-          <a:schemeClr val="tx1"/>
-        </a:solidFill>
-        <a:latin typeface="+mn-lt"/>
-        <a:ea typeface="+mn-ea"/>
-        <a:cs typeface="+mn-cs"/>
-      </a:defRPr>
-    </a:lvl7pPr>
-    <a:lvl8pPr marL="3200400" algn="l" defTabSz="914400" rtl="0" eaLnBrk="1" latinLnBrk="0" hangingPunct="1">
-      <a:defRPr sz="1200" kern="1200">
-        <a:solidFill>
-          <a:schemeClr val="tx1"/>
-        </a:solidFill>
-        <a:latin typeface="+mn-lt"/>
-        <a:ea typeface="+mn-ea"/>
-        <a:cs typeface="+mn-cs"/>
-      </a:defRPr>
-    </a:lvl8pPr>
-    <a:lvl9pPr marL="3657600" algn="l" defTabSz="914400" rtl="0" eaLnBrk="1" latinLnBrk="0" hangingPunct="1">
-      <a:defRPr sz="1200" kern="1200">
-        <a:solidFill>
-          <a:schemeClr val="tx1"/>
-        </a:solidFill>
-        <a:latin typeface="+mn-lt"/>
-        <a:ea typeface="+mn-ea"/>
-        <a:cs typeface="+mn-cs"/>
-      </a:defRPr>
-    </a:lvl9pPr>
-  </p:notesStyle>
-</p:notesMaster>
-</file>
-
-<file path=ppt/notesSlides/notesSlide1.xml><?xml version="1.0" encoding="utf-8"?>
-<p:notes xmlns:a="http://schemas.openxmlformats.org/drawingml/2006/main" xmlns:r="http://schemas.openxmlformats.org/officeDocument/2006/relationships" xmlns:p="http://schemas.openxmlformats.org/presentationml/2006/main">
-  <p:cSld>
-    <p:spTree>
-      <p:nvGrpSpPr>
-        <p:cNvPr id="1" name=""/>
-        <p:cNvGrpSpPr/>
-        <p:nvPr/>
-      </p:nvGrpSpPr>
-      <p:grpSpPr>
-        <a:xfrm>
-          <a:off x="0" y="0"/>
-          <a:ext cx="0" cy="0"/>
-          <a:chOff x="0" y="0"/>
-          <a:chExt cx="0" cy="0"/>
-        </a:xfrm>
-      </p:grpSpPr>
-      <p:sp>
-        <p:nvSpPr>
-          <p:cNvPr id="2" name="Folienbildplatzhalter 1"/>
-          <p:cNvSpPr>
-            <a:spLocks noGrp="1" noRot="1" noChangeAspect="1"/>
-          </p:cNvSpPr>
-          <p:nvPr>
-            <p:ph type="sldImg"/>
-          </p:nvPr>
-        </p:nvSpPr>
-        <p:spPr/>
-      </p:sp>
-      <p:sp>
-        <p:nvSpPr>
-          <p:cNvPr id="3" name="Notizenplatzhalter 2"/>
-          <p:cNvSpPr>
-            <a:spLocks noGrp="1"/>
-          </p:cNvSpPr>
-          <p:nvPr>
-            <p:ph type="body" idx="1"/>
-          </p:nvPr>
-        </p:nvSpPr>
-        <p:spPr/>
-        <p:txBody>
-          <a:bodyPr/>
-          <a:lstStyle/>
-          <a:p>
-            <a:endParaRPr lang="de-AT" dirty="0"/>
-          </a:p>
-        </p:txBody>
-      </p:sp>
-      <p:sp>
-        <p:nvSpPr>
-          <p:cNvPr id="4" name="Foliennummernplatzhalter 3"/>
-          <p:cNvSpPr>
-            <a:spLocks noGrp="1"/>
-          </p:cNvSpPr>
-          <p:nvPr>
-            <p:ph type="sldNum" sz="quarter" idx="5"/>
-          </p:nvPr>
-        </p:nvSpPr>
-        <p:spPr/>
-        <p:txBody>
-          <a:bodyPr/>
-          <a:lstStyle/>
-          <a:p>
-            <a:fld id="{A96C298E-B08E-C94D-BC8F-479A81B39683}" type="slidenum">
-              <a:rPr lang="de-AT" smtClean="0"/>
-              <a:t>7</a:t>
-            </a:fld>
-            <a:endParaRPr lang="de-AT"/>
-          </a:p>
-        </p:txBody>
-      </p:sp>
-    </p:spTree>
-    <p:extLst>
-      <p:ext uri="{BB962C8B-B14F-4D97-AF65-F5344CB8AC3E}">
-        <p14:creationId xmlns:p14="http://schemas.microsoft.com/office/powerpoint/2010/main" val="2487528790"/>
-      </p:ext>
-    </p:extLst>
-  </p:cSld>
-  <p:clrMapOvr>
-    <a:masterClrMapping/>
-  </p:clrMapOvr>
-</p:notes>
-</file>
-
 <file path=ppt/slideLayouts/slideLayout1.xml><?xml version="1.0" encoding="utf-8"?>
 <p:sldLayout xmlns:a="http://schemas.openxmlformats.org/drawingml/2006/main" xmlns:r="http://schemas.openxmlformats.org/officeDocument/2006/relationships" xmlns:p="http://schemas.openxmlformats.org/presentationml/2006/main" type="title" preserve="1">
   <p:cSld name="Titelfolie">
@@ -4728,7 +3821,7 @@
           <a:p>
             <a:fld id="{4DB221A6-2486-4C42-A2DE-093B5CE9B803}" type="datetimeFigureOut">
               <a:rPr lang="de-AT" smtClean="0"/>
-              <a:t>18.06.24</a:t>
+              <a:t>17.06.24</a:t>
             </a:fld>
             <a:endParaRPr lang="de-AT"/>
           </a:p>
@@ -4898,7 +3991,7 @@
           <a:p>
             <a:fld id="{4DB221A6-2486-4C42-A2DE-093B5CE9B803}" type="datetimeFigureOut">
               <a:rPr lang="de-AT" smtClean="0"/>
-              <a:t>18.06.24</a:t>
+              <a:t>17.06.24</a:t>
             </a:fld>
             <a:endParaRPr lang="de-AT"/>
           </a:p>
@@ -5078,7 +4171,7 @@
           <a:p>
             <a:fld id="{4DB221A6-2486-4C42-A2DE-093B5CE9B803}" type="datetimeFigureOut">
               <a:rPr lang="de-AT" smtClean="0"/>
-              <a:t>18.06.24</a:t>
+              <a:t>17.06.24</a:t>
             </a:fld>
             <a:endParaRPr lang="de-AT"/>
           </a:p>
@@ -5248,7 +4341,7 @@
           <a:p>
             <a:fld id="{4DB221A6-2486-4C42-A2DE-093B5CE9B803}" type="datetimeFigureOut">
               <a:rPr lang="de-AT" smtClean="0"/>
-              <a:t>18.06.24</a:t>
+              <a:t>17.06.24</a:t>
             </a:fld>
             <a:endParaRPr lang="de-AT"/>
           </a:p>
@@ -5494,7 +4587,7 @@
           <a:p>
             <a:fld id="{4DB221A6-2486-4C42-A2DE-093B5CE9B803}" type="datetimeFigureOut">
               <a:rPr lang="de-AT" smtClean="0"/>
-              <a:t>18.06.24</a:t>
+              <a:t>17.06.24</a:t>
             </a:fld>
             <a:endParaRPr lang="de-AT"/>
           </a:p>
@@ -5726,7 +4819,7 @@
           <a:p>
             <a:fld id="{4DB221A6-2486-4C42-A2DE-093B5CE9B803}" type="datetimeFigureOut">
               <a:rPr lang="de-AT" smtClean="0"/>
-              <a:t>18.06.24</a:t>
+              <a:t>17.06.24</a:t>
             </a:fld>
             <a:endParaRPr lang="de-AT"/>
           </a:p>
@@ -6093,7 +5186,7 @@
           <a:p>
             <a:fld id="{4DB221A6-2486-4C42-A2DE-093B5CE9B803}" type="datetimeFigureOut">
               <a:rPr lang="de-AT" smtClean="0"/>
-              <a:t>18.06.24</a:t>
+              <a:t>17.06.24</a:t>
             </a:fld>
             <a:endParaRPr lang="de-AT"/>
           </a:p>
@@ -6211,7 +5304,7 @@
           <a:p>
             <a:fld id="{4DB221A6-2486-4C42-A2DE-093B5CE9B803}" type="datetimeFigureOut">
               <a:rPr lang="de-AT" smtClean="0"/>
-              <a:t>18.06.24</a:t>
+              <a:t>17.06.24</a:t>
             </a:fld>
             <a:endParaRPr lang="de-AT"/>
           </a:p>
@@ -6306,7 +5399,7 @@
           <a:p>
             <a:fld id="{4DB221A6-2486-4C42-A2DE-093B5CE9B803}" type="datetimeFigureOut">
               <a:rPr lang="de-AT" smtClean="0"/>
-              <a:t>18.06.24</a:t>
+              <a:t>17.06.24</a:t>
             </a:fld>
             <a:endParaRPr lang="de-AT"/>
           </a:p>
@@ -6583,7 +5676,7 @@
           <a:p>
             <a:fld id="{4DB221A6-2486-4C42-A2DE-093B5CE9B803}" type="datetimeFigureOut">
               <a:rPr lang="de-AT" smtClean="0"/>
-              <a:t>18.06.24</a:t>
+              <a:t>17.06.24</a:t>
             </a:fld>
             <a:endParaRPr lang="de-AT"/>
           </a:p>
@@ -6840,7 +5933,7 @@
           <a:p>
             <a:fld id="{4DB221A6-2486-4C42-A2DE-093B5CE9B803}" type="datetimeFigureOut">
               <a:rPr lang="de-AT" smtClean="0"/>
-              <a:t>18.06.24</a:t>
+              <a:t>17.06.24</a:t>
             </a:fld>
             <a:endParaRPr lang="de-AT"/>
           </a:p>
@@ -7053,7 +6146,7 @@
           <a:p>
             <a:fld id="{4DB221A6-2486-4C42-A2DE-093B5CE9B803}" type="datetimeFigureOut">
               <a:rPr lang="de-AT" smtClean="0"/>
-              <a:t>18.06.24</a:t>
+              <a:t>17.06.24</a:t>
             </a:fld>
             <a:endParaRPr lang="de-AT"/>
           </a:p>
@@ -8569,9 +7662,10 @@
           </a:p>
           <a:p>
             <a:r>
-              <a:rPr lang="de-AT" sz="2000" dirty="0"/>
-              <a:t>Technologien</a:t>
+              <a:rPr lang="de-AT" sz="2000" dirty="0" err="1"/>
+              <a:t>Clockify</a:t>
             </a:r>
+            <a:endParaRPr lang="de-AT" sz="2000" dirty="0"/>
           </a:p>
           <a:p>
             <a:r>
@@ -8585,10 +7679,17 @@
           </a:p>
           <a:p>
             <a:r>
+              <a:rPr lang="de-AT" sz="2000" dirty="0"/>
+              <a:t>Technologien(</a:t>
+            </a:r>
+            <a:r>
               <a:rPr lang="de-AT" sz="2000" dirty="0" err="1"/>
-              <a:t>Clockify</a:t>
+              <a:t>Github</a:t>
             </a:r>
-            <a:endParaRPr lang="de-AT" sz="2000" dirty="0"/>
+            <a:r>
+              <a:rPr lang="de-AT" sz="2000" dirty="0"/>
+              <a:t> Screenshot)</a:t>
+            </a:r>
           </a:p>
           <a:p>
             <a:r>
@@ -8997,7 +8098,7 @@
             <p:ph idx="1"/>
             <p:extLst>
               <p:ext uri="{D42A27DB-BD31-4B8C-83A1-F6EECF244321}">
-                <p14:modId xmlns:p14="http://schemas.microsoft.com/office/powerpoint/2010/main" val="362930148"/>
+                <p14:modId xmlns:p14="http://schemas.microsoft.com/office/powerpoint/2010/main" val="3192337966"/>
               </p:ext>
             </p:extLst>
           </p:nvPr>
@@ -9028,14 +8129,6 @@
 <file path=ppt/slides/slide4.xml><?xml version="1.0" encoding="utf-8"?>
 <p:sld xmlns:a="http://schemas.openxmlformats.org/drawingml/2006/main" xmlns:r="http://schemas.openxmlformats.org/officeDocument/2006/relationships" xmlns:p="http://schemas.openxmlformats.org/presentationml/2006/main">
   <p:cSld>
-    <p:bg>
-      <p:bgPr>
-        <a:solidFill>
-          <a:schemeClr val="bg1"/>
-        </a:solidFill>
-        <a:effectLst/>
-      </p:bgPr>
-    </p:bg>
     <p:spTree>
       <p:nvGrpSpPr>
         <p:cNvPr id="1" name=""/>
@@ -9052,19 +8145,17 @@
       </p:grpSpPr>
       <p:sp useBgFill="1">
         <p:nvSpPr>
-          <p:cNvPr id="2055" name="Rectangle 2054">
+          <p:cNvPr id="2" name="Rectangle 1030">
             <a:extLst>
               <a:ext uri="{FF2B5EF4-FFF2-40B4-BE49-F238E27FC236}">
-                <a16:creationId xmlns:a16="http://schemas.microsoft.com/office/drawing/2014/main" id="{C4285719-470E-454C-AF62-8323075F1F5B}"/>
+                <a16:creationId xmlns:a16="http://schemas.microsoft.com/office/drawing/2014/main" id="{6519A4E8-8A8A-78E4-8F4B-C0C739CE82DC}"/>
               </a:ext>
               <a:ext uri="{C183D7F6-B498-43B3-948B-1728B52AA6E4}">
                 <adec:decorative xmlns:adec="http://schemas.microsoft.com/office/drawing/2017/decorative" val="1"/>
               </a:ext>
             </a:extLst>
           </p:cNvPr>
-          <p:cNvSpPr>
-            <a:spLocks noGrp="1" noRot="1" noChangeAspect="1" noMove="1" noResize="1" noEditPoints="1" noAdjustHandles="1" noChangeArrowheads="1" noChangeShapeType="1" noTextEdit="1"/>
-          </p:cNvSpPr>
+          <p:cNvSpPr/>
           <p:nvPr>
             <p:extLst>
               <p:ext uri="{386F3935-93C4-4BCD-93E2-E3B085C9AB24}">
@@ -9076,7 +8167,7 @@
         <p:spPr>
           <a:xfrm>
             <a:off x="0" y="0"/>
-            <a:ext cx="12188952" cy="6858000"/>
+            <a:ext cx="12192000" cy="6858000"/>
           </a:xfrm>
           <a:prstGeom prst="rect">
             <a:avLst/>
@@ -9128,476 +8219,6 @@
       </p:sp>
       <p:sp>
         <p:nvSpPr>
-          <p:cNvPr id="2057" name="Rectangle 2056">
-            <a:extLst>
-              <a:ext uri="{FF2B5EF4-FFF2-40B4-BE49-F238E27FC236}">
-                <a16:creationId xmlns:a16="http://schemas.microsoft.com/office/drawing/2014/main" id="{CD9FE4EF-C4D8-49A0-B2FF-81D8DB7D8A24}"/>
-              </a:ext>
-              <a:ext uri="{C183D7F6-B498-43B3-948B-1728B52AA6E4}">
-                <adec:decorative xmlns:adec="http://schemas.microsoft.com/office/drawing/2017/decorative" val="1"/>
-              </a:ext>
-            </a:extLst>
-          </p:cNvPr>
-          <p:cNvSpPr>
-            <a:spLocks noGrp="1" noRot="1" noChangeAspect="1" noMove="1" noResize="1" noEditPoints="1" noAdjustHandles="1" noChangeArrowheads="1" noChangeShapeType="1" noTextEdit="1"/>
-          </p:cNvSpPr>
-          <p:nvPr>
-            <p:extLst>
-              <p:ext uri="{386F3935-93C4-4BCD-93E2-E3B085C9AB24}">
-                <p16:designElem xmlns:p16="http://schemas.microsoft.com/office/powerpoint/2015/main" val="1"/>
-              </p:ext>
-            </p:extLst>
-          </p:nvPr>
-        </p:nvSpPr>
-        <p:spPr>
-          <a:xfrm rot="5400000" flipH="1">
-            <a:off x="-1410084" y="1410082"/>
-            <a:ext cx="6858000" cy="4037836"/>
-          </a:xfrm>
-          <a:prstGeom prst="rect">
-            <a:avLst/>
-          </a:prstGeom>
-          <a:gradFill>
-            <a:gsLst>
-              <a:gs pos="8000">
-                <a:srgbClr val="000000"/>
-              </a:gs>
-              <a:gs pos="100000">
-                <a:schemeClr val="accent1">
-                  <a:lumMod val="75000"/>
-                </a:schemeClr>
-              </a:gs>
-            </a:gsLst>
-            <a:lin ang="3000000" scaled="0"/>
-          </a:gradFill>
-          <a:ln>
-            <a:noFill/>
-          </a:ln>
-        </p:spPr>
-        <p:style>
-          <a:lnRef idx="2">
-            <a:schemeClr val="accent1">
-              <a:shade val="50000"/>
-            </a:schemeClr>
-          </a:lnRef>
-          <a:fillRef idx="1">
-            <a:schemeClr val="accent1"/>
-          </a:fillRef>
-          <a:effectRef idx="0">
-            <a:schemeClr val="accent1"/>
-          </a:effectRef>
-          <a:fontRef idx="minor">
-            <a:schemeClr val="lt1"/>
-          </a:fontRef>
-        </p:style>
-        <p:txBody>
-          <a:bodyPr rtlCol="0" anchor="ctr"/>
-          <a:lstStyle/>
-          <a:p>
-            <a:pPr algn="ctr"/>
-            <a:endParaRPr lang="en-US"/>
-          </a:p>
-        </p:txBody>
-      </p:sp>
-      <p:sp>
-        <p:nvSpPr>
-          <p:cNvPr id="2059" name="Rectangle 2058">
-            <a:extLst>
-              <a:ext uri="{FF2B5EF4-FFF2-40B4-BE49-F238E27FC236}">
-                <a16:creationId xmlns:a16="http://schemas.microsoft.com/office/drawing/2014/main" id="{4300840D-0A0B-4512-BACA-B439D5B9C57C}"/>
-              </a:ext>
-              <a:ext uri="{C183D7F6-B498-43B3-948B-1728B52AA6E4}">
-                <adec:decorative xmlns:adec="http://schemas.microsoft.com/office/drawing/2017/decorative" val="1"/>
-              </a:ext>
-            </a:extLst>
-          </p:cNvPr>
-          <p:cNvSpPr>
-            <a:spLocks noGrp="1" noRot="1" noChangeAspect="1" noMove="1" noResize="1" noEditPoints="1" noAdjustHandles="1" noChangeArrowheads="1" noChangeShapeType="1" noTextEdit="1"/>
-          </p:cNvSpPr>
-          <p:nvPr>
-            <p:extLst>
-              <p:ext uri="{386F3935-93C4-4BCD-93E2-E3B085C9AB24}">
-                <p16:designElem xmlns:p16="http://schemas.microsoft.com/office/powerpoint/2015/main" val="1"/>
-              </p:ext>
-            </p:extLst>
-          </p:nvPr>
-        </p:nvSpPr>
-        <p:spPr>
-          <a:xfrm rot="5400000" flipH="1">
-            <a:off x="-1410085" y="1420219"/>
-            <a:ext cx="6857999" cy="4037839"/>
-          </a:xfrm>
-          <a:prstGeom prst="rect">
-            <a:avLst/>
-          </a:prstGeom>
-          <a:gradFill>
-            <a:gsLst>
-              <a:gs pos="0">
-                <a:srgbClr val="000000">
-                  <a:alpha val="0"/>
-                </a:srgbClr>
-              </a:gs>
-              <a:gs pos="99000">
-                <a:schemeClr val="accent1">
-                  <a:alpha val="46000"/>
-                </a:schemeClr>
-              </a:gs>
-            </a:gsLst>
-            <a:lin ang="1800000" scaled="0"/>
-          </a:gradFill>
-          <a:ln>
-            <a:noFill/>
-          </a:ln>
-        </p:spPr>
-        <p:style>
-          <a:lnRef idx="2">
-            <a:schemeClr val="accent1">
-              <a:shade val="50000"/>
-            </a:schemeClr>
-          </a:lnRef>
-          <a:fillRef idx="1">
-            <a:schemeClr val="accent1"/>
-          </a:fillRef>
-          <a:effectRef idx="0">
-            <a:schemeClr val="accent1"/>
-          </a:effectRef>
-          <a:fontRef idx="minor">
-            <a:schemeClr val="lt1"/>
-          </a:fontRef>
-        </p:style>
-        <p:txBody>
-          <a:bodyPr rtlCol="0" anchor="ctr"/>
-          <a:lstStyle/>
-          <a:p>
-            <a:pPr algn="ctr"/>
-            <a:endParaRPr lang="en-US"/>
-          </a:p>
-        </p:txBody>
-      </p:sp>
-      <p:sp>
-        <p:nvSpPr>
-          <p:cNvPr id="2061" name="Rectangle 2060">
-            <a:extLst>
-              <a:ext uri="{FF2B5EF4-FFF2-40B4-BE49-F238E27FC236}">
-                <a16:creationId xmlns:a16="http://schemas.microsoft.com/office/drawing/2014/main" id="{D2B78728-A580-49A7-84F9-6EF6F583ADE0}"/>
-              </a:ext>
-              <a:ext uri="{C183D7F6-B498-43B3-948B-1728B52AA6E4}">
-                <adec:decorative xmlns:adec="http://schemas.microsoft.com/office/drawing/2017/decorative" val="1"/>
-              </a:ext>
-            </a:extLst>
-          </p:cNvPr>
-          <p:cNvSpPr>
-            <a:spLocks noGrp="1" noRot="1" noChangeAspect="1" noMove="1" noResize="1" noEditPoints="1" noAdjustHandles="1" noChangeArrowheads="1" noChangeShapeType="1" noTextEdit="1"/>
-          </p:cNvSpPr>
-          <p:nvPr>
-            <p:extLst>
-              <p:ext uri="{386F3935-93C4-4BCD-93E2-E3B085C9AB24}">
-                <p16:designElem xmlns:p16="http://schemas.microsoft.com/office/powerpoint/2015/main" val="1"/>
-              </p:ext>
-            </p:extLst>
-          </p:nvPr>
-        </p:nvSpPr>
-        <p:spPr>
-          <a:xfrm rot="5400000" flipH="1">
-            <a:off x="767923" y="3588085"/>
-            <a:ext cx="2501979" cy="4037841"/>
-          </a:xfrm>
-          <a:prstGeom prst="rect">
-            <a:avLst/>
-          </a:prstGeom>
-          <a:gradFill>
-            <a:gsLst>
-              <a:gs pos="2000">
-                <a:schemeClr val="accent1">
-                  <a:alpha val="29000"/>
-                </a:schemeClr>
-              </a:gs>
-              <a:gs pos="100000">
-                <a:srgbClr val="000000">
-                  <a:alpha val="30000"/>
-                </a:srgbClr>
-              </a:gs>
-            </a:gsLst>
-            <a:lin ang="7800000" scaled="0"/>
-          </a:gradFill>
-          <a:ln>
-            <a:noFill/>
-          </a:ln>
-        </p:spPr>
-        <p:style>
-          <a:lnRef idx="2">
-            <a:schemeClr val="accent1">
-              <a:shade val="50000"/>
-            </a:schemeClr>
-          </a:lnRef>
-          <a:fillRef idx="1">
-            <a:schemeClr val="accent1"/>
-          </a:fillRef>
-          <a:effectRef idx="0">
-            <a:schemeClr val="accent1"/>
-          </a:effectRef>
-          <a:fontRef idx="minor">
-            <a:schemeClr val="lt1"/>
-          </a:fontRef>
-        </p:style>
-        <p:txBody>
-          <a:bodyPr rtlCol="0" anchor="ctr"/>
-          <a:lstStyle/>
-          <a:p>
-            <a:pPr algn="ctr"/>
-            <a:endParaRPr lang="en-US" dirty="0"/>
-          </a:p>
-        </p:txBody>
-      </p:sp>
-      <p:sp>
-        <p:nvSpPr>
-          <p:cNvPr id="2063" name="Freeform: Shape 2062">
-            <a:extLst>
-              <a:ext uri="{FF2B5EF4-FFF2-40B4-BE49-F238E27FC236}">
-                <a16:creationId xmlns:a16="http://schemas.microsoft.com/office/drawing/2014/main" id="{38FAA1A1-D861-433F-88FA-1E9D6FD31D11}"/>
-              </a:ext>
-              <a:ext uri="{C183D7F6-B498-43B3-948B-1728B52AA6E4}">
-                <adec:decorative xmlns:adec="http://schemas.microsoft.com/office/drawing/2017/decorative" val="1"/>
-              </a:ext>
-            </a:extLst>
-          </p:cNvPr>
-          <p:cNvSpPr>
-            <a:spLocks noGrp="1" noRot="1" noChangeAspect="1" noMove="1" noResize="1" noEditPoints="1" noAdjustHandles="1" noChangeArrowheads="1" noChangeShapeType="1" noTextEdit="1"/>
-          </p:cNvSpPr>
-          <p:nvPr>
-            <p:extLst>
-              <p:ext uri="{386F3935-93C4-4BCD-93E2-E3B085C9AB24}">
-                <p16:designElem xmlns:p16="http://schemas.microsoft.com/office/powerpoint/2015/main" val="1"/>
-              </p:ext>
-            </p:extLst>
-          </p:nvPr>
-        </p:nvSpPr>
-        <p:spPr>
-          <a:xfrm rot="20635413">
-            <a:off x="-501737" y="969718"/>
-            <a:ext cx="3900357" cy="4178958"/>
-          </a:xfrm>
-          <a:custGeom>
-            <a:avLst/>
-            <a:gdLst>
-              <a:gd name="connsiteX0" fmla="*/ 2432225 w 3900357"/>
-              <a:gd name="connsiteY0" fmla="*/ 93939 h 4178958"/>
-              <a:gd name="connsiteX1" fmla="*/ 3900357 w 3900357"/>
-              <a:gd name="connsiteY1" fmla="*/ 2089479 h 4178958"/>
-              <a:gd name="connsiteX2" fmla="*/ 1810878 w 3900357"/>
-              <a:gd name="connsiteY2" fmla="*/ 4178958 h 4178958"/>
-              <a:gd name="connsiteX3" fmla="*/ 78249 w 3900357"/>
-              <a:gd name="connsiteY3" fmla="*/ 3257727 h 4178958"/>
-              <a:gd name="connsiteX4" fmla="*/ 0 w 3900357"/>
-              <a:gd name="connsiteY4" fmla="*/ 3128923 h 4178958"/>
-              <a:gd name="connsiteX5" fmla="*/ 831324 w 3900357"/>
-              <a:gd name="connsiteY5" fmla="*/ 244281 h 4178958"/>
-              <a:gd name="connsiteX6" fmla="*/ 997559 w 3900357"/>
-              <a:gd name="connsiteY6" fmla="*/ 164202 h 4178958"/>
-              <a:gd name="connsiteX7" fmla="*/ 1810878 w 3900357"/>
-              <a:gd name="connsiteY7" fmla="*/ 0 h 4178958"/>
-              <a:gd name="connsiteX8" fmla="*/ 2432225 w 3900357"/>
-              <a:gd name="connsiteY8" fmla="*/ 93939 h 4178958"/>
-            </a:gdLst>
-            <a:ahLst/>
-            <a:cxnLst>
-              <a:cxn ang="0">
-                <a:pos x="connsiteX0" y="connsiteY0"/>
-              </a:cxn>
-              <a:cxn ang="0">
-                <a:pos x="connsiteX1" y="connsiteY1"/>
-              </a:cxn>
-              <a:cxn ang="0">
-                <a:pos x="connsiteX2" y="connsiteY2"/>
-              </a:cxn>
-              <a:cxn ang="0">
-                <a:pos x="connsiteX3" y="connsiteY3"/>
-              </a:cxn>
-              <a:cxn ang="0">
-                <a:pos x="connsiteX4" y="connsiteY4"/>
-              </a:cxn>
-              <a:cxn ang="0">
-                <a:pos x="connsiteX5" y="connsiteY5"/>
-              </a:cxn>
-              <a:cxn ang="0">
-                <a:pos x="connsiteX6" y="connsiteY6"/>
-              </a:cxn>
-              <a:cxn ang="0">
-                <a:pos x="connsiteX7" y="connsiteY7"/>
-              </a:cxn>
-              <a:cxn ang="0">
-                <a:pos x="connsiteX8" y="connsiteY8"/>
-              </a:cxn>
-            </a:cxnLst>
-            <a:rect l="l" t="t" r="r" b="b"/>
-            <a:pathLst>
-              <a:path w="3900357" h="4178958">
-                <a:moveTo>
-                  <a:pt x="2432225" y="93939"/>
-                </a:moveTo>
-                <a:cubicBezTo>
-                  <a:pt x="3282786" y="358491"/>
-                  <a:pt x="3900357" y="1151865"/>
-                  <a:pt x="3900357" y="2089479"/>
-                </a:cubicBezTo>
-                <a:cubicBezTo>
-                  <a:pt x="3900357" y="3243466"/>
-                  <a:pt x="2964865" y="4178958"/>
-                  <a:pt x="1810878" y="4178958"/>
-                </a:cubicBezTo>
-                <a:cubicBezTo>
-                  <a:pt x="1089636" y="4178958"/>
-                  <a:pt x="453744" y="3813531"/>
-                  <a:pt x="78249" y="3257727"/>
-                </a:cubicBezTo>
-                <a:lnTo>
-                  <a:pt x="0" y="3128923"/>
-                </a:lnTo>
-                <a:lnTo>
-                  <a:pt x="831324" y="244281"/>
-                </a:lnTo>
-                <a:lnTo>
-                  <a:pt x="997559" y="164202"/>
-                </a:lnTo>
-                <a:cubicBezTo>
-                  <a:pt x="1247540" y="58468"/>
-                  <a:pt x="1522381" y="0"/>
-                  <a:pt x="1810878" y="0"/>
-                </a:cubicBezTo>
-                <a:cubicBezTo>
-                  <a:pt x="2027251" y="0"/>
-                  <a:pt x="2235942" y="32888"/>
-                  <a:pt x="2432225" y="93939"/>
-                </a:cubicBezTo>
-                <a:close/>
-              </a:path>
-            </a:pathLst>
-          </a:custGeom>
-          <a:gradFill>
-            <a:gsLst>
-              <a:gs pos="29000">
-                <a:srgbClr val="000000">
-                  <a:alpha val="0"/>
-                </a:srgbClr>
-              </a:gs>
-              <a:gs pos="100000">
-                <a:schemeClr val="accent1">
-                  <a:alpha val="43000"/>
-                </a:schemeClr>
-              </a:gs>
-            </a:gsLst>
-            <a:lin ang="1800000" scaled="0"/>
-          </a:gradFill>
-          <a:ln>
-            <a:noFill/>
-          </a:ln>
-        </p:spPr>
-        <p:style>
-          <a:lnRef idx="2">
-            <a:schemeClr val="accent1">
-              <a:shade val="50000"/>
-            </a:schemeClr>
-          </a:lnRef>
-          <a:fillRef idx="1">
-            <a:schemeClr val="accent1"/>
-          </a:fillRef>
-          <a:effectRef idx="0">
-            <a:schemeClr val="accent1"/>
-          </a:effectRef>
-          <a:fontRef idx="minor">
-            <a:schemeClr val="lt1"/>
-          </a:fontRef>
-        </p:style>
-        <p:txBody>
-          <a:bodyPr wrap="square" rtlCol="0" anchor="ctr">
-            <a:noAutofit/>
-          </a:bodyPr>
-          <a:lstStyle/>
-          <a:p>
-            <a:pPr algn="ctr"/>
-            <a:endParaRPr lang="en-US" dirty="0"/>
-          </a:p>
-        </p:txBody>
-      </p:sp>
-      <p:sp>
-        <p:nvSpPr>
-          <p:cNvPr id="2065" name="Rectangle 2064">
-            <a:extLst>
-              <a:ext uri="{FF2B5EF4-FFF2-40B4-BE49-F238E27FC236}">
-                <a16:creationId xmlns:a16="http://schemas.microsoft.com/office/drawing/2014/main" id="{8D71EDA1-87BF-4D5D-AB79-F346FD19278A}"/>
-              </a:ext>
-              <a:ext uri="{C183D7F6-B498-43B3-948B-1728B52AA6E4}">
-                <adec:decorative xmlns:adec="http://schemas.microsoft.com/office/drawing/2017/decorative" val="1"/>
-              </a:ext>
-            </a:extLst>
-          </p:cNvPr>
-          <p:cNvSpPr>
-            <a:spLocks noGrp="1" noRot="1" noChangeAspect="1" noMove="1" noResize="1" noEditPoints="1" noAdjustHandles="1" noChangeArrowheads="1" noChangeShapeType="1" noTextEdit="1"/>
-          </p:cNvSpPr>
-          <p:nvPr>
-            <p:extLst>
-              <p:ext uri="{386F3935-93C4-4BCD-93E2-E3B085C9AB24}">
-                <p16:designElem xmlns:p16="http://schemas.microsoft.com/office/powerpoint/2015/main" val="1"/>
-              </p:ext>
-            </p:extLst>
-          </p:nvPr>
-        </p:nvSpPr>
-        <p:spPr>
-          <a:xfrm rot="5400000" flipH="1">
-            <a:off x="-1410093" y="1399943"/>
-            <a:ext cx="6858003" cy="4037835"/>
-          </a:xfrm>
-          <a:prstGeom prst="rect">
-            <a:avLst/>
-          </a:prstGeom>
-          <a:gradFill>
-            <a:gsLst>
-              <a:gs pos="0">
-                <a:srgbClr val="000000">
-                  <a:alpha val="0"/>
-                </a:srgbClr>
-              </a:gs>
-              <a:gs pos="99000">
-                <a:schemeClr val="accent1">
-                  <a:lumMod val="60000"/>
-                  <a:lumOff val="40000"/>
-                  <a:alpha val="11000"/>
-                </a:schemeClr>
-              </a:gs>
-            </a:gsLst>
-            <a:lin ang="7200000" scaled="0"/>
-          </a:gradFill>
-          <a:ln>
-            <a:noFill/>
-          </a:ln>
-        </p:spPr>
-        <p:style>
-          <a:lnRef idx="2">
-            <a:schemeClr val="accent1">
-              <a:shade val="50000"/>
-            </a:schemeClr>
-          </a:lnRef>
-          <a:fillRef idx="1">
-            <a:schemeClr val="accent1"/>
-          </a:fillRef>
-          <a:effectRef idx="0">
-            <a:schemeClr val="accent1"/>
-          </a:effectRef>
-          <a:fontRef idx="minor">
-            <a:schemeClr val="lt1"/>
-          </a:fontRef>
-        </p:style>
-        <p:txBody>
-          <a:bodyPr rtlCol="0" anchor="ctr"/>
-          <a:lstStyle/>
-          <a:p>
-            <a:pPr algn="ctr"/>
-            <a:endParaRPr lang="en-US"/>
-          </a:p>
-        </p:txBody>
-      </p:sp>
-      <p:sp>
-        <p:nvSpPr>
           <p:cNvPr id="3" name="Titel 1">
             <a:extLst>
               <a:ext uri="{FF2B5EF4-FFF2-40B4-BE49-F238E27FC236}">
@@ -9612,15 +8233,15 @@
         </p:nvSpPr>
         <p:spPr>
           <a:xfrm>
-            <a:off x="466722" y="586855"/>
-            <a:ext cx="3201366" cy="3387497"/>
+            <a:off x="1136397" y="502020"/>
+            <a:ext cx="5323715" cy="1642970"/>
           </a:xfrm>
           <a:prstGeom prst="rect">
             <a:avLst/>
           </a:prstGeom>
         </p:spPr>
         <p:txBody>
-          <a:bodyPr vert="horz" lIns="91440" tIns="45720" rIns="91440" bIns="45720" rtlCol="0" anchor="b">
+          <a:bodyPr anchor="b">
             <a:normAutofit/>
           </a:bodyPr>
           <a:lstStyle>
@@ -9643,22 +8264,11 @@
             </a:lvl1pPr>
           </a:lstStyle>
           <a:p>
-            <a:pPr algn="r">
-              <a:spcAft>
-                <a:spcPts val="600"/>
-              </a:spcAft>
-            </a:pPr>
             <a:r>
-              <a:rPr lang="en-US" sz="4000" kern="1200">
-                <a:solidFill>
-                  <a:srgbClr val="FFFFFF"/>
-                </a:solidFill>
-                <a:latin typeface="+mj-lt"/>
-                <a:ea typeface="+mj-ea"/>
-                <a:cs typeface="+mj-cs"/>
-              </a:rPr>
+              <a:rPr lang="de-AT" sz="4000"/>
               <a:t>Idee</a:t>
             </a:r>
+            <a:endParaRPr lang="de-AT" sz="4000" dirty="0"/>
           </a:p>
         </p:txBody>
       </p:sp>
@@ -9678,15 +8288,15 @@
         </p:nvSpPr>
         <p:spPr>
           <a:xfrm>
-            <a:off x="4581727" y="968188"/>
-            <a:ext cx="3260598" cy="5227339"/>
+            <a:off x="1144923" y="2405894"/>
+            <a:ext cx="6978410" cy="3535083"/>
           </a:xfrm>
           <a:prstGeom prst="rect">
             <a:avLst/>
           </a:prstGeom>
         </p:spPr>
         <p:txBody>
-          <a:bodyPr vert="horz" lIns="91440" tIns="45720" rIns="91440" bIns="45720" rtlCol="0" anchor="ctr">
+          <a:bodyPr anchor="t">
             <a:normAutofit/>
           </a:bodyPr>
           <a:lstStyle>
@@ -9854,90 +8464,400 @@
             </a:lvl9pPr>
           </a:lstStyle>
           <a:p>
+            <a:pPr>
+              <a:lnSpc>
+                <a:spcPct val="100000"/>
+              </a:lnSpc>
+            </a:pPr>
             <a:r>
-              <a:rPr lang="en-US" sz="2000" dirty="0" err="1"/>
-              <a:t>Bekanntes</a:t>
+              <a:rPr lang="de-AT" sz="2400"/>
+              <a:t>Bekanntes analoges Spiel: </a:t>
             </a:r>
+          </a:p>
+          <a:p>
+            <a:pPr lvl="1">
+              <a:lnSpc>
+                <a:spcPct val="100000"/>
+              </a:lnSpc>
+            </a:pPr>
             <a:r>
-              <a:rPr lang="en-US" sz="2000" dirty="0"/>
-              <a:t> </a:t>
+              <a:rPr lang="de-AT" sz="2000"/>
+              <a:t>Stadt – Land – Fluss</a:t>
             </a:r>
+          </a:p>
+          <a:p>
+            <a:pPr>
+              <a:lnSpc>
+                <a:spcPct val="100000"/>
+              </a:lnSpc>
+            </a:pPr>
             <a:r>
-              <a:rPr lang="en-US" sz="2000" dirty="0" err="1"/>
-              <a:t>analoges</a:t>
+              <a:rPr lang="de-AT" sz="2400"/>
+              <a:t>Online Version:</a:t>
             </a:r>
+          </a:p>
+          <a:p>
+            <a:pPr lvl="1">
+              <a:lnSpc>
+                <a:spcPct val="100000"/>
+              </a:lnSpc>
+            </a:pPr>
             <a:r>
-              <a:rPr lang="en-US" sz="2000" dirty="0"/>
-              <a:t> Spiel: </a:t>
+              <a:rPr lang="de-AT" sz="2000"/>
+              <a:t>Multiplayer</a:t>
             </a:r>
           </a:p>
           <a:p>
-            <a:pPr lvl="1"/>
+            <a:pPr lvl="1">
+              <a:lnSpc>
+                <a:spcPct val="100000"/>
+              </a:lnSpc>
+            </a:pPr>
             <a:r>
-              <a:rPr lang="en-US" sz="2000" dirty="0"/>
-              <a:t>Stadt – Land – </a:t>
+              <a:rPr lang="de-AT" sz="2000"/>
+              <a:t>Charaktererstellung</a:t>
             </a:r>
+          </a:p>
+          <a:p>
+            <a:pPr lvl="1">
+              <a:lnSpc>
+                <a:spcPct val="100000"/>
+              </a:lnSpc>
+            </a:pPr>
             <a:r>
-              <a:rPr lang="en-US" sz="2000" dirty="0" err="1"/>
-              <a:t>Vollpfosten</a:t>
+              <a:rPr lang="de-AT" sz="2000"/>
+              <a:t>Scoreboard</a:t>
             </a:r>
-            <a:endParaRPr lang="en-US" sz="2000" dirty="0"/>
-          </a:p>
-          <a:p>
-            <a:pPr marL="457200" lvl="1" indent="0">
+          </a:p>
+          <a:p>
+            <a:pPr>
+              <a:lnSpc>
+                <a:spcPct val="100000"/>
+              </a:lnSpc>
+            </a:pPr>
+            <a:r>
+              <a:rPr lang="de-AT" sz="2400"/>
+              <a:t>Zukünftig:</a:t>
+            </a:r>
+          </a:p>
+          <a:p>
+            <a:pPr lvl="1">
+              <a:lnSpc>
+                <a:spcPct val="100000"/>
+              </a:lnSpc>
+            </a:pPr>
+            <a:r>
+              <a:rPr lang="de-AT" sz="2000"/>
+              <a:t>Eigene Kategorien</a:t>
+            </a:r>
+          </a:p>
+          <a:p>
+            <a:pPr marL="0" indent="0">
+              <a:buFont typeface="Arial" panose="020B0604020202020204" pitchFamily="34" charset="0"/>
               <a:buNone/>
             </a:pPr>
-            <a:endParaRPr lang="en-US" sz="2000" dirty="0"/>
-          </a:p>
-          <a:p>
-            <a:r>
-              <a:rPr lang="en-US" sz="2000" dirty="0"/>
-              <a:t>Online Version:</a:t>
-            </a:r>
-          </a:p>
-          <a:p>
-            <a:pPr lvl="1"/>
-            <a:r>
-              <a:rPr lang="en-US" sz="2000" dirty="0" err="1"/>
-              <a:t>Lobbysystem</a:t>
-            </a:r>
-            <a:endParaRPr lang="en-US" sz="2000" dirty="0"/>
-          </a:p>
-          <a:p>
-            <a:pPr lvl="1"/>
-            <a:r>
-              <a:rPr lang="en-US" sz="2000" dirty="0" err="1"/>
-              <a:t>Charakterauswahl</a:t>
-            </a:r>
-            <a:endParaRPr lang="en-US" sz="2000" dirty="0"/>
-          </a:p>
-          <a:p>
-            <a:pPr lvl="1"/>
-            <a:r>
-              <a:rPr lang="en-US" sz="2000" dirty="0"/>
-              <a:t>Voting</a:t>
-            </a:r>
-          </a:p>
-          <a:p>
-            <a:pPr lvl="1"/>
-            <a:r>
-              <a:rPr lang="en-US" sz="2000" dirty="0" err="1"/>
-              <a:t>Punktesystem</a:t>
-            </a:r>
-            <a:endParaRPr lang="en-US" sz="2000" dirty="0"/>
-          </a:p>
-          <a:p>
-            <a:pPr lvl="1"/>
-            <a:endParaRPr lang="en-US" sz="2000" dirty="0"/>
+            <a:endParaRPr lang="de-AT" sz="2000" dirty="0"/>
+          </a:p>
+        </p:txBody>
+      </p:sp>
+      <p:sp>
+        <p:nvSpPr>
+          <p:cNvPr id="5" name="Rectangle 1032">
+            <a:extLst>
+              <a:ext uri="{FF2B5EF4-FFF2-40B4-BE49-F238E27FC236}">
+                <a16:creationId xmlns:a16="http://schemas.microsoft.com/office/drawing/2014/main" id="{CDC14DFF-7DF8-D25C-2881-94EC65E3085A}"/>
+              </a:ext>
+              <a:ext uri="{C183D7F6-B498-43B3-948B-1728B52AA6E4}">
+                <adec:decorative xmlns:adec="http://schemas.microsoft.com/office/drawing/2017/decorative" val="1"/>
+              </a:ext>
+            </a:extLst>
+          </p:cNvPr>
+          <p:cNvSpPr/>
+          <p:nvPr>
+            <p:extLst>
+              <p:ext uri="{386F3935-93C4-4BCD-93E2-E3B085C9AB24}">
+                <p16:designElem xmlns:p16="http://schemas.microsoft.com/office/powerpoint/2015/main" val="1"/>
+              </p:ext>
+            </p:extLst>
+          </p:nvPr>
+        </p:nvSpPr>
+        <p:spPr>
+          <a:xfrm rot="10800000" flipH="1">
+            <a:off x="8123333" y="-5"/>
+            <a:ext cx="4092521" cy="6858000"/>
+          </a:xfrm>
+          <a:prstGeom prst="rect">
+            <a:avLst/>
+          </a:prstGeom>
+          <a:gradFill>
+            <a:gsLst>
+              <a:gs pos="8000">
+                <a:srgbClr val="000000">
+                  <a:alpha val="94000"/>
+                </a:srgbClr>
+              </a:gs>
+              <a:gs pos="100000">
+                <a:schemeClr val="accent1"/>
+              </a:gs>
+            </a:gsLst>
+            <a:lin ang="2400000" scaled="0"/>
+          </a:gradFill>
+          <a:ln>
+            <a:noFill/>
+          </a:ln>
+        </p:spPr>
+        <p:style>
+          <a:lnRef idx="2">
+            <a:schemeClr val="accent1">
+              <a:shade val="50000"/>
+            </a:schemeClr>
+          </a:lnRef>
+          <a:fillRef idx="1">
+            <a:schemeClr val="accent1"/>
+          </a:fillRef>
+          <a:effectRef idx="0">
+            <a:schemeClr val="accent1"/>
+          </a:effectRef>
+          <a:fontRef idx="minor">
+            <a:schemeClr val="lt1"/>
+          </a:fontRef>
+        </p:style>
+        <p:txBody>
+          <a:bodyPr rtlCol="0" anchor="ctr"/>
+          <a:lstStyle/>
+          <a:p>
+            <a:pPr algn="ctr"/>
+            <a:endParaRPr lang="en-US"/>
+          </a:p>
+        </p:txBody>
+      </p:sp>
+      <p:sp>
+        <p:nvSpPr>
+          <p:cNvPr id="6" name="Rectangle 1034">
+            <a:extLst>
+              <a:ext uri="{FF2B5EF4-FFF2-40B4-BE49-F238E27FC236}">
+                <a16:creationId xmlns:a16="http://schemas.microsoft.com/office/drawing/2014/main" id="{9462AFEF-68BA-BDFD-3454-E5E6CCB6C5F2}"/>
+              </a:ext>
+              <a:ext uri="{C183D7F6-B498-43B3-948B-1728B52AA6E4}">
+                <adec:decorative xmlns:adec="http://schemas.microsoft.com/office/drawing/2017/decorative" val="1"/>
+              </a:ext>
+            </a:extLst>
+          </p:cNvPr>
+          <p:cNvSpPr/>
+          <p:nvPr>
+            <p:extLst>
+              <p:ext uri="{386F3935-93C4-4BCD-93E2-E3B085C9AB24}">
+                <p16:designElem xmlns:p16="http://schemas.microsoft.com/office/powerpoint/2015/main" val="1"/>
+              </p:ext>
+            </p:extLst>
+          </p:nvPr>
+        </p:nvSpPr>
+        <p:spPr>
+          <a:xfrm rot="10800000" flipH="1">
+            <a:off x="8123333" y="-2"/>
+            <a:ext cx="4092521" cy="6400369"/>
+          </a:xfrm>
+          <a:prstGeom prst="rect">
+            <a:avLst/>
+          </a:prstGeom>
+          <a:gradFill>
+            <a:gsLst>
+              <a:gs pos="31000">
+                <a:schemeClr val="accent1">
+                  <a:lumMod val="50000"/>
+                  <a:alpha val="0"/>
+                </a:schemeClr>
+              </a:gs>
+              <a:gs pos="100000">
+                <a:schemeClr val="accent1">
+                  <a:lumMod val="50000"/>
+                  <a:alpha val="26000"/>
+                </a:schemeClr>
+              </a:gs>
+            </a:gsLst>
+            <a:lin ang="18000000" scaled="0"/>
+          </a:gradFill>
+          <a:ln>
+            <a:noFill/>
+          </a:ln>
+        </p:spPr>
+        <p:style>
+          <a:lnRef idx="2">
+            <a:schemeClr val="accent1">
+              <a:shade val="50000"/>
+            </a:schemeClr>
+          </a:lnRef>
+          <a:fillRef idx="1">
+            <a:schemeClr val="accent1"/>
+          </a:fillRef>
+          <a:effectRef idx="0">
+            <a:schemeClr val="accent1"/>
+          </a:effectRef>
+          <a:fontRef idx="minor">
+            <a:schemeClr val="lt1"/>
+          </a:fontRef>
+        </p:style>
+        <p:txBody>
+          <a:bodyPr rtlCol="0" anchor="ctr"/>
+          <a:lstStyle/>
+          <a:p>
+            <a:pPr algn="ctr"/>
+            <a:endParaRPr lang="en-US" dirty="0"/>
+          </a:p>
+        </p:txBody>
+      </p:sp>
+      <p:sp>
+        <p:nvSpPr>
+          <p:cNvPr id="7" name="Rectangle 1036">
+            <a:extLst>
+              <a:ext uri="{FF2B5EF4-FFF2-40B4-BE49-F238E27FC236}">
+                <a16:creationId xmlns:a16="http://schemas.microsoft.com/office/drawing/2014/main" id="{8A402376-CC3B-0BAA-C8B4-54824EBB7819}"/>
+              </a:ext>
+              <a:ext uri="{C183D7F6-B498-43B3-948B-1728B52AA6E4}">
+                <adec:decorative xmlns:adec="http://schemas.microsoft.com/office/drawing/2017/decorative" val="1"/>
+              </a:ext>
+            </a:extLst>
+          </p:cNvPr>
+          <p:cNvSpPr/>
+          <p:nvPr>
+            <p:extLst>
+              <p:ext uri="{386F3935-93C4-4BCD-93E2-E3B085C9AB24}">
+                <p16:designElem xmlns:p16="http://schemas.microsoft.com/office/powerpoint/2015/main" val="1"/>
+              </p:ext>
+            </p:extLst>
+          </p:nvPr>
+        </p:nvSpPr>
+        <p:spPr>
+          <a:xfrm rot="10800000" flipH="1">
+            <a:off x="8123333" y="-22"/>
+            <a:ext cx="4068667" cy="6400389"/>
+          </a:xfrm>
+          <a:prstGeom prst="rect">
+            <a:avLst/>
+          </a:prstGeom>
+          <a:gradFill>
+            <a:gsLst>
+              <a:gs pos="0">
+                <a:schemeClr val="accent1">
+                  <a:alpha val="0"/>
+                </a:schemeClr>
+              </a:gs>
+              <a:gs pos="72000">
+                <a:srgbClr val="000000">
+                  <a:alpha val="21000"/>
+                </a:srgbClr>
+              </a:gs>
+            </a:gsLst>
+            <a:lin ang="3000000" scaled="0"/>
+          </a:gradFill>
+          <a:ln>
+            <a:noFill/>
+          </a:ln>
+        </p:spPr>
+        <p:style>
+          <a:lnRef idx="2">
+            <a:schemeClr val="accent1">
+              <a:shade val="50000"/>
+            </a:schemeClr>
+          </a:lnRef>
+          <a:fillRef idx="1">
+            <a:schemeClr val="accent1"/>
+          </a:fillRef>
+          <a:effectRef idx="0">
+            <a:schemeClr val="accent1"/>
+          </a:effectRef>
+          <a:fontRef idx="minor">
+            <a:schemeClr val="lt1"/>
+          </a:fontRef>
+        </p:style>
+        <p:txBody>
+          <a:bodyPr rtlCol="0" anchor="ctr"/>
+          <a:lstStyle/>
+          <a:p>
+            <a:pPr algn="ctr"/>
+            <a:endParaRPr lang="en-US" dirty="0"/>
+          </a:p>
+        </p:txBody>
+      </p:sp>
+      <p:sp>
+        <p:nvSpPr>
+          <p:cNvPr id="8" name="Rectangle 1038">
+            <a:extLst>
+              <a:ext uri="{FF2B5EF4-FFF2-40B4-BE49-F238E27FC236}">
+                <a16:creationId xmlns:a16="http://schemas.microsoft.com/office/drawing/2014/main" id="{9E5ABCD2-0D68-91DE-1869-94CBFB96E455}"/>
+              </a:ext>
+              <a:ext uri="{C183D7F6-B498-43B3-948B-1728B52AA6E4}">
+                <adec:decorative xmlns:adec="http://schemas.microsoft.com/office/drawing/2017/decorative" val="1"/>
+              </a:ext>
+            </a:extLst>
+          </p:cNvPr>
+          <p:cNvSpPr/>
+          <p:nvPr>
+            <p:extLst>
+              <p:ext uri="{386F3935-93C4-4BCD-93E2-E3B085C9AB24}">
+                <p16:designElem xmlns:p16="http://schemas.microsoft.com/office/powerpoint/2015/main" val="1"/>
+              </p:ext>
+            </p:extLst>
+          </p:nvPr>
+        </p:nvSpPr>
+        <p:spPr>
+          <a:xfrm rot="10800000" flipH="1">
+            <a:off x="8123333" y="-10"/>
+            <a:ext cx="3611467" cy="6857997"/>
+          </a:xfrm>
+          <a:prstGeom prst="rect">
+            <a:avLst/>
+          </a:prstGeom>
+          <a:gradFill>
+            <a:gsLst>
+              <a:gs pos="0">
+                <a:schemeClr val="accent1">
+                  <a:alpha val="0"/>
+                </a:schemeClr>
+              </a:gs>
+              <a:gs pos="93000">
+                <a:srgbClr val="000000">
+                  <a:alpha val="29000"/>
+                </a:srgbClr>
+              </a:gs>
+            </a:gsLst>
+            <a:lin ang="5400000" scaled="0"/>
+          </a:gradFill>
+          <a:ln>
+            <a:noFill/>
+          </a:ln>
+        </p:spPr>
+        <p:style>
+          <a:lnRef idx="2">
+            <a:schemeClr val="accent1">
+              <a:shade val="50000"/>
+            </a:schemeClr>
+          </a:lnRef>
+          <a:fillRef idx="1">
+            <a:schemeClr val="accent1"/>
+          </a:fillRef>
+          <a:effectRef idx="0">
+            <a:schemeClr val="accent1"/>
+          </a:effectRef>
+          <a:fontRef idx="minor">
+            <a:schemeClr val="lt1"/>
+          </a:fontRef>
+        </p:style>
+        <p:txBody>
+          <a:bodyPr rtlCol="0" anchor="ctr"/>
+          <a:lstStyle/>
+          <a:p>
+            <a:pPr algn="ctr"/>
+            <a:endParaRPr lang="en-US" dirty="0"/>
           </a:p>
         </p:txBody>
       </p:sp>
       <p:pic>
         <p:nvPicPr>
-          <p:cNvPr id="2050" name="Picture 2" descr="Denkriesen - Stadt Land Vollpfosten® Classic Edition – &quot;Intelligenz ist  relativ.&quot;' kaufen - Spielwaren">
+          <p:cNvPr id="9" name="Picture 2" descr="Stadt Land Fluss - Papierspiele.at">
             <a:extLst>
               <a:ext uri="{FF2B5EF4-FFF2-40B4-BE49-F238E27FC236}">
-                <a16:creationId xmlns:a16="http://schemas.microsoft.com/office/drawing/2014/main" id="{F69765AE-B27C-C716-1CBC-65BBE43111B7}"/>
+                <a16:creationId xmlns:a16="http://schemas.microsoft.com/office/drawing/2014/main" id="{444A99C5-CF23-804A-F83E-67BBD63F00E6}"/>
               </a:ext>
             </a:extLst>
           </p:cNvPr>
@@ -9960,8 +8880,8 @@
         </p:blipFill>
         <p:spPr bwMode="auto">
           <a:xfrm>
-            <a:off x="8109502" y="1627051"/>
-            <a:ext cx="3615776" cy="3615776"/>
+            <a:off x="7097360" y="1359681"/>
+            <a:ext cx="4170530" cy="4170530"/>
           </a:xfrm>
           <a:prstGeom prst="rect">
             <a:avLst/>
@@ -9978,6 +8898,69 @@
           </a:extLst>
         </p:spPr>
       </p:pic>
+      <p:sp>
+        <p:nvSpPr>
+          <p:cNvPr id="10" name="Textfeld 9">
+            <a:extLst>
+              <a:ext uri="{FF2B5EF4-FFF2-40B4-BE49-F238E27FC236}">
+                <a16:creationId xmlns:a16="http://schemas.microsoft.com/office/drawing/2014/main" id="{04BC82BF-6600-5D0A-C5EF-8861743E8622}"/>
+              </a:ext>
+            </a:extLst>
+          </p:cNvPr>
+          <p:cNvSpPr txBox="1"/>
+          <p:nvPr/>
+        </p:nvSpPr>
+        <p:spPr>
+          <a:xfrm>
+            <a:off x="7097360" y="5113158"/>
+            <a:ext cx="4170530" cy="417053"/>
+          </a:xfrm>
+          <a:prstGeom prst="rect">
+            <a:avLst/>
+          </a:prstGeom>
+          <a:solidFill>
+            <a:srgbClr val="000000">
+              <a:alpha val="50000"/>
+            </a:srgbClr>
+          </a:solidFill>
+          <a:ln>
+            <a:noFill/>
+          </a:ln>
+        </p:spPr>
+        <p:txBody>
+          <a:bodyPr wrap="square">
+            <a:noAutofit/>
+          </a:bodyPr>
+          <a:lstStyle/>
+          <a:p>
+            <a:pPr algn="ctr">
+              <a:spcAft>
+                <a:spcPts val="600"/>
+              </a:spcAft>
+            </a:pPr>
+            <a:r>
+              <a:rPr lang="de-DE" sz="1300">
+                <a:solidFill>
+                  <a:srgbClr val="FFFFFF"/>
+                </a:solidFill>
+                <a:hlinkClick r:id="rId3">
+                  <a:extLst>
+                    <a:ext uri="{A12FA001-AC4F-418D-AE19-62706E023703}">
+                      <ahyp:hlinkClr xmlns:ahyp="http://schemas.microsoft.com/office/drawing/2018/hyperlinkcolor" val="tx"/>
+                    </a:ext>
+                  </a:extLst>
+                </a:hlinkClick>
+              </a:rPr>
+              <a:t>stadt-land-fluss</a:t>
+            </a:r>
+            <a:endParaRPr lang="de-DE" sz="1300">
+              <a:solidFill>
+                <a:srgbClr val="FFFFFF"/>
+              </a:solidFill>
+            </a:endParaRPr>
+          </a:p>
+        </p:txBody>
+      </p:sp>
     </p:spTree>
     <p:extLst>
       <p:ext uri="{BB962C8B-B14F-4D97-AF65-F5344CB8AC3E}">
@@ -10018,7 +9001,7 @@
       </p:grpSpPr>
       <p:sp useBgFill="1">
         <p:nvSpPr>
-          <p:cNvPr id="20" name="Rectangle 22">
+          <p:cNvPr id="30" name="Rectangle 29">
             <a:extLst>
               <a:ext uri="{FF2B5EF4-FFF2-40B4-BE49-F238E27FC236}">
                 <a16:creationId xmlns:a16="http://schemas.microsoft.com/office/drawing/2014/main" id="{A8384FB5-9ADC-4DDC-881B-597D56F5B15D}"/>
@@ -10094,7 +9077,7 @@
       </p:sp>
       <p:sp>
         <p:nvSpPr>
-          <p:cNvPr id="21" name="Rectangle 24">
+          <p:cNvPr id="32" name="Rectangle 31">
             <a:extLst>
               <a:ext uri="{FF2B5EF4-FFF2-40B4-BE49-F238E27FC236}">
                 <a16:creationId xmlns:a16="http://schemas.microsoft.com/office/drawing/2014/main" id="{1199E1B1-A8C0-4FE8-A5A8-1CB41D69F857}"/>
@@ -10169,7 +9152,7 @@
       </p:sp>
       <p:sp>
         <p:nvSpPr>
-          <p:cNvPr id="24" name="Rectangle 26">
+          <p:cNvPr id="34" name="Rectangle 33">
             <a:extLst>
               <a:ext uri="{FF2B5EF4-FFF2-40B4-BE49-F238E27FC236}">
                 <a16:creationId xmlns:a16="http://schemas.microsoft.com/office/drawing/2014/main" id="{84A8DE83-DE75-4B41-9DB4-A7EC0B0DEC0B}"/>
@@ -10246,7 +9229,7 @@
       </p:sp>
       <p:sp>
         <p:nvSpPr>
-          <p:cNvPr id="26" name="Rectangle 28">
+          <p:cNvPr id="36" name="Rectangle 35">
             <a:extLst>
               <a:ext uri="{FF2B5EF4-FFF2-40B4-BE49-F238E27FC236}">
                 <a16:creationId xmlns:a16="http://schemas.microsoft.com/office/drawing/2014/main" id="{A7009A0A-BEF5-4EAC-AF15-E4F9F002E239}"/>
@@ -10324,7 +9307,7 @@
           <p:cNvPr id="2" name="Titel 1">
             <a:extLst>
               <a:ext uri="{FF2B5EF4-FFF2-40B4-BE49-F238E27FC236}">
-                <a16:creationId xmlns:a16="http://schemas.microsoft.com/office/drawing/2014/main" id="{48DF6141-78EB-EC20-2E28-140C34C2ADC3}"/>
+                <a16:creationId xmlns:a16="http://schemas.microsoft.com/office/drawing/2014/main" id="{130DB177-6AA1-7614-CC74-F42141AE8E93}"/>
               </a:ext>
             </a:extLst>
           </p:cNvPr>
@@ -10356,17 +9339,17 @@
                 <a:ea typeface="+mj-ea"/>
                 <a:cs typeface="+mj-cs"/>
               </a:rPr>
-              <a:t>Technologien</a:t>
+              <a:t>Clockify</a:t>
             </a:r>
           </a:p>
         </p:txBody>
       </p:sp>
       <p:pic>
         <p:nvPicPr>
-          <p:cNvPr id="7" name="Inhaltsplatzhalter 6" descr="Ein Bild, das Text, Screenshot, Schrift enthält.&#10;&#10;Automatisch generierte Beschreibung">
+          <p:cNvPr id="9" name="Inhaltsplatzhalter 8" descr="Ein Bild, das Baby, Menschliches Gesicht, Pony, Person enthält.&#10;&#10;Automatisch generierte Beschreibung">
             <a:extLst>
               <a:ext uri="{FF2B5EF4-FFF2-40B4-BE49-F238E27FC236}">
-                <a16:creationId xmlns:a16="http://schemas.microsoft.com/office/drawing/2014/main" id="{F1480E2A-AF53-0356-C859-20E30727ADCE}"/>
+                <a16:creationId xmlns:a16="http://schemas.microsoft.com/office/drawing/2014/main" id="{7852D209-7032-5E85-7580-74635263AA36}"/>
               </a:ext>
             </a:extLst>
           </p:cNvPr>
@@ -10378,25 +9361,120 @@
           </p:nvPr>
         </p:nvPicPr>
         <p:blipFill>
-          <a:blip r:embed="rId2"/>
+          <a:blip r:embed="rId3">
+            <a:extLst>
+              <a:ext uri="{837473B0-CC2E-450A-ABE3-18F120FF3D39}">
+                <a1611:picAttrSrcUrl xmlns:a1611="http://schemas.microsoft.com/office/drawing/2016/11/main" r:id="rId4"/>
+              </a:ext>
+            </a:extLst>
+          </a:blip>
           <a:stretch>
             <a:fillRect/>
           </a:stretch>
         </p:blipFill>
         <p:spPr>
           <a:xfrm>
-            <a:off x="432225" y="2861386"/>
-            <a:ext cx="11327549" cy="2661974"/>
+            <a:off x="432225" y="2139255"/>
+            <a:ext cx="11327549" cy="4106236"/>
           </a:xfrm>
           <a:prstGeom prst="rect">
             <a:avLst/>
           </a:prstGeom>
         </p:spPr>
       </p:pic>
+      <p:sp>
+        <p:nvSpPr>
+          <p:cNvPr id="10" name="Textfeld 9">
+            <a:extLst>
+              <a:ext uri="{FF2B5EF4-FFF2-40B4-BE49-F238E27FC236}">
+                <a16:creationId xmlns:a16="http://schemas.microsoft.com/office/drawing/2014/main" id="{4AEBE1FA-3905-F796-5E24-E35BD3B214F2}"/>
+              </a:ext>
+            </a:extLst>
+          </p:cNvPr>
+          <p:cNvSpPr txBox="1"/>
+          <p:nvPr/>
+        </p:nvSpPr>
+        <p:spPr>
+          <a:xfrm>
+            <a:off x="9235743" y="6870700"/>
+            <a:ext cx="2956257" cy="200055"/>
+          </a:xfrm>
+          <a:prstGeom prst="rect">
+            <a:avLst/>
+          </a:prstGeom>
+          <a:solidFill>
+            <a:srgbClr val="000000"/>
+          </a:solidFill>
+        </p:spPr>
+        <p:txBody>
+          <a:bodyPr wrap="none" rtlCol="0">
+            <a:spAutoFit/>
+          </a:bodyPr>
+          <a:lstStyle/>
+          <a:p>
+            <a:pPr algn="r">
+              <a:spcAft>
+                <a:spcPts val="600"/>
+              </a:spcAft>
+            </a:pPr>
+            <a:r>
+              <a:rPr lang="de-AT" sz="700">
+                <a:solidFill>
+                  <a:srgbClr val="FFFFFF"/>
+                </a:solidFill>
+              </a:rPr>
+              <a:t>"</a:t>
+            </a:r>
+            <a:r>
+              <a:rPr lang="de-AT" sz="700">
+                <a:solidFill>
+                  <a:srgbClr val="FFFFFF"/>
+                </a:solidFill>
+                <a:hlinkClick r:id="rId4" tooltip="https://downsindromearenmundua.blogspot.com/2011/01/el-educador-social-en-la-sociedad-de-la.html">
+                  <a:extLst>
+                    <a:ext uri="{A12FA001-AC4F-418D-AE19-62706E023703}">
+                      <ahyp:hlinkClr xmlns:ahyp="http://schemas.microsoft.com/office/drawing/2018/hyperlinkcolor" val="tx"/>
+                    </a:ext>
+                  </a:extLst>
+                </a:hlinkClick>
+              </a:rPr>
+              <a:t>Dieses Foto</a:t>
+            </a:r>
+            <a:r>
+              <a:rPr lang="de-AT" sz="700">
+                <a:solidFill>
+                  <a:srgbClr val="FFFFFF"/>
+                </a:solidFill>
+              </a:rPr>
+              <a:t>" von Unbekannter Autor ist lizenziert gemäß </a:t>
+            </a:r>
+            <a:r>
+              <a:rPr lang="de-AT" sz="700">
+                <a:solidFill>
+                  <a:srgbClr val="FFFFFF"/>
+                </a:solidFill>
+                <a:hlinkClick r:id="rId5" tooltip="https://creativecommons.org/licenses/by-nc-nd/3.0/">
+                  <a:extLst>
+                    <a:ext uri="{A12FA001-AC4F-418D-AE19-62706E023703}">
+                      <ahyp:hlinkClr xmlns:ahyp="http://schemas.microsoft.com/office/drawing/2018/hyperlinkcolor" val="tx"/>
+                    </a:ext>
+                  </a:extLst>
+                </a:hlinkClick>
+              </a:rPr>
+              <a:t>CC BY-NC-ND</a:t>
+            </a:r>
+            <a:endParaRPr lang="de-AT" sz="700">
+              <a:solidFill>
+                <a:srgbClr val="FFFFFF"/>
+              </a:solidFill>
+            </a:endParaRPr>
+          </a:p>
+        </p:txBody>
+      </p:sp>
     </p:spTree>
     <p:extLst>
       <p:ext uri="{BB962C8B-B14F-4D97-AF65-F5344CB8AC3E}">
-        <p14:creationId xmlns:p14="http://schemas.microsoft.com/office/powerpoint/2010/main" val="1842017856"/>
+        <p14:creationId xmlns:p14="http://schemas.microsoft.com/office/powerpoint/2010/main" val="2778858687"/>
       </p:ext>
     </p:extLst>
   </p:cSld>
@@ -10845,10 +9923,10 @@
       </p:sp>
       <p:pic>
         <p:nvPicPr>
-          <p:cNvPr id="4" name="Grafik 3">
+          <p:cNvPr id="5" name="Inhaltsplatzhalter 4" descr="Ein Bild, das Text, Schrift, Screenshot, Grafiken enthält.&#10;&#10;Automatisch generierte Beschreibung">
             <a:extLst>
               <a:ext uri="{FF2B5EF4-FFF2-40B4-BE49-F238E27FC236}">
-                <a16:creationId xmlns:a16="http://schemas.microsoft.com/office/drawing/2014/main" id="{B0D6BA97-3EF3-B59C-33C6-BDF1AD85E8EA}"/>
+                <a16:creationId xmlns:a16="http://schemas.microsoft.com/office/drawing/2014/main" id="{4AC05772-16C6-685C-689D-965C8920885D}"/>
               </a:ext>
             </a:extLst>
           </p:cNvPr>
@@ -10858,29 +9936,19 @@
           <p:nvPr/>
         </p:nvPicPr>
         <p:blipFill>
-          <a:blip r:embed="rId2">
-            <a:alphaModFix/>
-          </a:blip>
+          <a:blip r:embed="rId2"/>
           <a:stretch>
             <a:fillRect/>
           </a:stretch>
         </p:blipFill>
         <p:spPr>
           <a:xfrm>
-            <a:off x="3228814" y="465360"/>
-            <a:ext cx="5727700" cy="4330700"/>
+            <a:off x="1940256" y="830629"/>
+            <a:ext cx="8311487" cy="2359154"/>
           </a:xfrm>
           <a:prstGeom prst="rect">
             <a:avLst/>
           </a:prstGeom>
-          <a:solidFill>
-            <a:schemeClr val="tx1"/>
-          </a:solidFill>
-          <a:effectLst>
-            <a:outerShdw blurRad="50800" dist="50800" dir="5400000" sx="96000" sy="96000" algn="ctr" rotWithShape="0">
-              <a:schemeClr val="bg1"/>
-            </a:outerShdw>
-          </a:effectLst>
         </p:spPr>
       </p:pic>
     </p:spTree>
@@ -10923,10 +9991,10 @@
       </p:grpSpPr>
       <p:sp useBgFill="1">
         <p:nvSpPr>
-          <p:cNvPr id="31" name="Rectangle 30">
+          <p:cNvPr id="10" name="Rectangle 9">
             <a:extLst>
               <a:ext uri="{FF2B5EF4-FFF2-40B4-BE49-F238E27FC236}">
-                <a16:creationId xmlns:a16="http://schemas.microsoft.com/office/drawing/2014/main" id="{0E30439A-8A5B-46EC-8283-9B6B031D40D0}"/>
+                <a16:creationId xmlns:a16="http://schemas.microsoft.com/office/drawing/2014/main" id="{A8384FB5-9ADC-4DDC-881B-597D56F5B15D}"/>
               </a:ext>
               <a:ext uri="{C183D7F6-B498-43B3-948B-1728B52AA6E4}">
                 <adec:decorative xmlns:adec="http://schemas.microsoft.com/office/drawing/2017/decorative" val="1"/>
@@ -10999,10 +10067,10 @@
       </p:sp>
       <p:sp>
         <p:nvSpPr>
-          <p:cNvPr id="33" name="Rectangle 32">
+          <p:cNvPr id="12" name="Rectangle 11">
             <a:extLst>
               <a:ext uri="{FF2B5EF4-FFF2-40B4-BE49-F238E27FC236}">
-                <a16:creationId xmlns:a16="http://schemas.microsoft.com/office/drawing/2014/main" id="{5CEAD642-85CF-4750-8432-7C80C901F001}"/>
+                <a16:creationId xmlns:a16="http://schemas.microsoft.com/office/drawing/2014/main" id="{91E5A9A7-95C6-4F4F-B00E-C82E07FE62EF}"/>
               </a:ext>
               <a:ext uri="{C183D7F6-B498-43B3-948B-1728B52AA6E4}">
                 <adec:decorative xmlns:adec="http://schemas.microsoft.com/office/drawing/2017/decorative" val="1"/>
@@ -11021,9 +10089,9 @@
           </p:nvPr>
         </p:nvSpPr>
         <p:spPr>
-          <a:xfrm>
-            <a:off x="0" y="-427"/>
-            <a:ext cx="12192001" cy="6858000"/>
+          <a:xfrm rot="5400000" flipH="1">
+            <a:off x="-1417539" y="1417538"/>
+            <a:ext cx="6875818" cy="4040744"/>
           </a:xfrm>
           <a:prstGeom prst="rect">
             <a:avLst/>
@@ -11039,7 +10107,7 @@
                 </a:schemeClr>
               </a:gs>
             </a:gsLst>
-            <a:lin ang="15000000" scaled="0"/>
+            <a:lin ang="18600000" scaled="0"/>
           </a:gradFill>
           <a:ln>
             <a:noFill/>
@@ -11066,16 +10134,16 @@
           <a:lstStyle/>
           <a:p>
             <a:pPr algn="ctr"/>
-            <a:endParaRPr lang="en-US"/>
+            <a:endParaRPr lang="en-US" dirty="0"/>
           </a:p>
         </p:txBody>
       </p:sp>
       <p:sp>
         <p:nvSpPr>
-          <p:cNvPr id="35" name="Rectangle 34">
+          <p:cNvPr id="14" name="Rectangle 13">
             <a:extLst>
               <a:ext uri="{FF2B5EF4-FFF2-40B4-BE49-F238E27FC236}">
-                <a16:creationId xmlns:a16="http://schemas.microsoft.com/office/drawing/2014/main" id="{FA33EEAE-15D5-4119-8C1E-89D943F911EF}"/>
+                <a16:creationId xmlns:a16="http://schemas.microsoft.com/office/drawing/2014/main" id="{D07DD2DE-F619-49DD-B5E7-03A290FF4ED1}"/>
               </a:ext>
               <a:ext uri="{C183D7F6-B498-43B3-948B-1728B52AA6E4}">
                 <adec:decorative xmlns:adec="http://schemas.microsoft.com/office/drawing/2017/decorative" val="1"/>
@@ -11094,28 +10162,28 @@
           </p:nvPr>
         </p:nvSpPr>
         <p:spPr>
-          <a:xfrm rot="10800000" flipH="1">
-            <a:off x="455521" y="-1720"/>
-            <a:ext cx="11750040" cy="6840685"/>
+          <a:xfrm rot="16200000">
+            <a:off x="-158495" y="2660473"/>
+            <a:ext cx="4355594" cy="4038603"/>
           </a:xfrm>
           <a:prstGeom prst="rect">
             <a:avLst/>
           </a:prstGeom>
           <a:gradFill>
             <a:gsLst>
-              <a:gs pos="21000">
+              <a:gs pos="0">
                 <a:schemeClr val="accent1">
-                  <a:lumMod val="50000"/>
-                  <a:alpha val="61000"/>
+                  <a:alpha val="50000"/>
                 </a:schemeClr>
               </a:gs>
               <a:gs pos="100000">
                 <a:schemeClr val="accent1">
+                  <a:lumMod val="50000"/>
                   <a:alpha val="0"/>
                 </a:schemeClr>
               </a:gs>
             </a:gsLst>
-            <a:lin ang="21594000" scaled="0"/>
+            <a:lin ang="11400000" scaled="0"/>
           </a:gradFill>
           <a:ln>
             <a:noFill/>
@@ -11148,10 +10216,10 @@
       </p:sp>
       <p:sp>
         <p:nvSpPr>
-          <p:cNvPr id="37" name="Rectangle 36">
+          <p:cNvPr id="16" name="Rectangle 15">
             <a:extLst>
               <a:ext uri="{FF2B5EF4-FFF2-40B4-BE49-F238E27FC236}">
-                <a16:creationId xmlns:a16="http://schemas.microsoft.com/office/drawing/2014/main" id="{730D8B3B-9B80-4025-B934-26DC7D7CD231}"/>
+                <a16:creationId xmlns:a16="http://schemas.microsoft.com/office/drawing/2014/main" id="{85149191-5F60-4A28-AAFF-039F96B0F3EC}"/>
               </a:ext>
               <a:ext uri="{C183D7F6-B498-43B3-948B-1728B52AA6E4}">
                 <adec:decorative xmlns:adec="http://schemas.microsoft.com/office/drawing/2017/decorative" val="1"/>
@@ -11170,9 +10238,9 @@
           </p:nvPr>
         </p:nvSpPr>
         <p:spPr>
-          <a:xfrm>
-            <a:off x="8606054" y="-1291"/>
-            <a:ext cx="3608179" cy="6858864"/>
+          <a:xfrm rot="16200000" flipH="1">
+            <a:off x="-1180882" y="1638085"/>
+            <a:ext cx="6857572" cy="3581401"/>
           </a:xfrm>
           <a:prstGeom prst="rect">
             <a:avLst/>
@@ -11180,18 +10248,17 @@
           <a:gradFill>
             <a:gsLst>
               <a:gs pos="0">
+                <a:srgbClr val="000000">
+                  <a:alpha val="59000"/>
+                </a:srgbClr>
+              </a:gs>
+              <a:gs pos="69000">
                 <a:schemeClr val="accent1">
-                  <a:lumMod val="75000"/>
                   <a:alpha val="0"/>
                 </a:schemeClr>
               </a:gs>
-              <a:gs pos="99000">
-                <a:srgbClr val="000000">
-                  <a:alpha val="41000"/>
-                </a:srgbClr>
-              </a:gs>
             </a:gsLst>
-            <a:lin ang="16200000" scaled="0"/>
+            <a:lin ang="13200000" scaled="0"/>
           </a:gradFill>
           <a:ln>
             <a:noFill/>
@@ -11218,16 +10285,16 @@
           <a:lstStyle/>
           <a:p>
             <a:pPr algn="ctr"/>
-            <a:endParaRPr lang="en-US"/>
+            <a:endParaRPr lang="en-US" dirty="0"/>
           </a:p>
         </p:txBody>
       </p:sp>
       <p:sp>
         <p:nvSpPr>
-          <p:cNvPr id="39" name="Oval 38">
+          <p:cNvPr id="18" name="Freeform: Shape 17">
             <a:extLst>
               <a:ext uri="{FF2B5EF4-FFF2-40B4-BE49-F238E27FC236}">
-                <a16:creationId xmlns:a16="http://schemas.microsoft.com/office/drawing/2014/main" id="{B5A1B09C-1565-46F8-B70F-621C5EB48A09}"/>
+                <a16:creationId xmlns:a16="http://schemas.microsoft.com/office/drawing/2014/main" id="{F8260ED5-17F7-4158-B241-D51DD4CF1B7E}"/>
               </a:ext>
               <a:ext uri="{C183D7F6-B498-43B3-948B-1728B52AA6E4}">
                 <adec:decorative xmlns:adec="http://schemas.microsoft.com/office/drawing/2017/decorative" val="1"/>
@@ -11246,29 +10313,123 @@
           </p:nvPr>
         </p:nvSpPr>
         <p:spPr>
-          <a:xfrm rot="15274173">
-            <a:off x="6059728" y="779270"/>
-            <a:ext cx="4967533" cy="4988390"/>
+          <a:xfrm rot="6097846">
+            <a:off x="-747355" y="1201312"/>
+            <a:ext cx="4808302" cy="4088666"/>
           </a:xfrm>
-          <a:prstGeom prst="ellipse">
+          <a:custGeom>
             <a:avLst/>
-          </a:prstGeom>
+            <a:gdLst>
+              <a:gd name="connsiteX0" fmla="*/ 48844 w 4808302"/>
+              <a:gd name="connsiteY0" fmla="*/ 2888671 h 4088666"/>
+              <a:gd name="connsiteX1" fmla="*/ 0 w 4808302"/>
+              <a:gd name="connsiteY1" fmla="*/ 2404151 h 4088666"/>
+              <a:gd name="connsiteX2" fmla="*/ 2404151 w 4808302"/>
+              <a:gd name="connsiteY2" fmla="*/ 0 h 4088666"/>
+              <a:gd name="connsiteX3" fmla="*/ 4808302 w 4808302"/>
+              <a:gd name="connsiteY3" fmla="*/ 2404151 h 4088666"/>
+              <a:gd name="connsiteX4" fmla="*/ 4700216 w 4808302"/>
+              <a:gd name="connsiteY4" fmla="*/ 3119072 h 4088666"/>
+              <a:gd name="connsiteX5" fmla="*/ 4643143 w 4808302"/>
+              <a:gd name="connsiteY5" fmla="*/ 3275009 h 4088666"/>
+              <a:gd name="connsiteX6" fmla="*/ 690093 w 4808302"/>
+              <a:gd name="connsiteY6" fmla="*/ 4088666 h 4088666"/>
+              <a:gd name="connsiteX7" fmla="*/ 548991 w 4808302"/>
+              <a:gd name="connsiteY7" fmla="*/ 3933414 h 4088666"/>
+              <a:gd name="connsiteX8" fmla="*/ 48844 w 4808302"/>
+              <a:gd name="connsiteY8" fmla="*/ 2888671 h 4088666"/>
+            </a:gdLst>
+            <a:ahLst/>
+            <a:cxnLst>
+              <a:cxn ang="0">
+                <a:pos x="connsiteX0" y="connsiteY0"/>
+              </a:cxn>
+              <a:cxn ang="0">
+                <a:pos x="connsiteX1" y="connsiteY1"/>
+              </a:cxn>
+              <a:cxn ang="0">
+                <a:pos x="connsiteX2" y="connsiteY2"/>
+              </a:cxn>
+              <a:cxn ang="0">
+                <a:pos x="connsiteX3" y="connsiteY3"/>
+              </a:cxn>
+              <a:cxn ang="0">
+                <a:pos x="connsiteX4" y="connsiteY4"/>
+              </a:cxn>
+              <a:cxn ang="0">
+                <a:pos x="connsiteX5" y="connsiteY5"/>
+              </a:cxn>
+              <a:cxn ang="0">
+                <a:pos x="connsiteX6" y="connsiteY6"/>
+              </a:cxn>
+              <a:cxn ang="0">
+                <a:pos x="connsiteX7" y="connsiteY7"/>
+              </a:cxn>
+              <a:cxn ang="0">
+                <a:pos x="connsiteX8" y="connsiteY8"/>
+              </a:cxn>
+            </a:cxnLst>
+            <a:rect l="l" t="t" r="r" b="b"/>
+            <a:pathLst>
+              <a:path w="4808302" h="4088666">
+                <a:moveTo>
+                  <a:pt x="48844" y="2888671"/>
+                </a:moveTo>
+                <a:cubicBezTo>
+                  <a:pt x="16818" y="2732167"/>
+                  <a:pt x="0" y="2570123"/>
+                  <a:pt x="0" y="2404151"/>
+                </a:cubicBezTo>
+                <a:cubicBezTo>
+                  <a:pt x="0" y="1076375"/>
+                  <a:pt x="1076375" y="0"/>
+                  <a:pt x="2404151" y="0"/>
+                </a:cubicBezTo>
+                <a:cubicBezTo>
+                  <a:pt x="3731927" y="0"/>
+                  <a:pt x="4808302" y="1076375"/>
+                  <a:pt x="4808302" y="2404151"/>
+                </a:cubicBezTo>
+                <a:cubicBezTo>
+                  <a:pt x="4808302" y="2653109"/>
+                  <a:pt x="4770461" y="2893229"/>
+                  <a:pt x="4700216" y="3119072"/>
+                </a:cubicBezTo>
+                <a:lnTo>
+                  <a:pt x="4643143" y="3275009"/>
+                </a:lnTo>
+                <a:lnTo>
+                  <a:pt x="690093" y="4088666"/>
+                </a:lnTo>
+                <a:lnTo>
+                  <a:pt x="548991" y="3933414"/>
+                </a:lnTo>
+                <a:cubicBezTo>
+                  <a:pt x="304015" y="3636572"/>
+                  <a:pt x="128908" y="3279932"/>
+                  <a:pt x="48844" y="2888671"/>
+                </a:cubicBezTo>
+                <a:close/>
+              </a:path>
+            </a:pathLst>
+          </a:custGeom>
           <a:gradFill>
             <a:gsLst>
-              <a:gs pos="0">
-                <a:schemeClr val="accent1">
-                  <a:alpha val="24000"/>
-                </a:schemeClr>
-              </a:gs>
-              <a:gs pos="79000">
+              <a:gs pos="39000">
                 <a:schemeClr val="accent1">
                   <a:lumMod val="60000"/>
                   <a:lumOff val="40000"/>
                   <a:alpha val="0"/>
                 </a:schemeClr>
               </a:gs>
+              <a:gs pos="100000">
+                <a:schemeClr val="accent1">
+                  <a:lumMod val="75000"/>
+                  <a:alpha val="26000"/>
+                </a:schemeClr>
+              </a:gs>
             </a:gsLst>
-            <a:lin ang="14400000" scaled="0"/>
+            <a:lin ang="18600000" scaled="0"/>
           </a:gradFill>
           <a:ln>
             <a:noFill/>
@@ -11291,7 +10452,9 @@
           </a:fontRef>
         </p:style>
         <p:txBody>
-          <a:bodyPr rtlCol="0" anchor="ctr"/>
+          <a:bodyPr wrap="square" rtlCol="0" anchor="ctr">
+            <a:noAutofit/>
+          </a:bodyPr>
           <a:lstStyle/>
           <a:p>
             <a:pPr algn="ctr"/>
@@ -11304,7 +10467,7 @@
           <p:cNvPr id="2" name="Titel 1">
             <a:extLst>
               <a:ext uri="{FF2B5EF4-FFF2-40B4-BE49-F238E27FC236}">
-                <a16:creationId xmlns:a16="http://schemas.microsoft.com/office/drawing/2014/main" id="{130DB177-6AA1-7614-CC74-F42141AE8E93}"/>
+                <a16:creationId xmlns:a16="http://schemas.microsoft.com/office/drawing/2014/main" id="{48DF6141-78EB-EC20-2E28-140C34C2ADC3}"/>
               </a:ext>
             </a:extLst>
           </p:cNvPr>
@@ -11317,19 +10480,18 @@
         </p:nvSpPr>
         <p:spPr>
           <a:xfrm>
-            <a:off x="1386865" y="818984"/>
-            <a:ext cx="6596245" cy="3268520"/>
+            <a:off x="660041" y="2767106"/>
+            <a:ext cx="2880828" cy="3071906"/>
           </a:xfrm>
         </p:spPr>
         <p:txBody>
-          <a:bodyPr vert="horz" lIns="91440" tIns="45720" rIns="91440" bIns="45720" rtlCol="0" anchor="b">
+          <a:bodyPr vert="horz" lIns="91440" tIns="45720" rIns="91440" bIns="45720" rtlCol="0" anchor="t">
             <a:normAutofit/>
           </a:bodyPr>
           <a:lstStyle/>
           <a:p>
-            <a:pPr algn="r"/>
             <a:r>
-              <a:rPr lang="en-US" sz="4800" kern="1200" dirty="0" err="1">
+              <a:rPr lang="en-US" sz="3700" kern="1200">
                 <a:solidFill>
                   <a:srgbClr val="FFFFFF"/>
                 </a:solidFill>
@@ -11337,175 +10499,53 @@
                 <a:ea typeface="+mj-ea"/>
                 <a:cs typeface="+mj-cs"/>
               </a:rPr>
-              <a:t>Clockify</a:t>
+              <a:t>Technologien</a:t>
             </a:r>
-            <a:endParaRPr lang="en-US" sz="4800" kern="1200" dirty="0">
-              <a:solidFill>
-                <a:srgbClr val="FFFFFF"/>
-              </a:solidFill>
-              <a:latin typeface="+mj-lt"/>
-              <a:ea typeface="+mj-ea"/>
-              <a:cs typeface="+mj-cs"/>
-            </a:endParaRPr>
-          </a:p>
-        </p:txBody>
-      </p:sp>
-      <p:sp>
-        <p:nvSpPr>
-          <p:cNvPr id="41" name="Rectangle 40">
+          </a:p>
+        </p:txBody>
+      </p:sp>
+      <p:pic>
+        <p:nvPicPr>
+          <p:cNvPr id="5" name="Inhaltsplatzhalter 4" descr="Ein Bild, das Menschliches Gesicht, draußen, Person, Mensch enthält.&#10;&#10;Automatisch generierte Beschreibung">
             <a:extLst>
               <a:ext uri="{FF2B5EF4-FFF2-40B4-BE49-F238E27FC236}">
-                <a16:creationId xmlns:a16="http://schemas.microsoft.com/office/drawing/2014/main" id="{8C516CC8-80AC-446C-A56E-9F54B7210402}"/>
-              </a:ext>
-              <a:ext uri="{C183D7F6-B498-43B3-948B-1728B52AA6E4}">
-                <adec:decorative xmlns:adec="http://schemas.microsoft.com/office/drawing/2017/decorative" val="1"/>
+                <a16:creationId xmlns:a16="http://schemas.microsoft.com/office/drawing/2014/main" id="{DD2A62F2-1783-3A56-90F7-BB257B483076}"/>
               </a:ext>
             </a:extLst>
           </p:cNvPr>
-          <p:cNvSpPr>
-            <a:spLocks noGrp="1" noRot="1" noChangeAspect="1" noMove="1" noResize="1" noEditPoints="1" noAdjustHandles="1" noChangeArrowheads="1" noChangeShapeType="1" noTextEdit="1"/>
-          </p:cNvSpPr>
+          <p:cNvPicPr>
+            <a:picLocks noGrp="1" noChangeAspect="1"/>
+          </p:cNvPicPr>
           <p:nvPr>
-            <p:extLst>
-              <p:ext uri="{386F3935-93C4-4BCD-93E2-E3B085C9AB24}">
-                <p16:designElem xmlns:p16="http://schemas.microsoft.com/office/powerpoint/2015/main" val="1"/>
-              </p:ext>
-            </p:extLst>
+            <p:ph idx="1"/>
           </p:nvPr>
-        </p:nvSpPr>
+        </p:nvPicPr>
+        <p:blipFill>
+          <a:blip r:embed="rId2">
+            <a:extLst>
+              <a:ext uri="{837473B0-CC2E-450A-ABE3-18F120FF3D39}">
+                <a1611:picAttrSrcUrl xmlns:a1611="http://schemas.microsoft.com/office/drawing/2016/11/main" r:id="rId3"/>
+              </a:ext>
+            </a:extLst>
+          </a:blip>
+          <a:stretch>
+            <a:fillRect/>
+          </a:stretch>
+        </p:blipFill>
         <p:spPr>
-          <a:xfrm rot="10800000" flipH="1">
-            <a:off x="6314" y="4480038"/>
-            <a:ext cx="12179371" cy="2377962"/>
+          <a:xfrm>
+            <a:off x="4502428" y="1017407"/>
+            <a:ext cx="7225748" cy="4823186"/>
           </a:xfrm>
           <a:prstGeom prst="rect">
             <a:avLst/>
           </a:prstGeom>
-          <a:gradFill>
-            <a:gsLst>
-              <a:gs pos="0">
-                <a:schemeClr val="accent1">
-                  <a:lumMod val="75000"/>
-                  <a:alpha val="50000"/>
-                </a:schemeClr>
-              </a:gs>
-              <a:gs pos="99000">
-                <a:srgbClr val="000000">
-                  <a:alpha val="34000"/>
-                </a:srgbClr>
-              </a:gs>
-            </a:gsLst>
-            <a:lin ang="17400000" scaled="0"/>
-          </a:gradFill>
-          <a:ln>
-            <a:noFill/>
-          </a:ln>
         </p:spPr>
-        <p:style>
-          <a:lnRef idx="2">
-            <a:schemeClr val="accent1">
-              <a:shade val="50000"/>
-            </a:schemeClr>
-          </a:lnRef>
-          <a:fillRef idx="1">
-            <a:schemeClr val="accent1"/>
-          </a:fillRef>
-          <a:effectRef idx="0">
-            <a:schemeClr val="accent1"/>
-          </a:effectRef>
-          <a:fontRef idx="minor">
-            <a:schemeClr val="lt1"/>
-          </a:fontRef>
-        </p:style>
-        <p:txBody>
-          <a:bodyPr rtlCol="0" anchor="ctr"/>
-          <a:lstStyle/>
-          <a:p>
-            <a:pPr algn="ctr"/>
-            <a:endParaRPr lang="en-US"/>
-          </a:p>
-        </p:txBody>
-      </p:sp>
-      <p:sp>
-        <p:nvSpPr>
-          <p:cNvPr id="43" name="Rectangle 42">
-            <a:extLst>
-              <a:ext uri="{FF2B5EF4-FFF2-40B4-BE49-F238E27FC236}">
-                <a16:creationId xmlns:a16="http://schemas.microsoft.com/office/drawing/2014/main" id="{53947E58-F088-49F1-A3D1-DEA690192E84}"/>
-              </a:ext>
-              <a:ext uri="{C183D7F6-B498-43B3-948B-1728B52AA6E4}">
-                <adec:decorative xmlns:adec="http://schemas.microsoft.com/office/drawing/2017/decorative" val="1"/>
-              </a:ext>
-            </a:extLst>
-          </p:cNvPr>
-          <p:cNvSpPr>
-            <a:spLocks noGrp="1" noRot="1" noChangeAspect="1" noMove="1" noResize="1" noEditPoints="1" noAdjustHandles="1" noChangeArrowheads="1" noChangeShapeType="1" noTextEdit="1"/>
-          </p:cNvSpPr>
-          <p:nvPr>
-            <p:extLst>
-              <p:ext uri="{386F3935-93C4-4BCD-93E2-E3B085C9AB24}">
-                <p16:designElem xmlns:p16="http://schemas.microsoft.com/office/powerpoint/2015/main" val="1"/>
-              </p:ext>
-            </p:extLst>
-          </p:nvPr>
-        </p:nvSpPr>
-        <p:spPr>
-          <a:xfrm rot="16200000" flipH="1">
-            <a:off x="6967085" y="1632660"/>
-            <a:ext cx="6857572" cy="3592258"/>
-          </a:xfrm>
-          <a:prstGeom prst="rect">
-            <a:avLst/>
-          </a:prstGeom>
-          <a:gradFill>
-            <a:gsLst>
-              <a:gs pos="0">
-                <a:schemeClr val="accent1">
-                  <a:lumMod val="75000"/>
-                  <a:alpha val="50000"/>
-                </a:schemeClr>
-              </a:gs>
-              <a:gs pos="99000">
-                <a:srgbClr val="000000">
-                  <a:alpha val="0"/>
-                </a:srgbClr>
-              </a:gs>
-            </a:gsLst>
-            <a:lin ang="15600000" scaled="0"/>
-          </a:gradFill>
-          <a:ln>
-            <a:noFill/>
-          </a:ln>
-        </p:spPr>
-        <p:style>
-          <a:lnRef idx="2">
-            <a:schemeClr val="accent1">
-              <a:shade val="50000"/>
-            </a:schemeClr>
-          </a:lnRef>
-          <a:fillRef idx="1">
-            <a:schemeClr val="accent1"/>
-          </a:fillRef>
-          <a:effectRef idx="0">
-            <a:schemeClr val="accent1"/>
-          </a:effectRef>
-          <a:fontRef idx="minor">
-            <a:schemeClr val="lt1"/>
-          </a:fontRef>
-        </p:style>
-        <p:txBody>
-          <a:bodyPr rtlCol="0" anchor="ctr"/>
-          <a:lstStyle/>
-          <a:p>
-            <a:pPr algn="ctr"/>
-            <a:endParaRPr lang="en-US"/>
-          </a:p>
-        </p:txBody>
-      </p:sp>
+      </p:pic>
     </p:spTree>
     <p:extLst>
       <p:ext uri="{BB962C8B-B14F-4D97-AF65-F5344CB8AC3E}">
-        <p14:creationId xmlns:p14="http://schemas.microsoft.com/office/powerpoint/2010/main" val="2778858687"/>
+        <p14:creationId xmlns:p14="http://schemas.microsoft.com/office/powerpoint/2010/main" val="1842017856"/>
       </p:ext>
     </p:extLst>
   </p:cSld>
@@ -11869,7 +10909,7 @@
           <a:lstStyle/>
           <a:p>
             <a:r>
-              <a:rPr lang="en-US" sz="4800" kern="1200" dirty="0">
+              <a:rPr lang="en-US" sz="4800" kern="1200">
                 <a:solidFill>
                   <a:srgbClr val="FFFFFF"/>
                 </a:solidFill>
@@ -12388,321 +11428,6 @@
 </a:theme>
 </file>
 
-<file path=ppt/theme/theme2.xml><?xml version="1.0" encoding="utf-8"?>
-<a:theme xmlns:a="http://schemas.openxmlformats.org/drawingml/2006/main" name="Office">
-  <a:themeElements>
-    <a:clrScheme name="Office">
-      <a:dk1>
-        <a:sysClr val="windowText" lastClr="000000"/>
-      </a:dk1>
-      <a:lt1>
-        <a:sysClr val="window" lastClr="FFFFFF"/>
-      </a:lt1>
-      <a:dk2>
-        <a:srgbClr val="0E2841"/>
-      </a:dk2>
-      <a:lt2>
-        <a:srgbClr val="E8E8E8"/>
-      </a:lt2>
-      <a:accent1>
-        <a:srgbClr val="156082"/>
-      </a:accent1>
-      <a:accent2>
-        <a:srgbClr val="E97132"/>
-      </a:accent2>
-      <a:accent3>
-        <a:srgbClr val="196B24"/>
-      </a:accent3>
-      <a:accent4>
-        <a:srgbClr val="0F9ED5"/>
-      </a:accent4>
-      <a:accent5>
-        <a:srgbClr val="A02B93"/>
-      </a:accent5>
-      <a:accent6>
-        <a:srgbClr val="4EA72E"/>
-      </a:accent6>
-      <a:hlink>
-        <a:srgbClr val="467886"/>
-      </a:hlink>
-      <a:folHlink>
-        <a:srgbClr val="96607D"/>
-      </a:folHlink>
-    </a:clrScheme>
-    <a:fontScheme name="Office">
-      <a:majorFont>
-        <a:latin typeface="Aptos Display" panose="02110004020202020204"/>
-        <a:ea typeface=""/>
-        <a:cs typeface=""/>
-        <a:font script="Jpan" typeface="游ゴシック Light"/>
-        <a:font script="Hang" typeface="맑은 고딕"/>
-        <a:font script="Hans" typeface="等线 Light"/>
-        <a:font script="Hant" typeface="新細明體"/>
-        <a:font script="Arab" typeface="Times New Roman"/>
-        <a:font script="Hebr" typeface="Times New Roman"/>
-        <a:font script="Thai" typeface="Angsana New"/>
-        <a:font script="Ethi" typeface="Nyala"/>
-        <a:font script="Beng" typeface="Vrinda"/>
-        <a:font script="Gujr" typeface="Shruti"/>
-        <a:font script="Khmr" typeface="MoolBoran"/>
-        <a:font script="Knda" typeface="Tunga"/>
-        <a:font script="Guru" typeface="Raavi"/>
-        <a:font script="Cans" typeface="Euphemia"/>
-        <a:font script="Cher" typeface="Plantagenet Cherokee"/>
-        <a:font script="Yiii" typeface="Microsoft Yi Baiti"/>
-        <a:font script="Tibt" typeface="Microsoft Himalaya"/>
-        <a:font script="Thaa" typeface="MV Boli"/>
-        <a:font script="Deva" typeface="Mangal"/>
-        <a:font script="Telu" typeface="Gautami"/>
-        <a:font script="Taml" typeface="Latha"/>
-        <a:font script="Syrc" typeface="Estrangelo Edessa"/>
-        <a:font script="Orya" typeface="Kalinga"/>
-        <a:font script="Mlym" typeface="Kartika"/>
-        <a:font script="Laoo" typeface="DokChampa"/>
-        <a:font script="Sinh" typeface="Iskoola Pota"/>
-        <a:font script="Mong" typeface="Mongolian Baiti"/>
-        <a:font script="Viet" typeface="Times New Roman"/>
-        <a:font script="Uigh" typeface="Microsoft Uighur"/>
-        <a:font script="Geor" typeface="Sylfaen"/>
-        <a:font script="Armn" typeface="Arial"/>
-        <a:font script="Bugi" typeface="Leelawadee UI"/>
-        <a:font script="Bopo" typeface="Microsoft JhengHei"/>
-        <a:font script="Java" typeface="Javanese Text"/>
-        <a:font script="Lisu" typeface="Segoe UI"/>
-        <a:font script="Mymr" typeface="Myanmar Text"/>
-        <a:font script="Nkoo" typeface="Ebrima"/>
-        <a:font script="Olck" typeface="Nirmala UI"/>
-        <a:font script="Osma" typeface="Ebrima"/>
-        <a:font script="Phag" typeface="Phagspa"/>
-        <a:font script="Syrn" typeface="Estrangelo Edessa"/>
-        <a:font script="Syrj" typeface="Estrangelo Edessa"/>
-        <a:font script="Syre" typeface="Estrangelo Edessa"/>
-        <a:font script="Sora" typeface="Nirmala UI"/>
-        <a:font script="Tale" typeface="Microsoft Tai Le"/>
-        <a:font script="Talu" typeface="Microsoft New Tai Lue"/>
-        <a:font script="Tfng" typeface="Ebrima"/>
-      </a:majorFont>
-      <a:minorFont>
-        <a:latin typeface="Aptos" panose="02110004020202020204"/>
-        <a:ea typeface=""/>
-        <a:cs typeface=""/>
-        <a:font script="Jpan" typeface="游ゴシック"/>
-        <a:font script="Hang" typeface="맑은 고딕"/>
-        <a:font script="Hans" typeface="等线"/>
-        <a:font script="Hant" typeface="新細明體"/>
-        <a:font script="Arab" typeface="Arial"/>
-        <a:font script="Hebr" typeface="Arial"/>
-        <a:font script="Thai" typeface="Cordia New"/>
-        <a:font script="Ethi" typeface="Nyala"/>
-        <a:font script="Beng" typeface="Vrinda"/>
-        <a:font script="Gujr" typeface="Shruti"/>
-        <a:font script="Khmr" typeface="DaunPenh"/>
-        <a:font script="Knda" typeface="Tunga"/>
-        <a:font script="Guru" typeface="Raavi"/>
-        <a:font script="Cans" typeface="Euphemia"/>
-        <a:font script="Cher" typeface="Plantagenet Cherokee"/>
-        <a:font script="Yiii" typeface="Microsoft Yi Baiti"/>
-        <a:font script="Tibt" typeface="Microsoft Himalaya"/>
-        <a:font script="Thaa" typeface="MV Boli"/>
-        <a:font script="Deva" typeface="Mangal"/>
-        <a:font script="Telu" typeface="Gautami"/>
-        <a:font script="Taml" typeface="Latha"/>
-        <a:font script="Syrc" typeface="Estrangelo Edessa"/>
-        <a:font script="Orya" typeface="Kalinga"/>
-        <a:font script="Mlym" typeface="Kartika"/>
-        <a:font script="Laoo" typeface="DokChampa"/>
-        <a:font script="Sinh" typeface="Iskoola Pota"/>
-        <a:font script="Mong" typeface="Mongolian Baiti"/>
-        <a:font script="Viet" typeface="Arial"/>
-        <a:font script="Uigh" typeface="Microsoft Uighur"/>
-        <a:font script="Geor" typeface="Sylfaen"/>
-        <a:font script="Armn" typeface="Arial"/>
-        <a:font script="Bugi" typeface="Leelawadee UI"/>
-        <a:font script="Bopo" typeface="Microsoft JhengHei"/>
-        <a:font script="Java" typeface="Javanese Text"/>
-        <a:font script="Lisu" typeface="Segoe UI"/>
-        <a:font script="Mymr" typeface="Myanmar Text"/>
-        <a:font script="Nkoo" typeface="Ebrima"/>
-        <a:font script="Olck" typeface="Nirmala UI"/>
-        <a:font script="Osma" typeface="Ebrima"/>
-        <a:font script="Phag" typeface="Phagspa"/>
-        <a:font script="Syrn" typeface="Estrangelo Edessa"/>
-        <a:font script="Syrj" typeface="Estrangelo Edessa"/>
-        <a:font script="Syre" typeface="Estrangelo Edessa"/>
-        <a:font script="Sora" typeface="Nirmala UI"/>
-        <a:font script="Tale" typeface="Microsoft Tai Le"/>
-        <a:font script="Talu" typeface="Microsoft New Tai Lue"/>
-        <a:font script="Tfng" typeface="Ebrima"/>
-      </a:minorFont>
-    </a:fontScheme>
-    <a:fmtScheme name="Office">
-      <a:fillStyleLst>
-        <a:solidFill>
-          <a:schemeClr val="phClr"/>
-        </a:solidFill>
-        <a:gradFill rotWithShape="1">
-          <a:gsLst>
-            <a:gs pos="0">
-              <a:schemeClr val="phClr">
-                <a:lumMod val="110000"/>
-                <a:satMod val="105000"/>
-                <a:tint val="67000"/>
-              </a:schemeClr>
-            </a:gs>
-            <a:gs pos="50000">
-              <a:schemeClr val="phClr">
-                <a:lumMod val="105000"/>
-                <a:satMod val="103000"/>
-                <a:tint val="73000"/>
-              </a:schemeClr>
-            </a:gs>
-            <a:gs pos="100000">
-              <a:schemeClr val="phClr">
-                <a:lumMod val="105000"/>
-                <a:satMod val="109000"/>
-                <a:tint val="81000"/>
-              </a:schemeClr>
-            </a:gs>
-          </a:gsLst>
-          <a:lin ang="5400000" scaled="0"/>
-        </a:gradFill>
-        <a:gradFill rotWithShape="1">
-          <a:gsLst>
-            <a:gs pos="0">
-              <a:schemeClr val="phClr">
-                <a:satMod val="103000"/>
-                <a:lumMod val="102000"/>
-                <a:tint val="94000"/>
-              </a:schemeClr>
-            </a:gs>
-            <a:gs pos="50000">
-              <a:schemeClr val="phClr">
-                <a:satMod val="110000"/>
-                <a:lumMod val="100000"/>
-                <a:shade val="100000"/>
-              </a:schemeClr>
-            </a:gs>
-            <a:gs pos="100000">
-              <a:schemeClr val="phClr">
-                <a:lumMod val="99000"/>
-                <a:satMod val="120000"/>
-                <a:shade val="78000"/>
-              </a:schemeClr>
-            </a:gs>
-          </a:gsLst>
-          <a:lin ang="5400000" scaled="0"/>
-        </a:gradFill>
-      </a:fillStyleLst>
-      <a:lnStyleLst>
-        <a:ln w="12700" cap="flat" cmpd="sng" algn="ctr">
-          <a:solidFill>
-            <a:schemeClr val="phClr"/>
-          </a:solidFill>
-          <a:prstDash val="solid"/>
-          <a:miter lim="800000"/>
-        </a:ln>
-        <a:ln w="19050" cap="flat" cmpd="sng" algn="ctr">
-          <a:solidFill>
-            <a:schemeClr val="phClr"/>
-          </a:solidFill>
-          <a:prstDash val="solid"/>
-          <a:miter lim="800000"/>
-        </a:ln>
-        <a:ln w="25400" cap="flat" cmpd="sng" algn="ctr">
-          <a:solidFill>
-            <a:schemeClr val="phClr"/>
-          </a:solidFill>
-          <a:prstDash val="solid"/>
-          <a:miter lim="800000"/>
-        </a:ln>
-      </a:lnStyleLst>
-      <a:effectStyleLst>
-        <a:effectStyle>
-          <a:effectLst/>
-        </a:effectStyle>
-        <a:effectStyle>
-          <a:effectLst/>
-        </a:effectStyle>
-        <a:effectStyle>
-          <a:effectLst>
-            <a:outerShdw blurRad="57150" dist="19050" dir="5400000" algn="ctr" rotWithShape="0">
-              <a:srgbClr val="000000">
-                <a:alpha val="63000"/>
-              </a:srgbClr>
-            </a:outerShdw>
-          </a:effectLst>
-        </a:effectStyle>
-      </a:effectStyleLst>
-      <a:bgFillStyleLst>
-        <a:solidFill>
-          <a:schemeClr val="phClr"/>
-        </a:solidFill>
-        <a:solidFill>
-          <a:schemeClr val="phClr">
-            <a:tint val="95000"/>
-            <a:satMod val="170000"/>
-          </a:schemeClr>
-        </a:solidFill>
-        <a:gradFill rotWithShape="1">
-          <a:gsLst>
-            <a:gs pos="0">
-              <a:schemeClr val="phClr">
-                <a:tint val="93000"/>
-                <a:satMod val="150000"/>
-                <a:shade val="98000"/>
-                <a:lumMod val="102000"/>
-              </a:schemeClr>
-            </a:gs>
-            <a:gs pos="50000">
-              <a:schemeClr val="phClr">
-                <a:tint val="98000"/>
-                <a:satMod val="130000"/>
-                <a:shade val="90000"/>
-                <a:lumMod val="103000"/>
-              </a:schemeClr>
-            </a:gs>
-            <a:gs pos="100000">
-              <a:schemeClr val="phClr">
-                <a:shade val="63000"/>
-                <a:satMod val="120000"/>
-              </a:schemeClr>
-            </a:gs>
-          </a:gsLst>
-          <a:lin ang="5400000" scaled="0"/>
-        </a:gradFill>
-      </a:bgFillStyleLst>
-    </a:fmtScheme>
-  </a:themeElements>
-  <a:objectDefaults>
-    <a:lnDef>
-      <a:spPr/>
-      <a:bodyPr/>
-      <a:lstStyle/>
-      <a:style>
-        <a:lnRef idx="2">
-          <a:schemeClr val="accent1"/>
-        </a:lnRef>
-        <a:fillRef idx="0">
-          <a:schemeClr val="accent1"/>
-        </a:fillRef>
-        <a:effectRef idx="1">
-          <a:schemeClr val="accent1"/>
-        </a:effectRef>
-        <a:fontRef idx="minor">
-          <a:schemeClr val="tx1"/>
-        </a:fontRef>
-      </a:style>
-    </a:lnDef>
-  </a:objectDefaults>
-  <a:extraClrSchemeLst/>
-  <a:extLst>
-    <a:ext uri="{05A4C25C-085E-4340-85A3-A5531E510DB2}">
-      <thm15:themeFamily xmlns:thm15="http://schemas.microsoft.com/office/thememl/2012/main" name="Office Theme" id="{2E142A2C-CD16-42D6-873A-C26D2A0506FA}" vid="{1BDDFF52-6CD6-40A5-AB3C-68EB2F1E4D0A}"/>
-    </a:ext>
-  </a:extLst>
-</a:theme>
-</file>
-
 <file path=ppt/theme/themeOverride1.xml><?xml version="1.0" encoding="utf-8"?>
 <a:themeOverride xmlns:a="http://schemas.openxmlformats.org/drawingml/2006/main">
   <a:clrScheme name="Office">

</xml_diff>